<commit_message>
add overview and fs layers figure to 6.File System
</commit_message>
<xml_diff>
--- a/docs/figures/os1.pptx
+++ b/docs/figures/os1.pptx
@@ -5,7 +5,7 @@
     <p:sldMasterId id="2147483648" r:id="rId1"/>
   </p:sldMasterIdLst>
   <p:notesMasterIdLst>
-    <p:notesMasterId r:id="rId16"/>
+    <p:notesMasterId r:id="rId18"/>
   </p:notesMasterIdLst>
   <p:sldIdLst>
     <p:sldId id="331" r:id="rId2"/>
@@ -22,6 +22,8 @@
     <p:sldId id="343" r:id="rId13"/>
     <p:sldId id="348" r:id="rId14"/>
     <p:sldId id="347" r:id="rId15"/>
+    <p:sldId id="349" r:id="rId16"/>
+    <p:sldId id="350" r:id="rId17"/>
   </p:sldIdLst>
   <p:sldSz cx="12192000" cy="6858000"/>
   <p:notesSz cx="6858000" cy="9144000"/>
@@ -210,7 +212,7 @@
           <a:p>
             <a:fld id="{2EFFAEC8-D018-F645-91F8-523BBA3A2E09}" type="datetimeFigureOut">
               <a:rPr lang="en-US" smtClean="0"/>
-              <a:t>3/31/22</a:t>
+              <a:t>5/20/22</a:t>
             </a:fld>
             <a:endParaRPr lang="en-US"/>
           </a:p>
@@ -982,6 +984,174 @@
 </p:notes>
 </file>
 
+<file path=ppt/notesSlides/notesSlide15.xml><?xml version="1.0" encoding="utf-8"?>
+<p:notes xmlns:a="http://schemas.openxmlformats.org/drawingml/2006/main" xmlns:r="http://schemas.openxmlformats.org/officeDocument/2006/relationships" xmlns:p="http://schemas.openxmlformats.org/presentationml/2006/main">
+  <p:cSld>
+    <p:spTree>
+      <p:nvGrpSpPr>
+        <p:cNvPr id="1" name=""/>
+        <p:cNvGrpSpPr/>
+        <p:nvPr/>
+      </p:nvGrpSpPr>
+      <p:grpSpPr>
+        <a:xfrm>
+          <a:off x="0" y="0"/>
+          <a:ext cx="0" cy="0"/>
+          <a:chOff x="0" y="0"/>
+          <a:chExt cx="0" cy="0"/>
+        </a:xfrm>
+      </p:grpSpPr>
+      <p:sp>
+        <p:nvSpPr>
+          <p:cNvPr id="2" name="Slide Image Placeholder 1"/>
+          <p:cNvSpPr>
+            <a:spLocks noGrp="1" noRot="1" noChangeAspect="1"/>
+          </p:cNvSpPr>
+          <p:nvPr>
+            <p:ph type="sldImg"/>
+          </p:nvPr>
+        </p:nvSpPr>
+        <p:spPr/>
+      </p:sp>
+      <p:sp>
+        <p:nvSpPr>
+          <p:cNvPr id="3" name="Notes Placeholder 2"/>
+          <p:cNvSpPr>
+            <a:spLocks noGrp="1"/>
+          </p:cNvSpPr>
+          <p:nvPr>
+            <p:ph type="body" idx="1"/>
+          </p:nvPr>
+        </p:nvSpPr>
+        <p:spPr/>
+        <p:txBody>
+          <a:bodyPr/>
+          <a:lstStyle/>
+          <a:p>
+            <a:endParaRPr lang="en-US" dirty="0"/>
+          </a:p>
+        </p:txBody>
+      </p:sp>
+      <p:sp>
+        <p:nvSpPr>
+          <p:cNvPr id="4" name="Slide Number Placeholder 3"/>
+          <p:cNvSpPr>
+            <a:spLocks noGrp="1"/>
+          </p:cNvSpPr>
+          <p:nvPr>
+            <p:ph type="sldNum" sz="quarter" idx="5"/>
+          </p:nvPr>
+        </p:nvSpPr>
+        <p:spPr/>
+        <p:txBody>
+          <a:bodyPr/>
+          <a:lstStyle/>
+          <a:p>
+            <a:fld id="{997274CE-51E2-314F-8544-5E91EE33A09F}" type="slidenum">
+              <a:rPr lang="en-US" smtClean="0"/>
+              <a:t>15</a:t>
+            </a:fld>
+            <a:endParaRPr lang="en-US"/>
+          </a:p>
+        </p:txBody>
+      </p:sp>
+    </p:spTree>
+    <p:extLst>
+      <p:ext uri="{BB962C8B-B14F-4D97-AF65-F5344CB8AC3E}">
+        <p14:creationId xmlns:p14="http://schemas.microsoft.com/office/powerpoint/2010/main" val="2678855188"/>
+      </p:ext>
+    </p:extLst>
+  </p:cSld>
+  <p:clrMapOvr>
+    <a:masterClrMapping/>
+  </p:clrMapOvr>
+</p:notes>
+</file>
+
+<file path=ppt/notesSlides/notesSlide16.xml><?xml version="1.0" encoding="utf-8"?>
+<p:notes xmlns:a="http://schemas.openxmlformats.org/drawingml/2006/main" xmlns:r="http://schemas.openxmlformats.org/officeDocument/2006/relationships" xmlns:p="http://schemas.openxmlformats.org/presentationml/2006/main">
+  <p:cSld>
+    <p:spTree>
+      <p:nvGrpSpPr>
+        <p:cNvPr id="1" name=""/>
+        <p:cNvGrpSpPr/>
+        <p:nvPr/>
+      </p:nvGrpSpPr>
+      <p:grpSpPr>
+        <a:xfrm>
+          <a:off x="0" y="0"/>
+          <a:ext cx="0" cy="0"/>
+          <a:chOff x="0" y="0"/>
+          <a:chExt cx="0" cy="0"/>
+        </a:xfrm>
+      </p:grpSpPr>
+      <p:sp>
+        <p:nvSpPr>
+          <p:cNvPr id="2" name="Slide Image Placeholder 1"/>
+          <p:cNvSpPr>
+            <a:spLocks noGrp="1" noRot="1" noChangeAspect="1"/>
+          </p:cNvSpPr>
+          <p:nvPr>
+            <p:ph type="sldImg"/>
+          </p:nvPr>
+        </p:nvSpPr>
+        <p:spPr/>
+      </p:sp>
+      <p:sp>
+        <p:nvSpPr>
+          <p:cNvPr id="3" name="Notes Placeholder 2"/>
+          <p:cNvSpPr>
+            <a:spLocks noGrp="1"/>
+          </p:cNvSpPr>
+          <p:nvPr>
+            <p:ph type="body" idx="1"/>
+          </p:nvPr>
+        </p:nvSpPr>
+        <p:spPr/>
+        <p:txBody>
+          <a:bodyPr/>
+          <a:lstStyle/>
+          <a:p>
+            <a:endParaRPr lang="en-US" dirty="0"/>
+          </a:p>
+        </p:txBody>
+      </p:sp>
+      <p:sp>
+        <p:nvSpPr>
+          <p:cNvPr id="4" name="Slide Number Placeholder 3"/>
+          <p:cNvSpPr>
+            <a:spLocks noGrp="1"/>
+          </p:cNvSpPr>
+          <p:nvPr>
+            <p:ph type="sldNum" sz="quarter" idx="5"/>
+          </p:nvPr>
+        </p:nvSpPr>
+        <p:spPr/>
+        <p:txBody>
+          <a:bodyPr/>
+          <a:lstStyle/>
+          <a:p>
+            <a:fld id="{997274CE-51E2-314F-8544-5E91EE33A09F}" type="slidenum">
+              <a:rPr lang="en-US" smtClean="0"/>
+              <a:t>16</a:t>
+            </a:fld>
+            <a:endParaRPr lang="en-US"/>
+          </a:p>
+        </p:txBody>
+      </p:sp>
+    </p:spTree>
+    <p:extLst>
+      <p:ext uri="{BB962C8B-B14F-4D97-AF65-F5344CB8AC3E}">
+        <p14:creationId xmlns:p14="http://schemas.microsoft.com/office/powerpoint/2010/main" val="443316110"/>
+      </p:ext>
+    </p:extLst>
+  </p:cSld>
+  <p:clrMapOvr>
+    <a:masterClrMapping/>
+  </p:clrMapOvr>
+</p:notes>
+</file>
+
 <file path=ppt/notesSlides/notesSlide2.xml><?xml version="1.0" encoding="utf-8"?>
 <p:notes xmlns:a="http://schemas.openxmlformats.org/drawingml/2006/main" xmlns:r="http://schemas.openxmlformats.org/officeDocument/2006/relationships" xmlns:p="http://schemas.openxmlformats.org/presentationml/2006/main">
   <p:cSld>
@@ -1803,7 +1973,7 @@
           <a:p>
             <a:fld id="{19461545-4337-D04F-96C2-94803B0B0F81}" type="datetimeFigureOut">
               <a:rPr lang="en-US" smtClean="0"/>
-              <a:t>3/31/22</a:t>
+              <a:t>5/20/22</a:t>
             </a:fld>
             <a:endParaRPr lang="en-US"/>
           </a:p>
@@ -2003,7 +2173,7 @@
           <a:p>
             <a:fld id="{19461545-4337-D04F-96C2-94803B0B0F81}" type="datetimeFigureOut">
               <a:rPr lang="en-US" smtClean="0"/>
-              <a:t>3/31/22</a:t>
+              <a:t>5/20/22</a:t>
             </a:fld>
             <a:endParaRPr lang="en-US"/>
           </a:p>
@@ -2213,7 +2383,7 @@
           <a:p>
             <a:fld id="{19461545-4337-D04F-96C2-94803B0B0F81}" type="datetimeFigureOut">
               <a:rPr lang="en-US" smtClean="0"/>
-              <a:t>3/31/22</a:t>
+              <a:t>5/20/22</a:t>
             </a:fld>
             <a:endParaRPr lang="en-US"/>
           </a:p>
@@ -2448,7 +2618,7 @@
           <a:p>
             <a:fld id="{19461545-4337-D04F-96C2-94803B0B0F81}" type="datetimeFigureOut">
               <a:rPr lang="en-US" smtClean="0"/>
-              <a:t>3/31/22</a:t>
+              <a:t>5/20/22</a:t>
             </a:fld>
             <a:endParaRPr lang="en-US"/>
           </a:p>
@@ -2724,7 +2894,7 @@
           <a:p>
             <a:fld id="{19461545-4337-D04F-96C2-94803B0B0F81}" type="datetimeFigureOut">
               <a:rPr lang="en-US" smtClean="0"/>
-              <a:t>3/31/22</a:t>
+              <a:t>5/20/22</a:t>
             </a:fld>
             <a:endParaRPr lang="en-US"/>
           </a:p>
@@ -2992,7 +3162,7 @@
           <a:p>
             <a:fld id="{19461545-4337-D04F-96C2-94803B0B0F81}" type="datetimeFigureOut">
               <a:rPr lang="en-US" smtClean="0"/>
-              <a:t>3/31/22</a:t>
+              <a:t>5/20/22</a:t>
             </a:fld>
             <a:endParaRPr lang="en-US"/>
           </a:p>
@@ -3407,7 +3577,7 @@
           <a:p>
             <a:fld id="{19461545-4337-D04F-96C2-94803B0B0F81}" type="datetimeFigureOut">
               <a:rPr lang="en-US" smtClean="0"/>
-              <a:t>3/31/22</a:t>
+              <a:t>5/20/22</a:t>
             </a:fld>
             <a:endParaRPr lang="en-US"/>
           </a:p>
@@ -3549,7 +3719,7 @@
           <a:p>
             <a:fld id="{19461545-4337-D04F-96C2-94803B0B0F81}" type="datetimeFigureOut">
               <a:rPr lang="en-US" smtClean="0"/>
-              <a:t>3/31/22</a:t>
+              <a:t>5/20/22</a:t>
             </a:fld>
             <a:endParaRPr lang="en-US"/>
           </a:p>
@@ -3662,7 +3832,7 @@
           <a:p>
             <a:fld id="{19461545-4337-D04F-96C2-94803B0B0F81}" type="datetimeFigureOut">
               <a:rPr lang="en-US" smtClean="0"/>
-              <a:t>3/31/22</a:t>
+              <a:t>5/20/22</a:t>
             </a:fld>
             <a:endParaRPr lang="en-US"/>
           </a:p>
@@ -3975,7 +4145,7 @@
           <a:p>
             <a:fld id="{19461545-4337-D04F-96C2-94803B0B0F81}" type="datetimeFigureOut">
               <a:rPr lang="en-US" smtClean="0"/>
-              <a:t>3/31/22</a:t>
+              <a:t>5/20/22</a:t>
             </a:fld>
             <a:endParaRPr lang="en-US"/>
           </a:p>
@@ -4264,7 +4434,7 @@
           <a:p>
             <a:fld id="{19461545-4337-D04F-96C2-94803B0B0F81}" type="datetimeFigureOut">
               <a:rPr lang="en-US" smtClean="0"/>
-              <a:t>3/31/22</a:t>
+              <a:t>5/20/22</a:t>
             </a:fld>
             <a:endParaRPr lang="en-US"/>
           </a:p>
@@ -4507,7 +4677,7 @@
           <a:p>
             <a:fld id="{19461545-4337-D04F-96C2-94803B0B0F81}" type="datetimeFigureOut">
               <a:rPr lang="en-US" smtClean="0"/>
-              <a:t>3/31/22</a:t>
+              <a:t>5/20/22</a:t>
             </a:fld>
             <a:endParaRPr lang="en-US"/>
           </a:p>
@@ -15003,6 +15173,1307 @@
       </p:grpSpPr>
       <p:sp>
         <p:nvSpPr>
+          <p:cNvPr id="20" name="Triangle 19">
+            <a:extLst>
+              <a:ext uri="{FF2B5EF4-FFF2-40B4-BE49-F238E27FC236}">
+                <a16:creationId xmlns:a16="http://schemas.microsoft.com/office/drawing/2014/main" id="{EEA8EA49-B991-5E32-25C3-0E58FD20A9B1}"/>
+              </a:ext>
+            </a:extLst>
+          </p:cNvPr>
+          <p:cNvSpPr/>
+          <p:nvPr/>
+        </p:nvSpPr>
+        <p:spPr>
+          <a:xfrm rot="10800000">
+            <a:off x="4353794" y="2139548"/>
+            <a:ext cx="3352019" cy="3807638"/>
+          </a:xfrm>
+          <a:prstGeom prst="triangle">
+            <a:avLst>
+              <a:gd name="adj" fmla="val 50807"/>
+            </a:avLst>
+          </a:prstGeom>
+        </p:spPr>
+        <p:style>
+          <a:lnRef idx="2">
+            <a:schemeClr val="accent1">
+              <a:shade val="50000"/>
+            </a:schemeClr>
+          </a:lnRef>
+          <a:fillRef idx="1">
+            <a:schemeClr val="accent1"/>
+          </a:fillRef>
+          <a:effectRef idx="0">
+            <a:schemeClr val="accent1"/>
+          </a:effectRef>
+          <a:fontRef idx="minor">
+            <a:schemeClr val="lt1"/>
+          </a:fontRef>
+        </p:style>
+        <p:txBody>
+          <a:bodyPr rtlCol="0" anchor="ctr"/>
+          <a:lstStyle/>
+          <a:p>
+            <a:pPr algn="ctr"/>
+            <a:endParaRPr lang="en-US"/>
+          </a:p>
+        </p:txBody>
+      </p:sp>
+      <p:sp>
+        <p:nvSpPr>
+          <p:cNvPr id="2" name="TextBox 1">
+            <a:extLst>
+              <a:ext uri="{FF2B5EF4-FFF2-40B4-BE49-F238E27FC236}">
+                <a16:creationId xmlns:a16="http://schemas.microsoft.com/office/drawing/2014/main" id="{A99980E2-A3A9-FD4A-9011-9A37E88F5891}"/>
+              </a:ext>
+            </a:extLst>
+          </p:cNvPr>
+          <p:cNvSpPr txBox="1"/>
+          <p:nvPr/>
+        </p:nvSpPr>
+        <p:spPr>
+          <a:xfrm>
+            <a:off x="1872537" y="277843"/>
+            <a:ext cx="8446926" cy="707886"/>
+          </a:xfrm>
+          <a:prstGeom prst="rect">
+            <a:avLst/>
+          </a:prstGeom>
+          <a:noFill/>
+        </p:spPr>
+        <p:txBody>
+          <a:bodyPr wrap="square" rtlCol="0">
+            <a:spAutoFit/>
+          </a:bodyPr>
+          <a:lstStyle/>
+          <a:p>
+            <a:pPr algn="ctr"/>
+            <a:r>
+              <a:rPr lang="en-US" sz="4000" dirty="0">
+                <a:solidFill>
+                  <a:schemeClr val="accent1">
+                    <a:lumMod val="60000"/>
+                    <a:lumOff val="40000"/>
+                  </a:schemeClr>
+                </a:solidFill>
+              </a:rPr>
+              <a:t>File System Layers</a:t>
+            </a:r>
+          </a:p>
+        </p:txBody>
+      </p:sp>
+      <p:sp>
+        <p:nvSpPr>
+          <p:cNvPr id="3" name="Rectangle 2">
+            <a:extLst>
+              <a:ext uri="{FF2B5EF4-FFF2-40B4-BE49-F238E27FC236}">
+                <a16:creationId xmlns:a16="http://schemas.microsoft.com/office/drawing/2014/main" id="{AAE5AAAB-A88D-FF87-7DB5-E51835108775}"/>
+              </a:ext>
+            </a:extLst>
+          </p:cNvPr>
+          <p:cNvSpPr/>
+          <p:nvPr/>
+        </p:nvSpPr>
+        <p:spPr>
+          <a:xfrm>
+            <a:off x="4323425" y="2104766"/>
+            <a:ext cx="3382392" cy="523781"/>
+          </a:xfrm>
+          <a:prstGeom prst="rect">
+            <a:avLst/>
+          </a:prstGeom>
+        </p:spPr>
+        <p:style>
+          <a:lnRef idx="2">
+            <a:schemeClr val="accent1">
+              <a:shade val="50000"/>
+            </a:schemeClr>
+          </a:lnRef>
+          <a:fillRef idx="1">
+            <a:schemeClr val="accent1"/>
+          </a:fillRef>
+          <a:effectRef idx="0">
+            <a:schemeClr val="accent1"/>
+          </a:effectRef>
+          <a:fontRef idx="minor">
+            <a:schemeClr val="lt1"/>
+          </a:fontRef>
+        </p:style>
+        <p:txBody>
+          <a:bodyPr rtlCol="0" anchor="ctr"/>
+          <a:lstStyle/>
+          <a:p>
+            <a:pPr algn="ctr"/>
+            <a:r>
+              <a:rPr lang="en-US" b="1" dirty="0"/>
+              <a:t>File</a:t>
+            </a:r>
+            <a:r>
+              <a:rPr lang="en-US" dirty="0"/>
+              <a:t> </a:t>
+            </a:r>
+            <a:r>
+              <a:rPr lang="en-US" b="1" dirty="0"/>
+              <a:t>descriptor</a:t>
+            </a:r>
+          </a:p>
+        </p:txBody>
+      </p:sp>
+      <p:sp>
+        <p:nvSpPr>
+          <p:cNvPr id="4" name="Rectangle 3">
+            <a:extLst>
+              <a:ext uri="{FF2B5EF4-FFF2-40B4-BE49-F238E27FC236}">
+                <a16:creationId xmlns:a16="http://schemas.microsoft.com/office/drawing/2014/main" id="{C8E679DF-79DD-058B-C0F6-7F0DE2D19120}"/>
+              </a:ext>
+            </a:extLst>
+          </p:cNvPr>
+          <p:cNvSpPr/>
+          <p:nvPr/>
+        </p:nvSpPr>
+        <p:spPr>
+          <a:xfrm>
+            <a:off x="4323425" y="2709169"/>
+            <a:ext cx="3382392" cy="523781"/>
+          </a:xfrm>
+          <a:prstGeom prst="rect">
+            <a:avLst/>
+          </a:prstGeom>
+        </p:spPr>
+        <p:style>
+          <a:lnRef idx="2">
+            <a:schemeClr val="accent1">
+              <a:shade val="50000"/>
+            </a:schemeClr>
+          </a:lnRef>
+          <a:fillRef idx="1">
+            <a:schemeClr val="accent1"/>
+          </a:fillRef>
+          <a:effectRef idx="0">
+            <a:schemeClr val="accent1"/>
+          </a:effectRef>
+          <a:fontRef idx="minor">
+            <a:schemeClr val="lt1"/>
+          </a:fontRef>
+        </p:style>
+        <p:txBody>
+          <a:bodyPr rtlCol="0" anchor="ctr"/>
+          <a:lstStyle/>
+          <a:p>
+            <a:pPr algn="ctr"/>
+            <a:r>
+              <a:rPr lang="en-US" b="1" dirty="0"/>
+              <a:t>Pathname</a:t>
+            </a:r>
+          </a:p>
+        </p:txBody>
+      </p:sp>
+      <p:sp>
+        <p:nvSpPr>
+          <p:cNvPr id="5" name="Rectangle 4">
+            <a:extLst>
+              <a:ext uri="{FF2B5EF4-FFF2-40B4-BE49-F238E27FC236}">
+                <a16:creationId xmlns:a16="http://schemas.microsoft.com/office/drawing/2014/main" id="{44DF0EC7-8D4F-A9C9-125B-EF947FC04F5D}"/>
+              </a:ext>
+            </a:extLst>
+          </p:cNvPr>
+          <p:cNvSpPr/>
+          <p:nvPr/>
+        </p:nvSpPr>
+        <p:spPr>
+          <a:xfrm>
+            <a:off x="4323425" y="3314331"/>
+            <a:ext cx="3382392" cy="523781"/>
+          </a:xfrm>
+          <a:prstGeom prst="rect">
+            <a:avLst/>
+          </a:prstGeom>
+        </p:spPr>
+        <p:style>
+          <a:lnRef idx="2">
+            <a:schemeClr val="accent1">
+              <a:shade val="50000"/>
+            </a:schemeClr>
+          </a:lnRef>
+          <a:fillRef idx="1">
+            <a:schemeClr val="accent1"/>
+          </a:fillRef>
+          <a:effectRef idx="0">
+            <a:schemeClr val="accent1"/>
+          </a:effectRef>
+          <a:fontRef idx="minor">
+            <a:schemeClr val="lt1"/>
+          </a:fontRef>
+        </p:style>
+        <p:txBody>
+          <a:bodyPr rtlCol="0" anchor="ctr"/>
+          <a:lstStyle/>
+          <a:p>
+            <a:pPr algn="ctr"/>
+            <a:r>
+              <a:rPr lang="en-US" b="1" dirty="0"/>
+              <a:t>Directory</a:t>
+            </a:r>
+          </a:p>
+        </p:txBody>
+      </p:sp>
+      <p:sp>
+        <p:nvSpPr>
+          <p:cNvPr id="6" name="Rectangle 5">
+            <a:extLst>
+              <a:ext uri="{FF2B5EF4-FFF2-40B4-BE49-F238E27FC236}">
+                <a16:creationId xmlns:a16="http://schemas.microsoft.com/office/drawing/2014/main" id="{92946CC0-20CB-E582-5F6A-DA7292405CEC}"/>
+              </a:ext>
+            </a:extLst>
+          </p:cNvPr>
+          <p:cNvSpPr/>
+          <p:nvPr/>
+        </p:nvSpPr>
+        <p:spPr>
+          <a:xfrm>
+            <a:off x="4323425" y="3919493"/>
+            <a:ext cx="3382392" cy="523781"/>
+          </a:xfrm>
+          <a:prstGeom prst="rect">
+            <a:avLst/>
+          </a:prstGeom>
+        </p:spPr>
+        <p:style>
+          <a:lnRef idx="2">
+            <a:schemeClr val="accent1">
+              <a:shade val="50000"/>
+            </a:schemeClr>
+          </a:lnRef>
+          <a:fillRef idx="1">
+            <a:schemeClr val="accent1"/>
+          </a:fillRef>
+          <a:effectRef idx="0">
+            <a:schemeClr val="accent1"/>
+          </a:effectRef>
+          <a:fontRef idx="minor">
+            <a:schemeClr val="lt1"/>
+          </a:fontRef>
+        </p:style>
+        <p:txBody>
+          <a:bodyPr rtlCol="0" anchor="ctr"/>
+          <a:lstStyle/>
+          <a:p>
+            <a:pPr algn="ctr"/>
+            <a:r>
+              <a:rPr lang="en-US" b="1" dirty="0"/>
+              <a:t>Inode</a:t>
+            </a:r>
+          </a:p>
+        </p:txBody>
+      </p:sp>
+      <p:sp>
+        <p:nvSpPr>
+          <p:cNvPr id="7" name="Rectangle 6">
+            <a:extLst>
+              <a:ext uri="{FF2B5EF4-FFF2-40B4-BE49-F238E27FC236}">
+                <a16:creationId xmlns:a16="http://schemas.microsoft.com/office/drawing/2014/main" id="{3A55194C-177C-5269-B503-18D640503AE4}"/>
+              </a:ext>
+            </a:extLst>
+          </p:cNvPr>
+          <p:cNvSpPr/>
+          <p:nvPr/>
+        </p:nvSpPr>
+        <p:spPr>
+          <a:xfrm>
+            <a:off x="4323425" y="4524655"/>
+            <a:ext cx="3382392" cy="523781"/>
+          </a:xfrm>
+          <a:prstGeom prst="rect">
+            <a:avLst/>
+          </a:prstGeom>
+        </p:spPr>
+        <p:style>
+          <a:lnRef idx="2">
+            <a:schemeClr val="accent1">
+              <a:shade val="50000"/>
+            </a:schemeClr>
+          </a:lnRef>
+          <a:fillRef idx="1">
+            <a:schemeClr val="accent1"/>
+          </a:fillRef>
+          <a:effectRef idx="0">
+            <a:schemeClr val="accent1"/>
+          </a:effectRef>
+          <a:fontRef idx="minor">
+            <a:schemeClr val="lt1"/>
+          </a:fontRef>
+        </p:style>
+        <p:txBody>
+          <a:bodyPr rtlCol="0" anchor="ctr"/>
+          <a:lstStyle/>
+          <a:p>
+            <a:pPr algn="ctr"/>
+            <a:r>
+              <a:rPr lang="en-US" b="1" dirty="0"/>
+              <a:t>Logging</a:t>
+            </a:r>
+          </a:p>
+        </p:txBody>
+      </p:sp>
+      <p:sp>
+        <p:nvSpPr>
+          <p:cNvPr id="8" name="Rectangle 7">
+            <a:extLst>
+              <a:ext uri="{FF2B5EF4-FFF2-40B4-BE49-F238E27FC236}">
+                <a16:creationId xmlns:a16="http://schemas.microsoft.com/office/drawing/2014/main" id="{08DC43ED-6CFA-71C5-038E-F1837F544A8F}"/>
+              </a:ext>
+            </a:extLst>
+          </p:cNvPr>
+          <p:cNvSpPr/>
+          <p:nvPr/>
+        </p:nvSpPr>
+        <p:spPr>
+          <a:xfrm>
+            <a:off x="4323425" y="5129817"/>
+            <a:ext cx="3382392" cy="523781"/>
+          </a:xfrm>
+          <a:prstGeom prst="rect">
+            <a:avLst/>
+          </a:prstGeom>
+        </p:spPr>
+        <p:style>
+          <a:lnRef idx="2">
+            <a:schemeClr val="accent1">
+              <a:shade val="50000"/>
+            </a:schemeClr>
+          </a:lnRef>
+          <a:fillRef idx="1">
+            <a:schemeClr val="accent1"/>
+          </a:fillRef>
+          <a:effectRef idx="0">
+            <a:schemeClr val="accent1"/>
+          </a:effectRef>
+          <a:fontRef idx="minor">
+            <a:schemeClr val="lt1"/>
+          </a:fontRef>
+        </p:style>
+        <p:txBody>
+          <a:bodyPr rtlCol="0" anchor="ctr"/>
+          <a:lstStyle/>
+          <a:p>
+            <a:pPr algn="ctr"/>
+            <a:r>
+              <a:rPr lang="en-US" b="1" dirty="0"/>
+              <a:t>Buffer</a:t>
+            </a:r>
+            <a:r>
+              <a:rPr lang="en-US" dirty="0"/>
+              <a:t> </a:t>
+            </a:r>
+            <a:r>
+              <a:rPr lang="en-US" b="1" dirty="0"/>
+              <a:t>cache</a:t>
+            </a:r>
+          </a:p>
+        </p:txBody>
+      </p:sp>
+      <p:sp>
+        <p:nvSpPr>
+          <p:cNvPr id="9" name="Oval 8">
+            <a:extLst>
+              <a:ext uri="{FF2B5EF4-FFF2-40B4-BE49-F238E27FC236}">
+                <a16:creationId xmlns:a16="http://schemas.microsoft.com/office/drawing/2014/main" id="{DAE7AECA-B9D3-1606-F41B-289476082A67}"/>
+              </a:ext>
+            </a:extLst>
+          </p:cNvPr>
+          <p:cNvSpPr/>
+          <p:nvPr/>
+        </p:nvSpPr>
+        <p:spPr>
+          <a:xfrm>
+            <a:off x="5573696" y="875338"/>
+            <a:ext cx="881849" cy="877860"/>
+          </a:xfrm>
+          <a:prstGeom prst="ellipse">
+            <a:avLst/>
+          </a:prstGeom>
+          <a:solidFill>
+            <a:schemeClr val="accent2"/>
+          </a:solidFill>
+          <a:ln>
+            <a:noFill/>
+          </a:ln>
+        </p:spPr>
+        <p:style>
+          <a:lnRef idx="2">
+            <a:schemeClr val="accent1">
+              <a:shade val="50000"/>
+            </a:schemeClr>
+          </a:lnRef>
+          <a:fillRef idx="1">
+            <a:schemeClr val="accent1"/>
+          </a:fillRef>
+          <a:effectRef idx="0">
+            <a:schemeClr val="accent1"/>
+          </a:effectRef>
+          <a:fontRef idx="minor">
+            <a:schemeClr val="lt1"/>
+          </a:fontRef>
+        </p:style>
+        <p:txBody>
+          <a:bodyPr rtlCol="0" anchor="ctr"/>
+          <a:lstStyle/>
+          <a:p>
+            <a:pPr algn="ctr"/>
+            <a:endParaRPr lang="en-US" sz="1100" dirty="0"/>
+          </a:p>
+        </p:txBody>
+      </p:sp>
+      <p:sp>
+        <p:nvSpPr>
+          <p:cNvPr id="10" name="TextBox 9">
+            <a:extLst>
+              <a:ext uri="{FF2B5EF4-FFF2-40B4-BE49-F238E27FC236}">
+                <a16:creationId xmlns:a16="http://schemas.microsoft.com/office/drawing/2014/main" id="{1F10C7D4-82CA-64EC-2C80-713C835A9015}"/>
+              </a:ext>
+            </a:extLst>
+          </p:cNvPr>
+          <p:cNvSpPr txBox="1"/>
+          <p:nvPr/>
+        </p:nvSpPr>
+        <p:spPr>
+          <a:xfrm>
+            <a:off x="5573696" y="1129602"/>
+            <a:ext cx="904799" cy="369332"/>
+          </a:xfrm>
+          <a:prstGeom prst="rect">
+            <a:avLst/>
+          </a:prstGeom>
+          <a:noFill/>
+        </p:spPr>
+        <p:txBody>
+          <a:bodyPr wrap="none" rtlCol="0">
+            <a:spAutoFit/>
+          </a:bodyPr>
+          <a:lstStyle/>
+          <a:p>
+            <a:r>
+              <a:rPr lang="en-US" b="1" dirty="0"/>
+              <a:t>Process</a:t>
+            </a:r>
+          </a:p>
+        </p:txBody>
+      </p:sp>
+      <p:cxnSp>
+        <p:nvCxnSpPr>
+          <p:cNvPr id="12" name="Straight Arrow Connector 11">
+            <a:extLst>
+              <a:ext uri="{FF2B5EF4-FFF2-40B4-BE49-F238E27FC236}">
+                <a16:creationId xmlns:a16="http://schemas.microsoft.com/office/drawing/2014/main" id="{15EE82AF-A9D4-6B58-04B3-3E6C5054E889}"/>
+              </a:ext>
+            </a:extLst>
+          </p:cNvPr>
+          <p:cNvCxnSpPr>
+            <a:stCxn id="9" idx="4"/>
+            <a:endCxn id="3" idx="0"/>
+          </p:cNvCxnSpPr>
+          <p:nvPr/>
+        </p:nvCxnSpPr>
+        <p:spPr>
+          <a:xfrm>
+            <a:off x="6014621" y="1753198"/>
+            <a:ext cx="0" cy="351568"/>
+          </a:xfrm>
+          <a:prstGeom prst="straightConnector1">
+            <a:avLst/>
+          </a:prstGeom>
+          <a:ln>
+            <a:tailEnd type="triangle"/>
+          </a:ln>
+        </p:spPr>
+        <p:style>
+          <a:lnRef idx="3">
+            <a:schemeClr val="accent2"/>
+          </a:lnRef>
+          <a:fillRef idx="0">
+            <a:schemeClr val="accent2"/>
+          </a:fillRef>
+          <a:effectRef idx="2">
+            <a:schemeClr val="accent2"/>
+          </a:effectRef>
+          <a:fontRef idx="minor">
+            <a:schemeClr val="tx1"/>
+          </a:fontRef>
+        </p:style>
+      </p:cxnSp>
+      <p:sp>
+        <p:nvSpPr>
+          <p:cNvPr id="14" name="TextBox 13">
+            <a:extLst>
+              <a:ext uri="{FF2B5EF4-FFF2-40B4-BE49-F238E27FC236}">
+                <a16:creationId xmlns:a16="http://schemas.microsoft.com/office/drawing/2014/main" id="{884BFC55-BF1D-58DE-FAE3-3AFCB6E9CF68}"/>
+              </a:ext>
+            </a:extLst>
+          </p:cNvPr>
+          <p:cNvSpPr txBox="1"/>
+          <p:nvPr/>
+        </p:nvSpPr>
+        <p:spPr>
+          <a:xfrm>
+            <a:off x="4603682" y="1732928"/>
+            <a:ext cx="1273618" cy="276999"/>
+          </a:xfrm>
+          <a:prstGeom prst="rect">
+            <a:avLst/>
+          </a:prstGeom>
+          <a:solidFill>
+            <a:srgbClr val="00B0F0"/>
+          </a:solidFill>
+        </p:spPr>
+        <p:txBody>
+          <a:bodyPr wrap="none" rtlCol="0">
+            <a:spAutoFit/>
+          </a:bodyPr>
+          <a:lstStyle/>
+          <a:p>
+            <a:r>
+              <a:rPr lang="en-US" sz="1200" dirty="0">
+                <a:solidFill>
+                  <a:schemeClr val="bg1"/>
+                </a:solidFill>
+              </a:rPr>
+              <a:t>fd = open(“x/y”);</a:t>
+            </a:r>
+          </a:p>
+        </p:txBody>
+      </p:sp>
+      <p:sp>
+        <p:nvSpPr>
+          <p:cNvPr id="16" name="TextBox 15">
+            <a:extLst>
+              <a:ext uri="{FF2B5EF4-FFF2-40B4-BE49-F238E27FC236}">
+                <a16:creationId xmlns:a16="http://schemas.microsoft.com/office/drawing/2014/main" id="{1D906EC4-6C32-C4FD-32BC-634CB934D816}"/>
+              </a:ext>
+            </a:extLst>
+          </p:cNvPr>
+          <p:cNvSpPr txBox="1"/>
+          <p:nvPr/>
+        </p:nvSpPr>
+        <p:spPr>
+          <a:xfrm>
+            <a:off x="6151943" y="1742030"/>
+            <a:ext cx="1322542" cy="276999"/>
+          </a:xfrm>
+          <a:prstGeom prst="rect">
+            <a:avLst/>
+          </a:prstGeom>
+          <a:solidFill>
+            <a:srgbClr val="00B0F0"/>
+          </a:solidFill>
+        </p:spPr>
+        <p:txBody>
+          <a:bodyPr wrap="none" rtlCol="0">
+            <a:spAutoFit/>
+          </a:bodyPr>
+          <a:lstStyle/>
+          <a:p>
+            <a:r>
+              <a:rPr lang="en-US" sz="1200" dirty="0">
+                <a:solidFill>
+                  <a:schemeClr val="bg1"/>
+                </a:solidFill>
+              </a:rPr>
+              <a:t>write(fd, “abc”, 3);</a:t>
+            </a:r>
+          </a:p>
+        </p:txBody>
+      </p:sp>
+      <p:sp>
+        <p:nvSpPr>
+          <p:cNvPr id="17" name="Rectangle 16">
+            <a:extLst>
+              <a:ext uri="{FF2B5EF4-FFF2-40B4-BE49-F238E27FC236}">
+                <a16:creationId xmlns:a16="http://schemas.microsoft.com/office/drawing/2014/main" id="{25CC0CB4-5D3A-7D1C-E909-3F9587FECF15}"/>
+              </a:ext>
+            </a:extLst>
+          </p:cNvPr>
+          <p:cNvSpPr/>
+          <p:nvPr/>
+        </p:nvSpPr>
+        <p:spPr>
+          <a:xfrm>
+            <a:off x="5663212" y="6081204"/>
+            <a:ext cx="702815" cy="762592"/>
+          </a:xfrm>
+          <a:prstGeom prst="rect">
+            <a:avLst/>
+          </a:prstGeom>
+          <a:noFill/>
+          <a:ln>
+            <a:solidFill>
+              <a:srgbClr val="FF0000"/>
+            </a:solidFill>
+          </a:ln>
+        </p:spPr>
+        <p:style>
+          <a:lnRef idx="2">
+            <a:schemeClr val="accent1">
+              <a:shade val="50000"/>
+            </a:schemeClr>
+          </a:lnRef>
+          <a:fillRef idx="1">
+            <a:schemeClr val="accent1"/>
+          </a:fillRef>
+          <a:effectRef idx="0">
+            <a:schemeClr val="accent1"/>
+          </a:effectRef>
+          <a:fontRef idx="minor">
+            <a:schemeClr val="lt1"/>
+          </a:fontRef>
+        </p:style>
+        <p:txBody>
+          <a:bodyPr rtlCol="0" anchor="ctr"/>
+          <a:lstStyle/>
+          <a:p>
+            <a:pPr algn="ctr"/>
+            <a:endParaRPr lang="en-US"/>
+          </a:p>
+        </p:txBody>
+      </p:sp>
+      <p:sp>
+        <p:nvSpPr>
+          <p:cNvPr id="18" name="TextBox 17">
+            <a:extLst>
+              <a:ext uri="{FF2B5EF4-FFF2-40B4-BE49-F238E27FC236}">
+                <a16:creationId xmlns:a16="http://schemas.microsoft.com/office/drawing/2014/main" id="{4B57B658-638F-1BBB-95CC-52C17863F6D3}"/>
+              </a:ext>
+            </a:extLst>
+          </p:cNvPr>
+          <p:cNvSpPr txBox="1"/>
+          <p:nvPr/>
+        </p:nvSpPr>
+        <p:spPr>
+          <a:xfrm>
+            <a:off x="5727521" y="6210825"/>
+            <a:ext cx="574196" cy="369332"/>
+          </a:xfrm>
+          <a:prstGeom prst="rect">
+            <a:avLst/>
+          </a:prstGeom>
+          <a:noFill/>
+        </p:spPr>
+        <p:txBody>
+          <a:bodyPr wrap="none" rtlCol="0">
+            <a:spAutoFit/>
+          </a:bodyPr>
+          <a:lstStyle/>
+          <a:p>
+            <a:r>
+              <a:rPr lang="en-US" dirty="0"/>
+              <a:t>Disk</a:t>
+            </a:r>
+          </a:p>
+        </p:txBody>
+      </p:sp>
+      <p:sp>
+        <p:nvSpPr>
+          <p:cNvPr id="19" name="Rectangle 18">
+            <a:extLst>
+              <a:ext uri="{FF2B5EF4-FFF2-40B4-BE49-F238E27FC236}">
+                <a16:creationId xmlns:a16="http://schemas.microsoft.com/office/drawing/2014/main" id="{A0475E62-9397-81A2-778C-770AFB1E9C7E}"/>
+              </a:ext>
+            </a:extLst>
+          </p:cNvPr>
+          <p:cNvSpPr/>
+          <p:nvPr/>
+        </p:nvSpPr>
+        <p:spPr>
+          <a:xfrm>
+            <a:off x="4323423" y="5743003"/>
+            <a:ext cx="3382392" cy="204183"/>
+          </a:xfrm>
+          <a:prstGeom prst="rect">
+            <a:avLst/>
+          </a:prstGeom>
+        </p:spPr>
+        <p:style>
+          <a:lnRef idx="2">
+            <a:schemeClr val="accent1">
+              <a:shade val="50000"/>
+            </a:schemeClr>
+          </a:lnRef>
+          <a:fillRef idx="1">
+            <a:schemeClr val="accent1"/>
+          </a:fillRef>
+          <a:effectRef idx="0">
+            <a:schemeClr val="accent1"/>
+          </a:effectRef>
+          <a:fontRef idx="minor">
+            <a:schemeClr val="lt1"/>
+          </a:fontRef>
+        </p:style>
+        <p:txBody>
+          <a:bodyPr rtlCol="0" anchor="ctr"/>
+          <a:lstStyle/>
+          <a:p>
+            <a:pPr algn="ctr"/>
+            <a:r>
+              <a:rPr lang="en-US" b="1" dirty="0"/>
+              <a:t>Disk driver</a:t>
+            </a:r>
+          </a:p>
+        </p:txBody>
+      </p:sp>
+      <p:sp>
+        <p:nvSpPr>
+          <p:cNvPr id="22" name="Up Arrow 21">
+            <a:extLst>
+              <a:ext uri="{FF2B5EF4-FFF2-40B4-BE49-F238E27FC236}">
+                <a16:creationId xmlns:a16="http://schemas.microsoft.com/office/drawing/2014/main" id="{6DA9ADEA-F173-7369-FD4B-9FA9BCB7A5EB}"/>
+              </a:ext>
+            </a:extLst>
+          </p:cNvPr>
+          <p:cNvSpPr/>
+          <p:nvPr/>
+        </p:nvSpPr>
+        <p:spPr>
+          <a:xfrm>
+            <a:off x="3967473" y="2104766"/>
+            <a:ext cx="189485" cy="3842420"/>
+          </a:xfrm>
+          <a:prstGeom prst="upArrow">
+            <a:avLst/>
+          </a:prstGeom>
+        </p:spPr>
+        <p:style>
+          <a:lnRef idx="2">
+            <a:schemeClr val="accent4">
+              <a:shade val="50000"/>
+            </a:schemeClr>
+          </a:lnRef>
+          <a:fillRef idx="1">
+            <a:schemeClr val="accent4"/>
+          </a:fillRef>
+          <a:effectRef idx="0">
+            <a:schemeClr val="accent4"/>
+          </a:effectRef>
+          <a:fontRef idx="minor">
+            <a:schemeClr val="lt1"/>
+          </a:fontRef>
+        </p:style>
+        <p:txBody>
+          <a:bodyPr rtlCol="0" anchor="ctr"/>
+          <a:lstStyle/>
+          <a:p>
+            <a:pPr algn="ctr"/>
+            <a:endParaRPr lang="en-US"/>
+          </a:p>
+        </p:txBody>
+      </p:sp>
+      <p:sp>
+        <p:nvSpPr>
+          <p:cNvPr id="23" name="TextBox 22">
+            <a:extLst>
+              <a:ext uri="{FF2B5EF4-FFF2-40B4-BE49-F238E27FC236}">
+                <a16:creationId xmlns:a16="http://schemas.microsoft.com/office/drawing/2014/main" id="{2D0A17E0-37A3-277B-7304-98D78390DDD8}"/>
+              </a:ext>
+            </a:extLst>
+          </p:cNvPr>
+          <p:cNvSpPr txBox="1"/>
+          <p:nvPr/>
+        </p:nvSpPr>
+        <p:spPr>
+          <a:xfrm>
+            <a:off x="3527827" y="1698347"/>
+            <a:ext cx="1056636" cy="461665"/>
+          </a:xfrm>
+          <a:prstGeom prst="rect">
+            <a:avLst/>
+          </a:prstGeom>
+          <a:noFill/>
+        </p:spPr>
+        <p:txBody>
+          <a:bodyPr wrap="none" rtlCol="0">
+            <a:spAutoFit/>
+          </a:bodyPr>
+          <a:lstStyle/>
+          <a:p>
+            <a:pPr algn="ctr"/>
+            <a:r>
+              <a:rPr lang="en-US" sz="1200" b="1" dirty="0">
+                <a:solidFill>
+                  <a:srgbClr val="FFC000"/>
+                </a:solidFill>
+              </a:rPr>
+              <a:t>Accumulated </a:t>
+            </a:r>
+          </a:p>
+          <a:p>
+            <a:pPr algn="ctr"/>
+            <a:r>
+              <a:rPr lang="en-US" sz="1200" b="1" dirty="0">
+                <a:solidFill>
+                  <a:srgbClr val="FFC000"/>
+                </a:solidFill>
+              </a:rPr>
+              <a:t>Complexity</a:t>
+            </a:r>
+          </a:p>
+        </p:txBody>
+      </p:sp>
+      <p:cxnSp>
+        <p:nvCxnSpPr>
+          <p:cNvPr id="25" name="Straight Connector 24">
+            <a:extLst>
+              <a:ext uri="{FF2B5EF4-FFF2-40B4-BE49-F238E27FC236}">
+                <a16:creationId xmlns:a16="http://schemas.microsoft.com/office/drawing/2014/main" id="{89B2A22C-8F10-75A3-DEC2-D8BAF2AE8287}"/>
+              </a:ext>
+            </a:extLst>
+          </p:cNvPr>
+          <p:cNvCxnSpPr>
+            <a:cxnSpLocks/>
+          </p:cNvCxnSpPr>
+          <p:nvPr/>
+        </p:nvCxnSpPr>
+        <p:spPr>
+          <a:xfrm>
+            <a:off x="2769834" y="5120090"/>
+            <a:ext cx="1760444" cy="0"/>
+          </a:xfrm>
+          <a:prstGeom prst="line">
+            <a:avLst/>
+          </a:prstGeom>
+          <a:ln w="9525" cap="flat" cmpd="sng" algn="ctr">
+            <a:solidFill>
+              <a:schemeClr val="accent4"/>
+            </a:solidFill>
+            <a:prstDash val="dash"/>
+            <a:round/>
+            <a:headEnd type="none" w="med" len="med"/>
+            <a:tailEnd type="none" w="med" len="med"/>
+          </a:ln>
+        </p:spPr>
+        <p:style>
+          <a:lnRef idx="0">
+            <a:scrgbClr r="0" g="0" b="0"/>
+          </a:lnRef>
+          <a:fillRef idx="0">
+            <a:scrgbClr r="0" g="0" b="0"/>
+          </a:fillRef>
+          <a:effectRef idx="0">
+            <a:scrgbClr r="0" g="0" b="0"/>
+          </a:effectRef>
+          <a:fontRef idx="minor">
+            <a:schemeClr val="tx1"/>
+          </a:fontRef>
+        </p:style>
+      </p:cxnSp>
+      <p:cxnSp>
+        <p:nvCxnSpPr>
+          <p:cNvPr id="27" name="Straight Connector 26">
+            <a:extLst>
+              <a:ext uri="{FF2B5EF4-FFF2-40B4-BE49-F238E27FC236}">
+                <a16:creationId xmlns:a16="http://schemas.microsoft.com/office/drawing/2014/main" id="{73DBFD0F-27B7-A4B6-300E-710632D4FF3E}"/>
+              </a:ext>
+            </a:extLst>
+          </p:cNvPr>
+          <p:cNvCxnSpPr>
+            <a:cxnSpLocks/>
+          </p:cNvCxnSpPr>
+          <p:nvPr/>
+        </p:nvCxnSpPr>
+        <p:spPr>
+          <a:xfrm>
+            <a:off x="2769834" y="5947186"/>
+            <a:ext cx="1760444" cy="0"/>
+          </a:xfrm>
+          <a:prstGeom prst="line">
+            <a:avLst/>
+          </a:prstGeom>
+          <a:ln w="9525" cap="flat" cmpd="sng" algn="ctr">
+            <a:solidFill>
+              <a:schemeClr val="accent4"/>
+            </a:solidFill>
+            <a:prstDash val="dash"/>
+            <a:round/>
+            <a:headEnd type="none" w="med" len="med"/>
+            <a:tailEnd type="none" w="med" len="med"/>
+          </a:ln>
+        </p:spPr>
+        <p:style>
+          <a:lnRef idx="0">
+            <a:scrgbClr r="0" g="0" b="0"/>
+          </a:lnRef>
+          <a:fillRef idx="0">
+            <a:scrgbClr r="0" g="0" b="0"/>
+          </a:fillRef>
+          <a:effectRef idx="0">
+            <a:scrgbClr r="0" g="0" b="0"/>
+          </a:effectRef>
+          <a:fontRef idx="minor">
+            <a:schemeClr val="tx1"/>
+          </a:fontRef>
+        </p:style>
+      </p:cxnSp>
+      <p:sp>
+        <p:nvSpPr>
+          <p:cNvPr id="28" name="TextBox 27">
+            <a:extLst>
+              <a:ext uri="{FF2B5EF4-FFF2-40B4-BE49-F238E27FC236}">
+                <a16:creationId xmlns:a16="http://schemas.microsoft.com/office/drawing/2014/main" id="{C9D2787E-61BA-8F6F-F418-69AFA9143077}"/>
+              </a:ext>
+            </a:extLst>
+          </p:cNvPr>
+          <p:cNvSpPr txBox="1"/>
+          <p:nvPr/>
+        </p:nvSpPr>
+        <p:spPr>
+          <a:xfrm>
+            <a:off x="2683245" y="5407763"/>
+            <a:ext cx="1131528" cy="276999"/>
+          </a:xfrm>
+          <a:prstGeom prst="rect">
+            <a:avLst/>
+          </a:prstGeom>
+          <a:noFill/>
+        </p:spPr>
+        <p:txBody>
+          <a:bodyPr wrap="none" rtlCol="0">
+            <a:spAutoFit/>
+          </a:bodyPr>
+          <a:lstStyle/>
+          <a:p>
+            <a:r>
+              <a:rPr lang="en-US" sz="1200" dirty="0"/>
+              <a:t>1. Buffer Cache</a:t>
+            </a:r>
+          </a:p>
+        </p:txBody>
+      </p:sp>
+      <p:cxnSp>
+        <p:nvCxnSpPr>
+          <p:cNvPr id="29" name="Straight Connector 28">
+            <a:extLst>
+              <a:ext uri="{FF2B5EF4-FFF2-40B4-BE49-F238E27FC236}">
+                <a16:creationId xmlns:a16="http://schemas.microsoft.com/office/drawing/2014/main" id="{931DF5E8-FF46-161F-0B08-B4FB32B6E9F1}"/>
+              </a:ext>
+            </a:extLst>
+          </p:cNvPr>
+          <p:cNvCxnSpPr>
+            <a:cxnSpLocks/>
+          </p:cNvCxnSpPr>
+          <p:nvPr/>
+        </p:nvCxnSpPr>
+        <p:spPr>
+          <a:xfrm>
+            <a:off x="2769834" y="4524655"/>
+            <a:ext cx="1760444" cy="0"/>
+          </a:xfrm>
+          <a:prstGeom prst="line">
+            <a:avLst/>
+          </a:prstGeom>
+          <a:ln w="9525" cap="flat" cmpd="sng" algn="ctr">
+            <a:solidFill>
+              <a:schemeClr val="accent4"/>
+            </a:solidFill>
+            <a:prstDash val="dash"/>
+            <a:round/>
+            <a:headEnd type="none" w="med" len="med"/>
+            <a:tailEnd type="none" w="med" len="med"/>
+          </a:ln>
+        </p:spPr>
+        <p:style>
+          <a:lnRef idx="0">
+            <a:scrgbClr r="0" g="0" b="0"/>
+          </a:lnRef>
+          <a:fillRef idx="0">
+            <a:scrgbClr r="0" g="0" b="0"/>
+          </a:fillRef>
+          <a:effectRef idx="0">
+            <a:scrgbClr r="0" g="0" b="0"/>
+          </a:effectRef>
+          <a:fontRef idx="minor">
+            <a:schemeClr val="tx1"/>
+          </a:fontRef>
+        </p:style>
+      </p:cxnSp>
+      <p:sp>
+        <p:nvSpPr>
+          <p:cNvPr id="32" name="TextBox 31">
+            <a:extLst>
+              <a:ext uri="{FF2B5EF4-FFF2-40B4-BE49-F238E27FC236}">
+                <a16:creationId xmlns:a16="http://schemas.microsoft.com/office/drawing/2014/main" id="{DE29FFB0-D773-6B91-D0CA-677472F9E887}"/>
+              </a:ext>
+            </a:extLst>
+          </p:cNvPr>
+          <p:cNvSpPr txBox="1"/>
+          <p:nvPr/>
+        </p:nvSpPr>
+        <p:spPr>
+          <a:xfrm>
+            <a:off x="2683245" y="4669243"/>
+            <a:ext cx="1288623" cy="276999"/>
+          </a:xfrm>
+          <a:prstGeom prst="rect">
+            <a:avLst/>
+          </a:prstGeom>
+          <a:noFill/>
+        </p:spPr>
+        <p:txBody>
+          <a:bodyPr wrap="none" rtlCol="0">
+            <a:spAutoFit/>
+          </a:bodyPr>
+          <a:lstStyle/>
+          <a:p>
+            <a:r>
+              <a:rPr lang="en-US" sz="1200" dirty="0"/>
+              <a:t>2. Crash Recovery</a:t>
+            </a:r>
+          </a:p>
+        </p:txBody>
+      </p:sp>
+      <p:cxnSp>
+        <p:nvCxnSpPr>
+          <p:cNvPr id="33" name="Straight Connector 32">
+            <a:extLst>
+              <a:ext uri="{FF2B5EF4-FFF2-40B4-BE49-F238E27FC236}">
+                <a16:creationId xmlns:a16="http://schemas.microsoft.com/office/drawing/2014/main" id="{22784EB0-B643-31EF-294D-DDB478F797FD}"/>
+              </a:ext>
+            </a:extLst>
+          </p:cNvPr>
+          <p:cNvCxnSpPr>
+            <a:cxnSpLocks/>
+          </p:cNvCxnSpPr>
+          <p:nvPr/>
+        </p:nvCxnSpPr>
+        <p:spPr>
+          <a:xfrm>
+            <a:off x="2759811" y="2104766"/>
+            <a:ext cx="1760444" cy="0"/>
+          </a:xfrm>
+          <a:prstGeom prst="line">
+            <a:avLst/>
+          </a:prstGeom>
+          <a:ln w="9525" cap="flat" cmpd="sng" algn="ctr">
+            <a:solidFill>
+              <a:schemeClr val="accent4"/>
+            </a:solidFill>
+            <a:prstDash val="dash"/>
+            <a:round/>
+            <a:headEnd type="none" w="med" len="med"/>
+            <a:tailEnd type="none" w="med" len="med"/>
+          </a:ln>
+        </p:spPr>
+        <p:style>
+          <a:lnRef idx="0">
+            <a:scrgbClr r="0" g="0" b="0"/>
+          </a:lnRef>
+          <a:fillRef idx="0">
+            <a:scrgbClr r="0" g="0" b="0"/>
+          </a:fillRef>
+          <a:effectRef idx="0">
+            <a:scrgbClr r="0" g="0" b="0"/>
+          </a:effectRef>
+          <a:fontRef idx="minor">
+            <a:schemeClr val="tx1"/>
+          </a:fontRef>
+        </p:style>
+      </p:cxnSp>
+      <p:sp>
+        <p:nvSpPr>
+          <p:cNvPr id="35" name="TextBox 34">
+            <a:extLst>
+              <a:ext uri="{FF2B5EF4-FFF2-40B4-BE49-F238E27FC236}">
+                <a16:creationId xmlns:a16="http://schemas.microsoft.com/office/drawing/2014/main" id="{7779671E-D677-AF25-5016-09221F50C03F}"/>
+              </a:ext>
+            </a:extLst>
+          </p:cNvPr>
+          <p:cNvSpPr txBox="1"/>
+          <p:nvPr/>
+        </p:nvSpPr>
+        <p:spPr>
+          <a:xfrm>
+            <a:off x="2683245" y="3177279"/>
+            <a:ext cx="1279581" cy="276999"/>
+          </a:xfrm>
+          <a:prstGeom prst="rect">
+            <a:avLst/>
+          </a:prstGeom>
+          <a:noFill/>
+        </p:spPr>
+        <p:txBody>
+          <a:bodyPr wrap="none" rtlCol="0">
+            <a:spAutoFit/>
+          </a:bodyPr>
+          <a:lstStyle/>
+          <a:p>
+            <a:r>
+              <a:rPr lang="en-US" sz="1200" dirty="0"/>
+              <a:t>3. Inode and Path</a:t>
+            </a:r>
+          </a:p>
+        </p:txBody>
+      </p:sp>
+      <p:sp>
+        <p:nvSpPr>
+          <p:cNvPr id="37" name="Sun 36">
+            <a:extLst>
+              <a:ext uri="{FF2B5EF4-FFF2-40B4-BE49-F238E27FC236}">
+                <a16:creationId xmlns:a16="http://schemas.microsoft.com/office/drawing/2014/main" id="{FDA87A99-80EE-067E-C008-396FDE6A3A11}"/>
+              </a:ext>
+            </a:extLst>
+          </p:cNvPr>
+          <p:cNvSpPr/>
+          <p:nvPr/>
+        </p:nvSpPr>
+        <p:spPr>
+          <a:xfrm>
+            <a:off x="2441360" y="4643711"/>
+            <a:ext cx="328474" cy="328062"/>
+          </a:xfrm>
+          <a:prstGeom prst="sun">
+            <a:avLst/>
+          </a:prstGeom>
+          <a:solidFill>
+            <a:srgbClr val="FF0000"/>
+          </a:solidFill>
+          <a:ln>
+            <a:solidFill>
+              <a:srgbClr val="FFC000"/>
+            </a:solidFill>
+          </a:ln>
+        </p:spPr>
+        <p:style>
+          <a:lnRef idx="2">
+            <a:schemeClr val="accent1">
+              <a:shade val="50000"/>
+            </a:schemeClr>
+          </a:lnRef>
+          <a:fillRef idx="1">
+            <a:schemeClr val="accent1"/>
+          </a:fillRef>
+          <a:effectRef idx="0">
+            <a:schemeClr val="accent1"/>
+          </a:effectRef>
+          <a:fontRef idx="minor">
+            <a:schemeClr val="lt1"/>
+          </a:fontRef>
+        </p:style>
+        <p:txBody>
+          <a:bodyPr rtlCol="0" anchor="ctr"/>
+          <a:lstStyle/>
+          <a:p>
+            <a:pPr algn="ctr"/>
+            <a:endParaRPr lang="en-US"/>
+          </a:p>
+        </p:txBody>
+      </p:sp>
+      <p:sp>
+        <p:nvSpPr>
+          <p:cNvPr id="39" name="Up Arrow 38">
+            <a:extLst>
+              <a:ext uri="{FF2B5EF4-FFF2-40B4-BE49-F238E27FC236}">
+                <a16:creationId xmlns:a16="http://schemas.microsoft.com/office/drawing/2014/main" id="{02678C99-E54D-47F4-4CAA-1D1F240B83B7}"/>
+              </a:ext>
+            </a:extLst>
+          </p:cNvPr>
+          <p:cNvSpPr/>
+          <p:nvPr/>
+        </p:nvSpPr>
+        <p:spPr>
+          <a:xfrm rot="10800000">
+            <a:off x="7872280" y="2104766"/>
+            <a:ext cx="158276" cy="3807637"/>
+          </a:xfrm>
+          <a:prstGeom prst="upArrow">
+            <a:avLst/>
+          </a:prstGeom>
+        </p:spPr>
+        <p:style>
+          <a:lnRef idx="3">
+            <a:schemeClr val="lt1"/>
+          </a:lnRef>
+          <a:fillRef idx="1">
+            <a:schemeClr val="accent2"/>
+          </a:fillRef>
+          <a:effectRef idx="1">
+            <a:schemeClr val="accent2"/>
+          </a:effectRef>
+          <a:fontRef idx="minor">
+            <a:schemeClr val="lt1"/>
+          </a:fontRef>
+        </p:style>
+        <p:txBody>
+          <a:bodyPr rtlCol="0" anchor="ctr"/>
+          <a:lstStyle/>
+          <a:p>
+            <a:pPr algn="ctr"/>
+            <a:endParaRPr lang="en-US"/>
+          </a:p>
+        </p:txBody>
+      </p:sp>
+      <p:sp>
+        <p:nvSpPr>
+          <p:cNvPr id="41" name="TextBox 40">
+            <a:extLst>
+              <a:ext uri="{FF2B5EF4-FFF2-40B4-BE49-F238E27FC236}">
+                <a16:creationId xmlns:a16="http://schemas.microsoft.com/office/drawing/2014/main" id="{F27D4230-7471-C638-4A6A-FF74ED32547A}"/>
+              </a:ext>
+            </a:extLst>
+          </p:cNvPr>
+          <p:cNvSpPr txBox="1"/>
+          <p:nvPr/>
+        </p:nvSpPr>
+        <p:spPr>
+          <a:xfrm>
+            <a:off x="7428193" y="1862548"/>
+            <a:ext cx="1104533" cy="276999"/>
+          </a:xfrm>
+          <a:prstGeom prst="rect">
+            <a:avLst/>
+          </a:prstGeom>
+          <a:noFill/>
+        </p:spPr>
+        <p:txBody>
+          <a:bodyPr wrap="none" rtlCol="0">
+            <a:spAutoFit/>
+          </a:bodyPr>
+          <a:lstStyle/>
+          <a:p>
+            <a:r>
+              <a:rPr lang="en-US" sz="1200" dirty="0"/>
+              <a:t>4. System Calls</a:t>
+            </a:r>
+          </a:p>
+        </p:txBody>
+      </p:sp>
+    </p:spTree>
+    <p:extLst>
+      <p:ext uri="{BB962C8B-B14F-4D97-AF65-F5344CB8AC3E}">
+        <p14:creationId xmlns:p14="http://schemas.microsoft.com/office/powerpoint/2010/main" val="144044801"/>
+      </p:ext>
+    </p:extLst>
+  </p:cSld>
+  <p:clrMapOvr>
+    <a:masterClrMapping/>
+  </p:clrMapOvr>
+</p:sld>
+</file>
+
+<file path=ppt/slides/slide15.xml><?xml version="1.0" encoding="utf-8"?>
+<p:sld xmlns:a="http://schemas.openxmlformats.org/drawingml/2006/main" xmlns:r="http://schemas.openxmlformats.org/officeDocument/2006/relationships" xmlns:p="http://schemas.openxmlformats.org/presentationml/2006/main">
+  <p:cSld>
+    <p:spTree>
+      <p:nvGrpSpPr>
+        <p:cNvPr id="1" name=""/>
+        <p:cNvGrpSpPr/>
+        <p:nvPr/>
+      </p:nvGrpSpPr>
+      <p:grpSpPr>
+        <a:xfrm>
+          <a:off x="0" y="0"/>
+          <a:ext cx="0" cy="0"/>
+          <a:chOff x="0" y="0"/>
+          <a:chExt cx="0" cy="0"/>
+        </a:xfrm>
+      </p:grpSpPr>
+      <p:sp>
+        <p:nvSpPr>
           <p:cNvPr id="2" name="TextBox 1">
             <a:extLst>
               <a:ext uri="{FF2B5EF4-FFF2-40B4-BE49-F238E27FC236}">
@@ -15047,7 +16518,80 @@
     </p:spTree>
     <p:extLst>
       <p:ext uri="{BB962C8B-B14F-4D97-AF65-F5344CB8AC3E}">
-        <p14:creationId xmlns:p14="http://schemas.microsoft.com/office/powerpoint/2010/main" val="144044801"/>
+        <p14:creationId xmlns:p14="http://schemas.microsoft.com/office/powerpoint/2010/main" val="2897981531"/>
+      </p:ext>
+    </p:extLst>
+  </p:cSld>
+  <p:clrMapOvr>
+    <a:masterClrMapping/>
+  </p:clrMapOvr>
+</p:sld>
+</file>
+
+<file path=ppt/slides/slide16.xml><?xml version="1.0" encoding="utf-8"?>
+<p:sld xmlns:a="http://schemas.openxmlformats.org/drawingml/2006/main" xmlns:r="http://schemas.openxmlformats.org/officeDocument/2006/relationships" xmlns:p="http://schemas.openxmlformats.org/presentationml/2006/main">
+  <p:cSld>
+    <p:spTree>
+      <p:nvGrpSpPr>
+        <p:cNvPr id="1" name=""/>
+        <p:cNvGrpSpPr/>
+        <p:nvPr/>
+      </p:nvGrpSpPr>
+      <p:grpSpPr>
+        <a:xfrm>
+          <a:off x="0" y="0"/>
+          <a:ext cx="0" cy="0"/>
+          <a:chOff x="0" y="0"/>
+          <a:chExt cx="0" cy="0"/>
+        </a:xfrm>
+      </p:grpSpPr>
+      <p:sp>
+        <p:nvSpPr>
+          <p:cNvPr id="2" name="TextBox 1">
+            <a:extLst>
+              <a:ext uri="{FF2B5EF4-FFF2-40B4-BE49-F238E27FC236}">
+                <a16:creationId xmlns:a16="http://schemas.microsoft.com/office/drawing/2014/main" id="{A99980E2-A3A9-FD4A-9011-9A37E88F5891}"/>
+              </a:ext>
+            </a:extLst>
+          </p:cNvPr>
+          <p:cNvSpPr txBox="1"/>
+          <p:nvPr/>
+        </p:nvSpPr>
+        <p:spPr>
+          <a:xfrm>
+            <a:off x="1872537" y="277843"/>
+            <a:ext cx="8446926" cy="707886"/>
+          </a:xfrm>
+          <a:prstGeom prst="rect">
+            <a:avLst/>
+          </a:prstGeom>
+          <a:noFill/>
+        </p:spPr>
+        <p:txBody>
+          <a:bodyPr wrap="square" rtlCol="0">
+            <a:spAutoFit/>
+          </a:bodyPr>
+          <a:lstStyle/>
+          <a:p>
+            <a:pPr algn="ctr"/>
+            <a:r>
+              <a:rPr lang="en-US" sz="4000" dirty="0">
+                <a:solidFill>
+                  <a:schemeClr val="accent1">
+                    <a:lumMod val="60000"/>
+                    <a:lumOff val="40000"/>
+                  </a:schemeClr>
+                </a:solidFill>
+              </a:rPr>
+              <a:t>RISC-V Trap Machinery</a:t>
+            </a:r>
+          </a:p>
+        </p:txBody>
+      </p:sp>
+    </p:spTree>
+    <p:extLst>
+      <p:ext uri="{BB962C8B-B14F-4D97-AF65-F5344CB8AC3E}">
+        <p14:creationId xmlns:p14="http://schemas.microsoft.com/office/powerpoint/2010/main" val="501874486"/>
       </p:ext>
     </p:extLst>
   </p:cSld>

</xml_diff>

<commit_message>
finish 1. Buffer Cache
</commit_message>
<xml_diff>
--- a/docs/figures/os1.pptx
+++ b/docs/figures/os1.pptx
@@ -5,7 +5,7 @@
     <p:sldMasterId id="2147483648" r:id="rId1"/>
   </p:sldMasterIdLst>
   <p:notesMasterIdLst>
-    <p:notesMasterId r:id="rId18"/>
+    <p:notesMasterId r:id="rId19"/>
   </p:notesMasterIdLst>
   <p:sldIdLst>
     <p:sldId id="331" r:id="rId2"/>
@@ -23,7 +23,8 @@
     <p:sldId id="348" r:id="rId14"/>
     <p:sldId id="347" r:id="rId15"/>
     <p:sldId id="349" r:id="rId16"/>
-    <p:sldId id="350" r:id="rId17"/>
+    <p:sldId id="351" r:id="rId17"/>
+    <p:sldId id="350" r:id="rId18"/>
   </p:sldIdLst>
   <p:sldSz cx="12192000" cy="6858000"/>
   <p:notesSz cx="6858000" cy="9144000"/>
@@ -1134,6 +1135,90 @@
             <a:fld id="{997274CE-51E2-314F-8544-5E91EE33A09F}" type="slidenum">
               <a:rPr lang="en-US" smtClean="0"/>
               <a:t>16</a:t>
+            </a:fld>
+            <a:endParaRPr lang="en-US"/>
+          </a:p>
+        </p:txBody>
+      </p:sp>
+    </p:spTree>
+    <p:extLst>
+      <p:ext uri="{BB962C8B-B14F-4D97-AF65-F5344CB8AC3E}">
+        <p14:creationId xmlns:p14="http://schemas.microsoft.com/office/powerpoint/2010/main" val="661453714"/>
+      </p:ext>
+    </p:extLst>
+  </p:cSld>
+  <p:clrMapOvr>
+    <a:masterClrMapping/>
+  </p:clrMapOvr>
+</p:notes>
+</file>
+
+<file path=ppt/notesSlides/notesSlide17.xml><?xml version="1.0" encoding="utf-8"?>
+<p:notes xmlns:a="http://schemas.openxmlformats.org/drawingml/2006/main" xmlns:r="http://schemas.openxmlformats.org/officeDocument/2006/relationships" xmlns:p="http://schemas.openxmlformats.org/presentationml/2006/main">
+  <p:cSld>
+    <p:spTree>
+      <p:nvGrpSpPr>
+        <p:cNvPr id="1" name=""/>
+        <p:cNvGrpSpPr/>
+        <p:nvPr/>
+      </p:nvGrpSpPr>
+      <p:grpSpPr>
+        <a:xfrm>
+          <a:off x="0" y="0"/>
+          <a:ext cx="0" cy="0"/>
+          <a:chOff x="0" y="0"/>
+          <a:chExt cx="0" cy="0"/>
+        </a:xfrm>
+      </p:grpSpPr>
+      <p:sp>
+        <p:nvSpPr>
+          <p:cNvPr id="2" name="Slide Image Placeholder 1"/>
+          <p:cNvSpPr>
+            <a:spLocks noGrp="1" noRot="1" noChangeAspect="1"/>
+          </p:cNvSpPr>
+          <p:nvPr>
+            <p:ph type="sldImg"/>
+          </p:nvPr>
+        </p:nvSpPr>
+        <p:spPr/>
+      </p:sp>
+      <p:sp>
+        <p:nvSpPr>
+          <p:cNvPr id="3" name="Notes Placeholder 2"/>
+          <p:cNvSpPr>
+            <a:spLocks noGrp="1"/>
+          </p:cNvSpPr>
+          <p:nvPr>
+            <p:ph type="body" idx="1"/>
+          </p:nvPr>
+        </p:nvSpPr>
+        <p:spPr/>
+        <p:txBody>
+          <a:bodyPr/>
+          <a:lstStyle/>
+          <a:p>
+            <a:endParaRPr lang="en-US" dirty="0"/>
+          </a:p>
+        </p:txBody>
+      </p:sp>
+      <p:sp>
+        <p:nvSpPr>
+          <p:cNvPr id="4" name="Slide Number Placeholder 3"/>
+          <p:cNvSpPr>
+            <a:spLocks noGrp="1"/>
+          </p:cNvSpPr>
+          <p:nvPr>
+            <p:ph type="sldNum" sz="quarter" idx="5"/>
+          </p:nvPr>
+        </p:nvSpPr>
+        <p:spPr/>
+        <p:txBody>
+          <a:bodyPr/>
+          <a:lstStyle/>
+          <a:p>
+            <a:fld id="{997274CE-51E2-314F-8544-5E91EE33A09F}" type="slidenum">
+              <a:rPr lang="en-US" smtClean="0"/>
+              <a:t>17</a:t>
             </a:fld>
             <a:endParaRPr lang="en-US"/>
           </a:p>
@@ -16510,7 +16595,1872 @@
                   </a:schemeClr>
                 </a:solidFill>
               </a:rPr>
-              <a:t>RISC-V Trap Machinery</a:t>
+              <a:t>Buffer Cache</a:t>
+            </a:r>
+          </a:p>
+        </p:txBody>
+      </p:sp>
+      <p:sp>
+        <p:nvSpPr>
+          <p:cNvPr id="3" name="Rectangle 2">
+            <a:extLst>
+              <a:ext uri="{FF2B5EF4-FFF2-40B4-BE49-F238E27FC236}">
+                <a16:creationId xmlns:a16="http://schemas.microsoft.com/office/drawing/2014/main" id="{8FCC94B5-34A0-ABC3-9412-813BECF5BB5E}"/>
+              </a:ext>
+            </a:extLst>
+          </p:cNvPr>
+          <p:cNvSpPr/>
+          <p:nvPr/>
+        </p:nvSpPr>
+        <p:spPr>
+          <a:xfrm>
+            <a:off x="5532268" y="5007114"/>
+            <a:ext cx="1127464" cy="707886"/>
+          </a:xfrm>
+          <a:prstGeom prst="rect">
+            <a:avLst/>
+          </a:prstGeom>
+          <a:solidFill>
+            <a:srgbClr val="002060"/>
+          </a:solidFill>
+        </p:spPr>
+        <p:style>
+          <a:lnRef idx="2">
+            <a:schemeClr val="accent1">
+              <a:shade val="50000"/>
+            </a:schemeClr>
+          </a:lnRef>
+          <a:fillRef idx="1">
+            <a:schemeClr val="accent1"/>
+          </a:fillRef>
+          <a:effectRef idx="0">
+            <a:schemeClr val="accent1"/>
+          </a:effectRef>
+          <a:fontRef idx="minor">
+            <a:schemeClr val="lt1"/>
+          </a:fontRef>
+        </p:style>
+        <p:txBody>
+          <a:bodyPr rtlCol="0" anchor="ctr"/>
+          <a:lstStyle/>
+          <a:p>
+            <a:pPr algn="ctr"/>
+            <a:endParaRPr lang="en-US" dirty="0"/>
+          </a:p>
+        </p:txBody>
+      </p:sp>
+      <p:sp>
+        <p:nvSpPr>
+          <p:cNvPr id="4" name="TextBox 3">
+            <a:extLst>
+              <a:ext uri="{FF2B5EF4-FFF2-40B4-BE49-F238E27FC236}">
+                <a16:creationId xmlns:a16="http://schemas.microsoft.com/office/drawing/2014/main" id="{39616A5C-39AF-2FB7-6226-AD3C66552D64}"/>
+              </a:ext>
+            </a:extLst>
+          </p:cNvPr>
+          <p:cNvSpPr txBox="1"/>
+          <p:nvPr/>
+        </p:nvSpPr>
+        <p:spPr>
+          <a:xfrm>
+            <a:off x="5637320" y="5007114"/>
+            <a:ext cx="1228221" cy="276999"/>
+          </a:xfrm>
+          <a:prstGeom prst="rect">
+            <a:avLst/>
+          </a:prstGeom>
+          <a:noFill/>
+        </p:spPr>
+        <p:txBody>
+          <a:bodyPr wrap="square" rtlCol="0">
+            <a:spAutoFit/>
+          </a:bodyPr>
+          <a:lstStyle/>
+          <a:p>
+            <a:r>
+              <a:rPr lang="en-US" sz="1200" b="1" dirty="0"/>
+              <a:t>Head block</a:t>
+            </a:r>
+          </a:p>
+        </p:txBody>
+      </p:sp>
+      <p:sp>
+        <p:nvSpPr>
+          <p:cNvPr id="5" name="Rectangle 4">
+            <a:extLst>
+              <a:ext uri="{FF2B5EF4-FFF2-40B4-BE49-F238E27FC236}">
+                <a16:creationId xmlns:a16="http://schemas.microsoft.com/office/drawing/2014/main" id="{36EE6BC4-D0FA-8908-93AB-AFF4DCB6C7FD}"/>
+              </a:ext>
+            </a:extLst>
+          </p:cNvPr>
+          <p:cNvSpPr/>
+          <p:nvPr/>
+        </p:nvSpPr>
+        <p:spPr>
+          <a:xfrm>
+            <a:off x="5532268" y="6109425"/>
+            <a:ext cx="1127464" cy="335764"/>
+          </a:xfrm>
+          <a:prstGeom prst="rect">
+            <a:avLst/>
+          </a:prstGeom>
+          <a:solidFill>
+            <a:srgbClr val="002060"/>
+          </a:solidFill>
+        </p:spPr>
+        <p:style>
+          <a:lnRef idx="2">
+            <a:schemeClr val="accent1">
+              <a:shade val="50000"/>
+            </a:schemeClr>
+          </a:lnRef>
+          <a:fillRef idx="1">
+            <a:schemeClr val="accent1"/>
+          </a:fillRef>
+          <a:effectRef idx="0">
+            <a:schemeClr val="accent1"/>
+          </a:effectRef>
+          <a:fontRef idx="minor">
+            <a:schemeClr val="lt1"/>
+          </a:fontRef>
+        </p:style>
+        <p:txBody>
+          <a:bodyPr rtlCol="0" anchor="ctr"/>
+          <a:lstStyle/>
+          <a:p>
+            <a:pPr algn="ctr"/>
+            <a:endParaRPr lang="en-US" dirty="0"/>
+          </a:p>
+        </p:txBody>
+      </p:sp>
+      <p:sp>
+        <p:nvSpPr>
+          <p:cNvPr id="6" name="TextBox 5">
+            <a:extLst>
+              <a:ext uri="{FF2B5EF4-FFF2-40B4-BE49-F238E27FC236}">
+                <a16:creationId xmlns:a16="http://schemas.microsoft.com/office/drawing/2014/main" id="{4E21F53A-5A1F-6DCB-8078-F0306BA5E8F0}"/>
+              </a:ext>
+            </a:extLst>
+          </p:cNvPr>
+          <p:cNvSpPr txBox="1"/>
+          <p:nvPr/>
+        </p:nvSpPr>
+        <p:spPr>
+          <a:xfrm>
+            <a:off x="5780843" y="6138807"/>
+            <a:ext cx="1228221" cy="276999"/>
+          </a:xfrm>
+          <a:prstGeom prst="rect">
+            <a:avLst/>
+          </a:prstGeom>
+          <a:noFill/>
+        </p:spPr>
+        <p:txBody>
+          <a:bodyPr wrap="square" rtlCol="0">
+            <a:spAutoFit/>
+          </a:bodyPr>
+          <a:lstStyle/>
+          <a:p>
+            <a:r>
+              <a:rPr lang="en-US" sz="1200" b="1" dirty="0"/>
+              <a:t>bcache</a:t>
+            </a:r>
+          </a:p>
+        </p:txBody>
+      </p:sp>
+      <p:cxnSp>
+        <p:nvCxnSpPr>
+          <p:cNvPr id="8" name="Straight Arrow Connector 7">
+            <a:extLst>
+              <a:ext uri="{FF2B5EF4-FFF2-40B4-BE49-F238E27FC236}">
+                <a16:creationId xmlns:a16="http://schemas.microsoft.com/office/drawing/2014/main" id="{B1908804-2A50-92A8-8B0F-BAA0F9DD2D93}"/>
+              </a:ext>
+            </a:extLst>
+          </p:cNvPr>
+          <p:cNvCxnSpPr>
+            <a:stCxn id="5" idx="0"/>
+            <a:endCxn id="3" idx="2"/>
+          </p:cNvCxnSpPr>
+          <p:nvPr/>
+        </p:nvCxnSpPr>
+        <p:spPr>
+          <a:xfrm flipV="1">
+            <a:off x="6096000" y="5715000"/>
+            <a:ext cx="0" cy="394425"/>
+          </a:xfrm>
+          <a:prstGeom prst="straightConnector1">
+            <a:avLst/>
+          </a:prstGeom>
+          <a:ln>
+            <a:tailEnd type="triangle"/>
+          </a:ln>
+        </p:spPr>
+        <p:style>
+          <a:lnRef idx="3">
+            <a:schemeClr val="accent1"/>
+          </a:lnRef>
+          <a:fillRef idx="0">
+            <a:schemeClr val="accent1"/>
+          </a:fillRef>
+          <a:effectRef idx="2">
+            <a:schemeClr val="accent1"/>
+          </a:effectRef>
+          <a:fontRef idx="minor">
+            <a:schemeClr val="tx1"/>
+          </a:fontRef>
+        </p:style>
+      </p:cxnSp>
+      <p:sp>
+        <p:nvSpPr>
+          <p:cNvPr id="10" name="TextBox 9">
+            <a:extLst>
+              <a:ext uri="{FF2B5EF4-FFF2-40B4-BE49-F238E27FC236}">
+                <a16:creationId xmlns:a16="http://schemas.microsoft.com/office/drawing/2014/main" id="{865D3F47-F326-940F-13D6-96ACE4D7ABB7}"/>
+              </a:ext>
+            </a:extLst>
+          </p:cNvPr>
+          <p:cNvSpPr txBox="1"/>
+          <p:nvPr/>
+        </p:nvSpPr>
+        <p:spPr>
+          <a:xfrm>
+            <a:off x="6045621" y="5777256"/>
+            <a:ext cx="1228221" cy="276999"/>
+          </a:xfrm>
+          <a:prstGeom prst="rect">
+            <a:avLst/>
+          </a:prstGeom>
+          <a:noFill/>
+        </p:spPr>
+        <p:txBody>
+          <a:bodyPr wrap="square" rtlCol="0">
+            <a:spAutoFit/>
+          </a:bodyPr>
+          <a:lstStyle/>
+          <a:p>
+            <a:r>
+              <a:rPr lang="en-US" sz="1200" b="1" dirty="0"/>
+              <a:t>head</a:t>
+            </a:r>
+          </a:p>
+        </p:txBody>
+      </p:sp>
+      <p:sp>
+        <p:nvSpPr>
+          <p:cNvPr id="11" name="Rectangle 10">
+            <a:extLst>
+              <a:ext uri="{FF2B5EF4-FFF2-40B4-BE49-F238E27FC236}">
+                <a16:creationId xmlns:a16="http://schemas.microsoft.com/office/drawing/2014/main" id="{F92866AA-CFE2-CB41-8C98-0434D74938DA}"/>
+              </a:ext>
+            </a:extLst>
+          </p:cNvPr>
+          <p:cNvSpPr/>
+          <p:nvPr/>
+        </p:nvSpPr>
+        <p:spPr>
+          <a:xfrm rot="19904949">
+            <a:off x="7109447" y="4557772"/>
+            <a:ext cx="1127464" cy="707886"/>
+          </a:xfrm>
+          <a:prstGeom prst="rect">
+            <a:avLst/>
+          </a:prstGeom>
+          <a:solidFill>
+            <a:schemeClr val="accent2"/>
+          </a:solidFill>
+        </p:spPr>
+        <p:style>
+          <a:lnRef idx="2">
+            <a:schemeClr val="accent1">
+              <a:shade val="50000"/>
+            </a:schemeClr>
+          </a:lnRef>
+          <a:fillRef idx="1">
+            <a:schemeClr val="accent1"/>
+          </a:fillRef>
+          <a:effectRef idx="0">
+            <a:schemeClr val="accent1"/>
+          </a:effectRef>
+          <a:fontRef idx="minor">
+            <a:schemeClr val="lt1"/>
+          </a:fontRef>
+        </p:style>
+        <p:txBody>
+          <a:bodyPr rtlCol="0" anchor="ctr"/>
+          <a:lstStyle/>
+          <a:p>
+            <a:pPr algn="ctr"/>
+            <a:r>
+              <a:rPr lang="en-US" dirty="0">
+                <a:solidFill>
+                  <a:schemeClr val="bg1"/>
+                </a:solidFill>
+              </a:rPr>
+              <a:t>Block 1</a:t>
+            </a:r>
+          </a:p>
+        </p:txBody>
+      </p:sp>
+      <p:sp>
+        <p:nvSpPr>
+          <p:cNvPr id="12" name="Rectangle 11">
+            <a:extLst>
+              <a:ext uri="{FF2B5EF4-FFF2-40B4-BE49-F238E27FC236}">
+                <a16:creationId xmlns:a16="http://schemas.microsoft.com/office/drawing/2014/main" id="{683636D8-012A-79C9-5546-D22B688A48C6}"/>
+              </a:ext>
+            </a:extLst>
+          </p:cNvPr>
+          <p:cNvSpPr/>
+          <p:nvPr/>
+        </p:nvSpPr>
+        <p:spPr>
+          <a:xfrm rot="1836984">
+            <a:off x="3953801" y="4544684"/>
+            <a:ext cx="1127464" cy="707886"/>
+          </a:xfrm>
+          <a:prstGeom prst="rect">
+            <a:avLst/>
+          </a:prstGeom>
+          <a:solidFill>
+            <a:srgbClr val="FFFF00"/>
+          </a:solidFill>
+        </p:spPr>
+        <p:style>
+          <a:lnRef idx="2">
+            <a:schemeClr val="accent1">
+              <a:shade val="50000"/>
+            </a:schemeClr>
+          </a:lnRef>
+          <a:fillRef idx="1">
+            <a:schemeClr val="accent1"/>
+          </a:fillRef>
+          <a:effectRef idx="0">
+            <a:schemeClr val="accent1"/>
+          </a:effectRef>
+          <a:fontRef idx="minor">
+            <a:schemeClr val="lt1"/>
+          </a:fontRef>
+        </p:style>
+        <p:txBody>
+          <a:bodyPr rtlCol="0" anchor="ctr"/>
+          <a:lstStyle/>
+          <a:p>
+            <a:pPr algn="ctr"/>
+            <a:r>
+              <a:rPr lang="en-US" dirty="0">
+                <a:solidFill>
+                  <a:schemeClr val="bg1"/>
+                </a:solidFill>
+              </a:rPr>
+              <a:t>Block n+2</a:t>
+            </a:r>
+          </a:p>
+        </p:txBody>
+      </p:sp>
+      <p:sp>
+        <p:nvSpPr>
+          <p:cNvPr id="13" name="Rectangle 12">
+            <a:extLst>
+              <a:ext uri="{FF2B5EF4-FFF2-40B4-BE49-F238E27FC236}">
+                <a16:creationId xmlns:a16="http://schemas.microsoft.com/office/drawing/2014/main" id="{9B091E64-9C6F-27A2-405B-EAE6C40D9E83}"/>
+              </a:ext>
+            </a:extLst>
+          </p:cNvPr>
+          <p:cNvSpPr/>
+          <p:nvPr/>
+        </p:nvSpPr>
+        <p:spPr>
+          <a:xfrm rot="3569557">
+            <a:off x="2697059" y="3362971"/>
+            <a:ext cx="1127464" cy="707886"/>
+          </a:xfrm>
+          <a:prstGeom prst="rect">
+            <a:avLst/>
+          </a:prstGeom>
+          <a:solidFill>
+            <a:srgbClr val="00B0F0"/>
+          </a:solidFill>
+        </p:spPr>
+        <p:style>
+          <a:lnRef idx="2">
+            <a:schemeClr val="accent1">
+              <a:shade val="50000"/>
+            </a:schemeClr>
+          </a:lnRef>
+          <a:fillRef idx="1">
+            <a:schemeClr val="accent1"/>
+          </a:fillRef>
+          <a:effectRef idx="0">
+            <a:schemeClr val="accent1"/>
+          </a:effectRef>
+          <a:fontRef idx="minor">
+            <a:schemeClr val="lt1"/>
+          </a:fontRef>
+        </p:style>
+        <p:txBody>
+          <a:bodyPr rtlCol="0" anchor="ctr"/>
+          <a:lstStyle/>
+          <a:p>
+            <a:pPr algn="ctr"/>
+            <a:r>
+              <a:rPr lang="en-US" dirty="0">
+                <a:solidFill>
+                  <a:schemeClr val="bg1"/>
+                </a:solidFill>
+              </a:rPr>
+              <a:t>Block n+1</a:t>
+            </a:r>
+          </a:p>
+        </p:txBody>
+      </p:sp>
+      <p:sp>
+        <p:nvSpPr>
+          <p:cNvPr id="16" name="Rectangle 15">
+            <a:extLst>
+              <a:ext uri="{FF2B5EF4-FFF2-40B4-BE49-F238E27FC236}">
+                <a16:creationId xmlns:a16="http://schemas.microsoft.com/office/drawing/2014/main" id="{3ECA9F1C-6674-59AB-A009-173EEDD7E971}"/>
+              </a:ext>
+            </a:extLst>
+          </p:cNvPr>
+          <p:cNvSpPr/>
+          <p:nvPr/>
+        </p:nvSpPr>
+        <p:spPr>
+          <a:xfrm rot="20036567">
+            <a:off x="3355017" y="1739900"/>
+            <a:ext cx="1127464" cy="707886"/>
+          </a:xfrm>
+          <a:prstGeom prst="rect">
+            <a:avLst/>
+          </a:prstGeom>
+          <a:solidFill>
+            <a:srgbClr val="00B0F0"/>
+          </a:solidFill>
+        </p:spPr>
+        <p:style>
+          <a:lnRef idx="2">
+            <a:schemeClr val="accent1">
+              <a:shade val="50000"/>
+            </a:schemeClr>
+          </a:lnRef>
+          <a:fillRef idx="1">
+            <a:schemeClr val="accent1"/>
+          </a:fillRef>
+          <a:effectRef idx="0">
+            <a:schemeClr val="accent1"/>
+          </a:effectRef>
+          <a:fontRef idx="minor">
+            <a:schemeClr val="lt1"/>
+          </a:fontRef>
+        </p:style>
+        <p:txBody>
+          <a:bodyPr rtlCol="0" anchor="ctr"/>
+          <a:lstStyle/>
+          <a:p>
+            <a:pPr algn="ctr"/>
+            <a:r>
+              <a:rPr lang="en-US" dirty="0">
+                <a:solidFill>
+                  <a:schemeClr val="bg1"/>
+                </a:solidFill>
+              </a:rPr>
+              <a:t>Block n</a:t>
+            </a:r>
+          </a:p>
+        </p:txBody>
+      </p:sp>
+      <p:sp>
+        <p:nvSpPr>
+          <p:cNvPr id="17" name="Rectangle 16">
+            <a:extLst>
+              <a:ext uri="{FF2B5EF4-FFF2-40B4-BE49-F238E27FC236}">
+                <a16:creationId xmlns:a16="http://schemas.microsoft.com/office/drawing/2014/main" id="{A0DE90F0-2D3D-6BA8-A8D1-65FCC58B7867}"/>
+              </a:ext>
+            </a:extLst>
+          </p:cNvPr>
+          <p:cNvSpPr/>
+          <p:nvPr/>
+        </p:nvSpPr>
+        <p:spPr>
+          <a:xfrm rot="18137722">
+            <a:off x="8388786" y="3363821"/>
+            <a:ext cx="1127464" cy="707886"/>
+          </a:xfrm>
+          <a:prstGeom prst="rect">
+            <a:avLst/>
+          </a:prstGeom>
+          <a:solidFill>
+            <a:srgbClr val="00B0F0"/>
+          </a:solidFill>
+        </p:spPr>
+        <p:style>
+          <a:lnRef idx="2">
+            <a:schemeClr val="accent1">
+              <a:shade val="50000"/>
+            </a:schemeClr>
+          </a:lnRef>
+          <a:fillRef idx="1">
+            <a:schemeClr val="accent1"/>
+          </a:fillRef>
+          <a:effectRef idx="0">
+            <a:schemeClr val="accent1"/>
+          </a:effectRef>
+          <a:fontRef idx="minor">
+            <a:schemeClr val="lt1"/>
+          </a:fontRef>
+        </p:style>
+        <p:txBody>
+          <a:bodyPr rtlCol="0" anchor="ctr"/>
+          <a:lstStyle/>
+          <a:p>
+            <a:pPr algn="ctr"/>
+            <a:r>
+              <a:rPr lang="en-US" dirty="0">
+                <a:solidFill>
+                  <a:schemeClr val="bg1"/>
+                </a:solidFill>
+              </a:rPr>
+              <a:t>Block 2</a:t>
+            </a:r>
+          </a:p>
+        </p:txBody>
+      </p:sp>
+      <p:sp>
+        <p:nvSpPr>
+          <p:cNvPr id="18" name="Rectangle 17">
+            <a:extLst>
+              <a:ext uri="{FF2B5EF4-FFF2-40B4-BE49-F238E27FC236}">
+                <a16:creationId xmlns:a16="http://schemas.microsoft.com/office/drawing/2014/main" id="{4FC9E708-996A-BC5E-7987-FA96F5B09363}"/>
+              </a:ext>
+            </a:extLst>
+          </p:cNvPr>
+          <p:cNvSpPr/>
+          <p:nvPr/>
+        </p:nvSpPr>
+        <p:spPr>
+          <a:xfrm rot="1585064">
+            <a:off x="7709412" y="1757068"/>
+            <a:ext cx="1127464" cy="707886"/>
+          </a:xfrm>
+          <a:prstGeom prst="rect">
+            <a:avLst/>
+          </a:prstGeom>
+          <a:solidFill>
+            <a:srgbClr val="00B0F0"/>
+          </a:solidFill>
+        </p:spPr>
+        <p:style>
+          <a:lnRef idx="2">
+            <a:schemeClr val="accent1">
+              <a:shade val="50000"/>
+            </a:schemeClr>
+          </a:lnRef>
+          <a:fillRef idx="1">
+            <a:schemeClr val="accent1"/>
+          </a:fillRef>
+          <a:effectRef idx="0">
+            <a:schemeClr val="accent1"/>
+          </a:effectRef>
+          <a:fontRef idx="minor">
+            <a:schemeClr val="lt1"/>
+          </a:fontRef>
+        </p:style>
+        <p:txBody>
+          <a:bodyPr rtlCol="0" anchor="ctr"/>
+          <a:lstStyle/>
+          <a:p>
+            <a:pPr algn="ctr"/>
+            <a:r>
+              <a:rPr lang="en-US" dirty="0">
+                <a:solidFill>
+                  <a:schemeClr val="bg1"/>
+                </a:solidFill>
+              </a:rPr>
+              <a:t>Block 3</a:t>
+            </a:r>
+          </a:p>
+        </p:txBody>
+      </p:sp>
+      <p:cxnSp>
+        <p:nvCxnSpPr>
+          <p:cNvPr id="27" name="Straight Arrow Connector 26">
+            <a:extLst>
+              <a:ext uri="{FF2B5EF4-FFF2-40B4-BE49-F238E27FC236}">
+                <a16:creationId xmlns:a16="http://schemas.microsoft.com/office/drawing/2014/main" id="{61D5AF6A-D5D3-C7A7-54EF-F4397281B9C4}"/>
+              </a:ext>
+            </a:extLst>
+          </p:cNvPr>
+          <p:cNvCxnSpPr>
+            <a:cxnSpLocks/>
+          </p:cNvCxnSpPr>
+          <p:nvPr/>
+        </p:nvCxnSpPr>
+        <p:spPr>
+          <a:xfrm flipV="1">
+            <a:off x="6657317" y="4997188"/>
+            <a:ext cx="435941" cy="232630"/>
+          </a:xfrm>
+          <a:prstGeom prst="straightConnector1">
+            <a:avLst/>
+          </a:prstGeom>
+          <a:ln>
+            <a:tailEnd type="triangle"/>
+          </a:ln>
+        </p:spPr>
+        <p:style>
+          <a:lnRef idx="3">
+            <a:schemeClr val="accent5"/>
+          </a:lnRef>
+          <a:fillRef idx="0">
+            <a:schemeClr val="accent5"/>
+          </a:fillRef>
+          <a:effectRef idx="2">
+            <a:schemeClr val="accent5"/>
+          </a:effectRef>
+          <a:fontRef idx="minor">
+            <a:schemeClr val="tx1"/>
+          </a:fontRef>
+        </p:style>
+      </p:cxnSp>
+      <p:cxnSp>
+        <p:nvCxnSpPr>
+          <p:cNvPr id="29" name="Straight Arrow Connector 28">
+            <a:extLst>
+              <a:ext uri="{FF2B5EF4-FFF2-40B4-BE49-F238E27FC236}">
+                <a16:creationId xmlns:a16="http://schemas.microsoft.com/office/drawing/2014/main" id="{DF43B010-AC03-2A44-1689-21838BE8C54C}"/>
+              </a:ext>
+            </a:extLst>
+          </p:cNvPr>
+          <p:cNvCxnSpPr>
+            <a:cxnSpLocks/>
+          </p:cNvCxnSpPr>
+          <p:nvPr/>
+        </p:nvCxnSpPr>
+        <p:spPr>
+          <a:xfrm flipH="1">
+            <a:off x="6657317" y="5308152"/>
+            <a:ext cx="616525" cy="312436"/>
+          </a:xfrm>
+          <a:prstGeom prst="straightConnector1">
+            <a:avLst/>
+          </a:prstGeom>
+          <a:ln>
+            <a:tailEnd type="triangle"/>
+          </a:ln>
+        </p:spPr>
+        <p:style>
+          <a:lnRef idx="3">
+            <a:schemeClr val="accent4"/>
+          </a:lnRef>
+          <a:fillRef idx="0">
+            <a:schemeClr val="accent4"/>
+          </a:fillRef>
+          <a:effectRef idx="2">
+            <a:schemeClr val="accent4"/>
+          </a:effectRef>
+          <a:fontRef idx="minor">
+            <a:schemeClr val="tx1"/>
+          </a:fontRef>
+        </p:style>
+      </p:cxnSp>
+      <p:cxnSp>
+        <p:nvCxnSpPr>
+          <p:cNvPr id="30" name="Straight Arrow Connector 29">
+            <a:extLst>
+              <a:ext uri="{FF2B5EF4-FFF2-40B4-BE49-F238E27FC236}">
+                <a16:creationId xmlns:a16="http://schemas.microsoft.com/office/drawing/2014/main" id="{AAB801E8-F700-DBCC-A646-7E734EB177A4}"/>
+              </a:ext>
+            </a:extLst>
+          </p:cNvPr>
+          <p:cNvCxnSpPr>
+            <a:cxnSpLocks/>
+          </p:cNvCxnSpPr>
+          <p:nvPr/>
+        </p:nvCxnSpPr>
+        <p:spPr>
+          <a:xfrm flipH="1" flipV="1">
+            <a:off x="4860381" y="5371759"/>
+            <a:ext cx="671886" cy="265561"/>
+          </a:xfrm>
+          <a:prstGeom prst="straightConnector1">
+            <a:avLst/>
+          </a:prstGeom>
+          <a:ln>
+            <a:tailEnd type="triangle"/>
+          </a:ln>
+        </p:spPr>
+        <p:style>
+          <a:lnRef idx="3">
+            <a:schemeClr val="accent4"/>
+          </a:lnRef>
+          <a:fillRef idx="0">
+            <a:schemeClr val="accent4"/>
+          </a:fillRef>
+          <a:effectRef idx="2">
+            <a:schemeClr val="accent4"/>
+          </a:effectRef>
+          <a:fontRef idx="minor">
+            <a:schemeClr val="tx1"/>
+          </a:fontRef>
+        </p:style>
+      </p:cxnSp>
+      <p:cxnSp>
+        <p:nvCxnSpPr>
+          <p:cNvPr id="32" name="Straight Arrow Connector 31">
+            <a:extLst>
+              <a:ext uri="{FF2B5EF4-FFF2-40B4-BE49-F238E27FC236}">
+                <a16:creationId xmlns:a16="http://schemas.microsoft.com/office/drawing/2014/main" id="{D3D341C7-FBB0-5960-C0A4-363D32DB21C7}"/>
+              </a:ext>
+            </a:extLst>
+          </p:cNvPr>
+          <p:cNvCxnSpPr>
+            <a:cxnSpLocks/>
+          </p:cNvCxnSpPr>
+          <p:nvPr/>
+        </p:nvCxnSpPr>
+        <p:spPr>
+          <a:xfrm>
+            <a:off x="5068848" y="5030756"/>
+            <a:ext cx="462932" cy="194014"/>
+          </a:xfrm>
+          <a:prstGeom prst="straightConnector1">
+            <a:avLst/>
+          </a:prstGeom>
+          <a:ln>
+            <a:tailEnd type="triangle"/>
+          </a:ln>
+        </p:spPr>
+        <p:style>
+          <a:lnRef idx="3">
+            <a:schemeClr val="accent5"/>
+          </a:lnRef>
+          <a:fillRef idx="0">
+            <a:schemeClr val="accent5"/>
+          </a:fillRef>
+          <a:effectRef idx="2">
+            <a:schemeClr val="accent5"/>
+          </a:effectRef>
+          <a:fontRef idx="minor">
+            <a:schemeClr val="tx1"/>
+          </a:fontRef>
+        </p:style>
+      </p:cxnSp>
+      <p:cxnSp>
+        <p:nvCxnSpPr>
+          <p:cNvPr id="34" name="Straight Arrow Connector 33">
+            <a:extLst>
+              <a:ext uri="{FF2B5EF4-FFF2-40B4-BE49-F238E27FC236}">
+                <a16:creationId xmlns:a16="http://schemas.microsoft.com/office/drawing/2014/main" id="{26320E25-2694-1CFF-C0AC-72BCA372C98D}"/>
+              </a:ext>
+            </a:extLst>
+          </p:cNvPr>
+          <p:cNvCxnSpPr>
+            <a:cxnSpLocks/>
+          </p:cNvCxnSpPr>
+          <p:nvPr/>
+        </p:nvCxnSpPr>
+        <p:spPr>
+          <a:xfrm flipV="1">
+            <a:off x="8059395" y="4046174"/>
+            <a:ext cx="421422" cy="463353"/>
+          </a:xfrm>
+          <a:prstGeom prst="straightConnector1">
+            <a:avLst/>
+          </a:prstGeom>
+          <a:ln>
+            <a:tailEnd type="triangle"/>
+          </a:ln>
+        </p:spPr>
+        <p:style>
+          <a:lnRef idx="3">
+            <a:schemeClr val="accent5"/>
+          </a:lnRef>
+          <a:fillRef idx="0">
+            <a:schemeClr val="accent5"/>
+          </a:fillRef>
+          <a:effectRef idx="2">
+            <a:schemeClr val="accent5"/>
+          </a:effectRef>
+          <a:fontRef idx="minor">
+            <a:schemeClr val="tx1"/>
+          </a:fontRef>
+        </p:style>
+      </p:cxnSp>
+      <p:cxnSp>
+        <p:nvCxnSpPr>
+          <p:cNvPr id="41" name="Straight Arrow Connector 40">
+            <a:extLst>
+              <a:ext uri="{FF2B5EF4-FFF2-40B4-BE49-F238E27FC236}">
+                <a16:creationId xmlns:a16="http://schemas.microsoft.com/office/drawing/2014/main" id="{C8E328EC-3E83-B92F-BBBD-293756C991DE}"/>
+              </a:ext>
+            </a:extLst>
+          </p:cNvPr>
+          <p:cNvCxnSpPr>
+            <a:cxnSpLocks/>
+          </p:cNvCxnSpPr>
+          <p:nvPr/>
+        </p:nvCxnSpPr>
+        <p:spPr>
+          <a:xfrm flipH="1">
+            <a:off x="8259333" y="4242431"/>
+            <a:ext cx="499382" cy="566638"/>
+          </a:xfrm>
+          <a:prstGeom prst="straightConnector1">
+            <a:avLst/>
+          </a:prstGeom>
+          <a:ln>
+            <a:tailEnd type="triangle"/>
+          </a:ln>
+        </p:spPr>
+        <p:style>
+          <a:lnRef idx="3">
+            <a:schemeClr val="accent4"/>
+          </a:lnRef>
+          <a:fillRef idx="0">
+            <a:schemeClr val="accent4"/>
+          </a:fillRef>
+          <a:effectRef idx="2">
+            <a:schemeClr val="accent4"/>
+          </a:effectRef>
+          <a:fontRef idx="minor">
+            <a:schemeClr val="tx1"/>
+          </a:fontRef>
+        </p:style>
+      </p:cxnSp>
+      <p:cxnSp>
+        <p:nvCxnSpPr>
+          <p:cNvPr id="57" name="Straight Arrow Connector 56">
+            <a:extLst>
+              <a:ext uri="{FF2B5EF4-FFF2-40B4-BE49-F238E27FC236}">
+                <a16:creationId xmlns:a16="http://schemas.microsoft.com/office/drawing/2014/main" id="{F95AD88F-FBAF-9D69-685A-50ED77FC6090}"/>
+              </a:ext>
+            </a:extLst>
+          </p:cNvPr>
+          <p:cNvCxnSpPr>
+            <a:cxnSpLocks/>
+            <a:endCxn id="18" idx="3"/>
+          </p:cNvCxnSpPr>
+          <p:nvPr/>
+        </p:nvCxnSpPr>
+        <p:spPr>
+          <a:xfrm flipH="1" flipV="1">
+            <a:off x="8778008" y="2361822"/>
+            <a:ext cx="430885" cy="874471"/>
+          </a:xfrm>
+          <a:prstGeom prst="straightConnector1">
+            <a:avLst/>
+          </a:prstGeom>
+          <a:ln>
+            <a:tailEnd type="triangle"/>
+          </a:ln>
+        </p:spPr>
+        <p:style>
+          <a:lnRef idx="3">
+            <a:schemeClr val="accent5"/>
+          </a:lnRef>
+          <a:fillRef idx="0">
+            <a:schemeClr val="accent5"/>
+          </a:fillRef>
+          <a:effectRef idx="2">
+            <a:schemeClr val="accent5"/>
+          </a:effectRef>
+          <a:fontRef idx="minor">
+            <a:schemeClr val="tx1"/>
+          </a:fontRef>
+        </p:style>
+      </p:cxnSp>
+      <p:cxnSp>
+        <p:nvCxnSpPr>
+          <p:cNvPr id="61" name="Straight Arrow Connector 60">
+            <a:extLst>
+              <a:ext uri="{FF2B5EF4-FFF2-40B4-BE49-F238E27FC236}">
+                <a16:creationId xmlns:a16="http://schemas.microsoft.com/office/drawing/2014/main" id="{1492CC71-B5B9-8112-B517-FE09DA5F62E4}"/>
+              </a:ext>
+            </a:extLst>
+          </p:cNvPr>
+          <p:cNvCxnSpPr>
+            <a:cxnSpLocks/>
+          </p:cNvCxnSpPr>
+          <p:nvPr/>
+        </p:nvCxnSpPr>
+        <p:spPr>
+          <a:xfrm>
+            <a:off x="8930995" y="2041452"/>
+            <a:ext cx="636748" cy="1387548"/>
+          </a:xfrm>
+          <a:prstGeom prst="straightConnector1">
+            <a:avLst/>
+          </a:prstGeom>
+          <a:ln>
+            <a:tailEnd type="triangle"/>
+          </a:ln>
+        </p:spPr>
+        <p:style>
+          <a:lnRef idx="3">
+            <a:schemeClr val="accent4"/>
+          </a:lnRef>
+          <a:fillRef idx="0">
+            <a:schemeClr val="accent4"/>
+          </a:fillRef>
+          <a:effectRef idx="2">
+            <a:schemeClr val="accent4"/>
+          </a:effectRef>
+          <a:fontRef idx="minor">
+            <a:schemeClr val="tx1"/>
+          </a:fontRef>
+        </p:style>
+      </p:cxnSp>
+      <p:cxnSp>
+        <p:nvCxnSpPr>
+          <p:cNvPr id="67" name="Straight Arrow Connector 66">
+            <a:extLst>
+              <a:ext uri="{FF2B5EF4-FFF2-40B4-BE49-F238E27FC236}">
+                <a16:creationId xmlns:a16="http://schemas.microsoft.com/office/drawing/2014/main" id="{74DDE0F5-386F-AD64-E872-1AD1B31C1CEE}"/>
+              </a:ext>
+            </a:extLst>
+          </p:cNvPr>
+          <p:cNvCxnSpPr>
+            <a:cxnSpLocks/>
+          </p:cNvCxnSpPr>
+          <p:nvPr/>
+        </p:nvCxnSpPr>
+        <p:spPr>
+          <a:xfrm>
+            <a:off x="3621547" y="4118346"/>
+            <a:ext cx="502648" cy="391181"/>
+          </a:xfrm>
+          <a:prstGeom prst="straightConnector1">
+            <a:avLst/>
+          </a:prstGeom>
+          <a:ln>
+            <a:tailEnd type="triangle"/>
+          </a:ln>
+        </p:spPr>
+        <p:style>
+          <a:lnRef idx="3">
+            <a:schemeClr val="accent5"/>
+          </a:lnRef>
+          <a:fillRef idx="0">
+            <a:schemeClr val="accent5"/>
+          </a:fillRef>
+          <a:effectRef idx="2">
+            <a:schemeClr val="accent5"/>
+          </a:effectRef>
+          <a:fontRef idx="minor">
+            <a:schemeClr val="tx1"/>
+          </a:fontRef>
+        </p:style>
+      </p:cxnSp>
+      <p:cxnSp>
+        <p:nvCxnSpPr>
+          <p:cNvPr id="70" name="Straight Arrow Connector 69">
+            <a:extLst>
+              <a:ext uri="{FF2B5EF4-FFF2-40B4-BE49-F238E27FC236}">
+                <a16:creationId xmlns:a16="http://schemas.microsoft.com/office/drawing/2014/main" id="{C7685426-4DCF-DD48-6687-19516C06FBC1}"/>
+              </a:ext>
+            </a:extLst>
+          </p:cNvPr>
+          <p:cNvCxnSpPr>
+            <a:cxnSpLocks/>
+          </p:cNvCxnSpPr>
+          <p:nvPr/>
+        </p:nvCxnSpPr>
+        <p:spPr>
+          <a:xfrm flipH="1" flipV="1">
+            <a:off x="3325801" y="4298327"/>
+            <a:ext cx="641134" cy="462359"/>
+          </a:xfrm>
+          <a:prstGeom prst="straightConnector1">
+            <a:avLst/>
+          </a:prstGeom>
+          <a:ln>
+            <a:tailEnd type="triangle"/>
+          </a:ln>
+        </p:spPr>
+        <p:style>
+          <a:lnRef idx="3">
+            <a:schemeClr val="accent4"/>
+          </a:lnRef>
+          <a:fillRef idx="0">
+            <a:schemeClr val="accent4"/>
+          </a:fillRef>
+          <a:effectRef idx="2">
+            <a:schemeClr val="accent4"/>
+          </a:effectRef>
+          <a:fontRef idx="minor">
+            <a:schemeClr val="tx1"/>
+          </a:fontRef>
+        </p:style>
+      </p:cxnSp>
+      <p:cxnSp>
+        <p:nvCxnSpPr>
+          <p:cNvPr id="75" name="Straight Arrow Connector 74">
+            <a:extLst>
+              <a:ext uri="{FF2B5EF4-FFF2-40B4-BE49-F238E27FC236}">
+                <a16:creationId xmlns:a16="http://schemas.microsoft.com/office/drawing/2014/main" id="{22C901FC-3A7B-DB34-EE5D-C4BE446899E9}"/>
+              </a:ext>
+            </a:extLst>
+          </p:cNvPr>
+          <p:cNvCxnSpPr>
+            <a:cxnSpLocks/>
+          </p:cNvCxnSpPr>
+          <p:nvPr/>
+        </p:nvCxnSpPr>
+        <p:spPr>
+          <a:xfrm flipH="1">
+            <a:off x="3143916" y="2464763"/>
+            <a:ext cx="336131" cy="649951"/>
+          </a:xfrm>
+          <a:prstGeom prst="straightConnector1">
+            <a:avLst/>
+          </a:prstGeom>
+          <a:ln>
+            <a:tailEnd type="triangle"/>
+          </a:ln>
+        </p:spPr>
+        <p:style>
+          <a:lnRef idx="3">
+            <a:schemeClr val="accent5"/>
+          </a:lnRef>
+          <a:fillRef idx="0">
+            <a:schemeClr val="accent5"/>
+          </a:fillRef>
+          <a:effectRef idx="2">
+            <a:schemeClr val="accent5"/>
+          </a:effectRef>
+          <a:fontRef idx="minor">
+            <a:schemeClr val="tx1"/>
+          </a:fontRef>
+        </p:style>
+      </p:cxnSp>
+      <p:cxnSp>
+        <p:nvCxnSpPr>
+          <p:cNvPr id="78" name="Straight Arrow Connector 77">
+            <a:extLst>
+              <a:ext uri="{FF2B5EF4-FFF2-40B4-BE49-F238E27FC236}">
+                <a16:creationId xmlns:a16="http://schemas.microsoft.com/office/drawing/2014/main" id="{F8884241-719F-4F25-FA4B-C73BF5E22757}"/>
+              </a:ext>
+            </a:extLst>
+          </p:cNvPr>
+          <p:cNvCxnSpPr>
+            <a:cxnSpLocks/>
+          </p:cNvCxnSpPr>
+          <p:nvPr/>
+        </p:nvCxnSpPr>
+        <p:spPr>
+          <a:xfrm flipV="1">
+            <a:off x="2732203" y="2111011"/>
+            <a:ext cx="593598" cy="1258243"/>
+          </a:xfrm>
+          <a:prstGeom prst="straightConnector1">
+            <a:avLst/>
+          </a:prstGeom>
+          <a:ln>
+            <a:tailEnd type="triangle"/>
+          </a:ln>
+        </p:spPr>
+        <p:style>
+          <a:lnRef idx="3">
+            <a:schemeClr val="accent4"/>
+          </a:lnRef>
+          <a:fillRef idx="0">
+            <a:schemeClr val="accent4"/>
+          </a:fillRef>
+          <a:effectRef idx="2">
+            <a:schemeClr val="accent4"/>
+          </a:effectRef>
+          <a:fontRef idx="minor">
+            <a:schemeClr val="tx1"/>
+          </a:fontRef>
+        </p:style>
+      </p:cxnSp>
+      <p:cxnSp>
+        <p:nvCxnSpPr>
+          <p:cNvPr id="84" name="Straight Arrow Connector 83">
+            <a:extLst>
+              <a:ext uri="{FF2B5EF4-FFF2-40B4-BE49-F238E27FC236}">
+                <a16:creationId xmlns:a16="http://schemas.microsoft.com/office/drawing/2014/main" id="{961E6B09-A124-D530-84A9-797C2E00B407}"/>
+              </a:ext>
+            </a:extLst>
+          </p:cNvPr>
+          <p:cNvCxnSpPr>
+            <a:cxnSpLocks/>
+          </p:cNvCxnSpPr>
+          <p:nvPr/>
+        </p:nvCxnSpPr>
+        <p:spPr>
+          <a:xfrm>
+            <a:off x="4860381" y="1722268"/>
+            <a:ext cx="2481452" cy="0"/>
+          </a:xfrm>
+          <a:prstGeom prst="straightConnector1">
+            <a:avLst/>
+          </a:prstGeom>
+          <a:ln w="38100" cap="flat" cmpd="sng" algn="ctr">
+            <a:solidFill>
+              <a:schemeClr val="accent4"/>
+            </a:solidFill>
+            <a:prstDash val="sysDot"/>
+            <a:round/>
+            <a:headEnd type="none" w="lg" len="med"/>
+            <a:tailEnd type="triangle" w="lg" len="med"/>
+          </a:ln>
+        </p:spPr>
+        <p:style>
+          <a:lnRef idx="0">
+            <a:scrgbClr r="0" g="0" b="0"/>
+          </a:lnRef>
+          <a:fillRef idx="0">
+            <a:scrgbClr r="0" g="0" b="0"/>
+          </a:fillRef>
+          <a:effectRef idx="0">
+            <a:scrgbClr r="0" g="0" b="0"/>
+          </a:effectRef>
+          <a:fontRef idx="minor">
+            <a:schemeClr val="tx1"/>
+          </a:fontRef>
+        </p:style>
+      </p:cxnSp>
+      <p:cxnSp>
+        <p:nvCxnSpPr>
+          <p:cNvPr id="87" name="Straight Arrow Connector 86">
+            <a:extLst>
+              <a:ext uri="{FF2B5EF4-FFF2-40B4-BE49-F238E27FC236}">
+                <a16:creationId xmlns:a16="http://schemas.microsoft.com/office/drawing/2014/main" id="{3EB2159D-A0D9-8B5E-FD41-9AC6F0F28096}"/>
+              </a:ext>
+            </a:extLst>
+          </p:cNvPr>
+          <p:cNvCxnSpPr>
+            <a:cxnSpLocks/>
+          </p:cNvCxnSpPr>
+          <p:nvPr/>
+        </p:nvCxnSpPr>
+        <p:spPr>
+          <a:xfrm>
+            <a:off x="4860381" y="2019587"/>
+            <a:ext cx="2481452" cy="0"/>
+          </a:xfrm>
+          <a:prstGeom prst="straightConnector1">
+            <a:avLst/>
+          </a:prstGeom>
+          <a:ln w="31750" cap="flat" cmpd="sng" algn="ctr">
+            <a:solidFill>
+              <a:schemeClr val="accent5"/>
+            </a:solidFill>
+            <a:prstDash val="sysDot"/>
+            <a:round/>
+            <a:headEnd type="triangle" w="lg" len="med"/>
+            <a:tailEnd type="none" w="lg" len="med"/>
+          </a:ln>
+        </p:spPr>
+        <p:style>
+          <a:lnRef idx="0">
+            <a:scrgbClr r="0" g="0" b="0"/>
+          </a:lnRef>
+          <a:fillRef idx="0">
+            <a:scrgbClr r="0" g="0" b="0"/>
+          </a:fillRef>
+          <a:effectRef idx="0">
+            <a:scrgbClr r="0" g="0" b="0"/>
+          </a:effectRef>
+          <a:fontRef idx="minor">
+            <a:schemeClr val="tx1"/>
+          </a:fontRef>
+        </p:style>
+      </p:cxnSp>
+      <p:sp>
+        <p:nvSpPr>
+          <p:cNvPr id="88" name="TextBox 87">
+            <a:extLst>
+              <a:ext uri="{FF2B5EF4-FFF2-40B4-BE49-F238E27FC236}">
+                <a16:creationId xmlns:a16="http://schemas.microsoft.com/office/drawing/2014/main" id="{39F201ED-35EE-593F-4A49-E171C62E8A38}"/>
+              </a:ext>
+            </a:extLst>
+          </p:cNvPr>
+          <p:cNvSpPr txBox="1"/>
+          <p:nvPr/>
+        </p:nvSpPr>
+        <p:spPr>
+          <a:xfrm>
+            <a:off x="5816115" y="1297766"/>
+            <a:ext cx="574196" cy="369332"/>
+          </a:xfrm>
+          <a:prstGeom prst="rect">
+            <a:avLst/>
+          </a:prstGeom>
+          <a:noFill/>
+        </p:spPr>
+        <p:txBody>
+          <a:bodyPr wrap="none" rtlCol="0">
+            <a:spAutoFit/>
+          </a:bodyPr>
+          <a:lstStyle/>
+          <a:p>
+            <a:r>
+              <a:rPr lang="en-US" dirty="0"/>
+              <a:t>...….</a:t>
+            </a:r>
+          </a:p>
+        </p:txBody>
+      </p:sp>
+      <p:cxnSp>
+        <p:nvCxnSpPr>
+          <p:cNvPr id="89" name="Straight Arrow Connector 88">
+            <a:extLst>
+              <a:ext uri="{FF2B5EF4-FFF2-40B4-BE49-F238E27FC236}">
+                <a16:creationId xmlns:a16="http://schemas.microsoft.com/office/drawing/2014/main" id="{BE2050EE-CAC1-BD60-0F73-CE50D5D337C6}"/>
+              </a:ext>
+            </a:extLst>
+          </p:cNvPr>
+          <p:cNvCxnSpPr>
+            <a:cxnSpLocks/>
+          </p:cNvCxnSpPr>
+          <p:nvPr/>
+        </p:nvCxnSpPr>
+        <p:spPr>
+          <a:xfrm>
+            <a:off x="10110876" y="5777256"/>
+            <a:ext cx="568413" cy="0"/>
+          </a:xfrm>
+          <a:prstGeom prst="straightConnector1">
+            <a:avLst/>
+          </a:prstGeom>
+          <a:ln>
+            <a:tailEnd type="triangle"/>
+          </a:ln>
+        </p:spPr>
+        <p:style>
+          <a:lnRef idx="3">
+            <a:schemeClr val="accent5"/>
+          </a:lnRef>
+          <a:fillRef idx="0">
+            <a:schemeClr val="accent5"/>
+          </a:fillRef>
+          <a:effectRef idx="2">
+            <a:schemeClr val="accent5"/>
+          </a:effectRef>
+          <a:fontRef idx="minor">
+            <a:schemeClr val="tx1"/>
+          </a:fontRef>
+        </p:style>
+      </p:cxnSp>
+      <p:sp>
+        <p:nvSpPr>
+          <p:cNvPr id="92" name="TextBox 91">
+            <a:extLst>
+              <a:ext uri="{FF2B5EF4-FFF2-40B4-BE49-F238E27FC236}">
+                <a16:creationId xmlns:a16="http://schemas.microsoft.com/office/drawing/2014/main" id="{E10DC723-BE5E-08D1-5FB4-459539ADD43F}"/>
+              </a:ext>
+            </a:extLst>
+          </p:cNvPr>
+          <p:cNvSpPr txBox="1"/>
+          <p:nvPr/>
+        </p:nvSpPr>
+        <p:spPr>
+          <a:xfrm>
+            <a:off x="10577690" y="5620588"/>
+            <a:ext cx="601831" cy="307777"/>
+          </a:xfrm>
+          <a:prstGeom prst="rect">
+            <a:avLst/>
+          </a:prstGeom>
+          <a:noFill/>
+        </p:spPr>
+        <p:txBody>
+          <a:bodyPr wrap="none" rtlCol="0">
+            <a:spAutoFit/>
+          </a:bodyPr>
+          <a:lstStyle/>
+          <a:p>
+            <a:r>
+              <a:rPr lang="en-US" sz="1400" b="1" dirty="0"/>
+              <a:t>: next</a:t>
+            </a:r>
+          </a:p>
+        </p:txBody>
+      </p:sp>
+      <p:sp>
+        <p:nvSpPr>
+          <p:cNvPr id="94" name="TextBox 93">
+            <a:extLst>
+              <a:ext uri="{FF2B5EF4-FFF2-40B4-BE49-F238E27FC236}">
+                <a16:creationId xmlns:a16="http://schemas.microsoft.com/office/drawing/2014/main" id="{343F72A5-B258-5B16-2F85-AA6FD4080A23}"/>
+              </a:ext>
+            </a:extLst>
+          </p:cNvPr>
+          <p:cNvSpPr txBox="1"/>
+          <p:nvPr/>
+        </p:nvSpPr>
+        <p:spPr>
+          <a:xfrm>
+            <a:off x="10577690" y="5984918"/>
+            <a:ext cx="606576" cy="307777"/>
+          </a:xfrm>
+          <a:prstGeom prst="rect">
+            <a:avLst/>
+          </a:prstGeom>
+          <a:noFill/>
+        </p:spPr>
+        <p:txBody>
+          <a:bodyPr wrap="none" rtlCol="0">
+            <a:spAutoFit/>
+          </a:bodyPr>
+          <a:lstStyle/>
+          <a:p>
+            <a:r>
+              <a:rPr lang="en-US" sz="1400" b="1" dirty="0"/>
+              <a:t>: prev</a:t>
+            </a:r>
+          </a:p>
+        </p:txBody>
+      </p:sp>
+      <p:cxnSp>
+        <p:nvCxnSpPr>
+          <p:cNvPr id="95" name="Straight Arrow Connector 94">
+            <a:extLst>
+              <a:ext uri="{FF2B5EF4-FFF2-40B4-BE49-F238E27FC236}">
+                <a16:creationId xmlns:a16="http://schemas.microsoft.com/office/drawing/2014/main" id="{36754004-D822-9605-077E-2C3DC848367D}"/>
+              </a:ext>
+            </a:extLst>
+          </p:cNvPr>
+          <p:cNvCxnSpPr>
+            <a:cxnSpLocks/>
+          </p:cNvCxnSpPr>
+          <p:nvPr/>
+        </p:nvCxnSpPr>
+        <p:spPr>
+          <a:xfrm flipH="1">
+            <a:off x="10110876" y="6140857"/>
+            <a:ext cx="568413" cy="0"/>
+          </a:xfrm>
+          <a:prstGeom prst="straightConnector1">
+            <a:avLst/>
+          </a:prstGeom>
+          <a:ln>
+            <a:tailEnd type="triangle"/>
+          </a:ln>
+        </p:spPr>
+        <p:style>
+          <a:lnRef idx="3">
+            <a:schemeClr val="accent4"/>
+          </a:lnRef>
+          <a:fillRef idx="0">
+            <a:schemeClr val="accent4"/>
+          </a:fillRef>
+          <a:effectRef idx="2">
+            <a:schemeClr val="accent4"/>
+          </a:effectRef>
+          <a:fontRef idx="minor">
+            <a:schemeClr val="tx1"/>
+          </a:fontRef>
+        </p:style>
+      </p:cxnSp>
+      <p:sp>
+        <p:nvSpPr>
+          <p:cNvPr id="97" name="Down Arrow 96">
+            <a:extLst>
+              <a:ext uri="{FF2B5EF4-FFF2-40B4-BE49-F238E27FC236}">
+                <a16:creationId xmlns:a16="http://schemas.microsoft.com/office/drawing/2014/main" id="{6F880298-DC35-5EFF-0B42-2879BA6A2465}"/>
+              </a:ext>
+            </a:extLst>
+          </p:cNvPr>
+          <p:cNvSpPr/>
+          <p:nvPr/>
+        </p:nvSpPr>
+        <p:spPr>
+          <a:xfrm>
+            <a:off x="6756989" y="4509527"/>
+            <a:ext cx="172806" cy="576503"/>
+          </a:xfrm>
+          <a:prstGeom prst="downArrow">
+            <a:avLst/>
+          </a:prstGeom>
+          <a:solidFill>
+            <a:srgbClr val="0070C0"/>
+          </a:solidFill>
+        </p:spPr>
+        <p:style>
+          <a:lnRef idx="2">
+            <a:schemeClr val="accent1">
+              <a:shade val="50000"/>
+            </a:schemeClr>
+          </a:lnRef>
+          <a:fillRef idx="1">
+            <a:schemeClr val="accent1"/>
+          </a:fillRef>
+          <a:effectRef idx="0">
+            <a:schemeClr val="accent1"/>
+          </a:effectRef>
+          <a:fontRef idx="minor">
+            <a:schemeClr val="lt1"/>
+          </a:fontRef>
+        </p:style>
+        <p:txBody>
+          <a:bodyPr rtlCol="0" anchor="ctr"/>
+          <a:lstStyle/>
+          <a:p>
+            <a:pPr algn="ctr"/>
+            <a:endParaRPr lang="en-US"/>
+          </a:p>
+        </p:txBody>
+      </p:sp>
+      <p:sp>
+        <p:nvSpPr>
+          <p:cNvPr id="98" name="TextBox 97">
+            <a:extLst>
+              <a:ext uri="{FF2B5EF4-FFF2-40B4-BE49-F238E27FC236}">
+                <a16:creationId xmlns:a16="http://schemas.microsoft.com/office/drawing/2014/main" id="{C6ED59B8-9D6D-63B5-8509-3690DBB90DAD}"/>
+              </a:ext>
+            </a:extLst>
+          </p:cNvPr>
+          <p:cNvSpPr txBox="1"/>
+          <p:nvPr/>
+        </p:nvSpPr>
+        <p:spPr>
+          <a:xfrm>
+            <a:off x="6475434" y="4198865"/>
+            <a:ext cx="780214" cy="307777"/>
+          </a:xfrm>
+          <a:prstGeom prst="rect">
+            <a:avLst/>
+          </a:prstGeom>
+          <a:noFill/>
+        </p:spPr>
+        <p:txBody>
+          <a:bodyPr wrap="none" rtlCol="0">
+            <a:spAutoFit/>
+          </a:bodyPr>
+          <a:lstStyle/>
+          <a:p>
+            <a:r>
+              <a:rPr lang="en-US" sz="1400" i="1" dirty="0"/>
+              <a:t>brelse( )</a:t>
+            </a:r>
+          </a:p>
+        </p:txBody>
+      </p:sp>
+      <p:sp>
+        <p:nvSpPr>
+          <p:cNvPr id="112" name="Left Arrow 111">
+            <a:extLst>
+              <a:ext uri="{FF2B5EF4-FFF2-40B4-BE49-F238E27FC236}">
+                <a16:creationId xmlns:a16="http://schemas.microsoft.com/office/drawing/2014/main" id="{8A98ED8C-6B09-F206-4EB6-D056D4D026B5}"/>
+              </a:ext>
+            </a:extLst>
+          </p:cNvPr>
+          <p:cNvSpPr/>
+          <p:nvPr/>
+        </p:nvSpPr>
+        <p:spPr>
+          <a:xfrm rot="1719417">
+            <a:off x="3426330" y="5327650"/>
+            <a:ext cx="1309482" cy="342552"/>
+          </a:xfrm>
+          <a:prstGeom prst="leftArrow">
+            <a:avLst/>
+          </a:prstGeom>
+          <a:solidFill>
+            <a:srgbClr val="FFFF00"/>
+          </a:solidFill>
+        </p:spPr>
+        <p:style>
+          <a:lnRef idx="2">
+            <a:schemeClr val="accent1">
+              <a:shade val="50000"/>
+            </a:schemeClr>
+          </a:lnRef>
+          <a:fillRef idx="1">
+            <a:schemeClr val="accent1"/>
+          </a:fillRef>
+          <a:effectRef idx="0">
+            <a:schemeClr val="accent1"/>
+          </a:effectRef>
+          <a:fontRef idx="minor">
+            <a:schemeClr val="lt1"/>
+          </a:fontRef>
+        </p:style>
+        <p:txBody>
+          <a:bodyPr rtlCol="0" anchor="ctr"/>
+          <a:lstStyle/>
+          <a:p>
+            <a:pPr algn="ctr"/>
+            <a:endParaRPr lang="en-US"/>
+          </a:p>
+        </p:txBody>
+      </p:sp>
+      <p:sp>
+        <p:nvSpPr>
+          <p:cNvPr id="113" name="TextBox 112">
+            <a:extLst>
+              <a:ext uri="{FF2B5EF4-FFF2-40B4-BE49-F238E27FC236}">
+                <a16:creationId xmlns:a16="http://schemas.microsoft.com/office/drawing/2014/main" id="{AD9F0FC0-A4B1-D630-44DF-77E689415323}"/>
+              </a:ext>
+            </a:extLst>
+          </p:cNvPr>
+          <p:cNvSpPr txBox="1"/>
+          <p:nvPr/>
+        </p:nvSpPr>
+        <p:spPr>
+          <a:xfrm rot="1819363">
+            <a:off x="2879489" y="5623877"/>
+            <a:ext cx="1986762" cy="369332"/>
+          </a:xfrm>
+          <a:prstGeom prst="rect">
+            <a:avLst/>
+          </a:prstGeom>
+          <a:noFill/>
+        </p:spPr>
+        <p:txBody>
+          <a:bodyPr wrap="none" rtlCol="0">
+            <a:spAutoFit/>
+          </a:bodyPr>
+          <a:lstStyle/>
+          <a:p>
+            <a:r>
+              <a:rPr lang="en-US" dirty="0"/>
+              <a:t>Least recently used</a:t>
+            </a:r>
+          </a:p>
+        </p:txBody>
+      </p:sp>
+      <p:sp>
+        <p:nvSpPr>
+          <p:cNvPr id="115" name="Left Arrow 114">
+            <a:extLst>
+              <a:ext uri="{FF2B5EF4-FFF2-40B4-BE49-F238E27FC236}">
+                <a16:creationId xmlns:a16="http://schemas.microsoft.com/office/drawing/2014/main" id="{9E4FDA34-AA5C-6D22-4A5A-A5D560789FB5}"/>
+              </a:ext>
+            </a:extLst>
+          </p:cNvPr>
+          <p:cNvSpPr/>
+          <p:nvPr/>
+        </p:nvSpPr>
+        <p:spPr>
+          <a:xfrm rot="8955625">
+            <a:off x="7452689" y="5319054"/>
+            <a:ext cx="1309482" cy="342552"/>
+          </a:xfrm>
+          <a:prstGeom prst="leftArrow">
+            <a:avLst/>
+          </a:prstGeom>
+          <a:solidFill>
+            <a:schemeClr val="accent2"/>
+          </a:solidFill>
+        </p:spPr>
+        <p:style>
+          <a:lnRef idx="2">
+            <a:schemeClr val="accent1">
+              <a:shade val="50000"/>
+            </a:schemeClr>
+          </a:lnRef>
+          <a:fillRef idx="1">
+            <a:schemeClr val="accent1"/>
+          </a:fillRef>
+          <a:effectRef idx="0">
+            <a:schemeClr val="accent1"/>
+          </a:effectRef>
+          <a:fontRef idx="minor">
+            <a:schemeClr val="lt1"/>
+          </a:fontRef>
+        </p:style>
+        <p:txBody>
+          <a:bodyPr rtlCol="0" anchor="ctr"/>
+          <a:lstStyle/>
+          <a:p>
+            <a:pPr algn="ctr"/>
+            <a:endParaRPr lang="en-US"/>
+          </a:p>
+        </p:txBody>
+      </p:sp>
+      <p:sp>
+        <p:nvSpPr>
+          <p:cNvPr id="116" name="TextBox 115">
+            <a:extLst>
+              <a:ext uri="{FF2B5EF4-FFF2-40B4-BE49-F238E27FC236}">
+                <a16:creationId xmlns:a16="http://schemas.microsoft.com/office/drawing/2014/main" id="{28A3C6F5-C50A-B3E1-290D-C386E1E22B57}"/>
+              </a:ext>
+            </a:extLst>
+          </p:cNvPr>
+          <p:cNvSpPr txBox="1"/>
+          <p:nvPr/>
+        </p:nvSpPr>
+        <p:spPr>
+          <a:xfrm rot="19636333">
+            <a:off x="7335587" y="5574469"/>
+            <a:ext cx="1981953" cy="369332"/>
+          </a:xfrm>
+          <a:prstGeom prst="rect">
+            <a:avLst/>
+          </a:prstGeom>
+          <a:noFill/>
+        </p:spPr>
+        <p:txBody>
+          <a:bodyPr wrap="none" rtlCol="0">
+            <a:spAutoFit/>
+          </a:bodyPr>
+          <a:lstStyle/>
+          <a:p>
+            <a:r>
+              <a:rPr lang="en-US" dirty="0"/>
+              <a:t>Most recently used</a:t>
+            </a:r>
+          </a:p>
+        </p:txBody>
+      </p:sp>
+      <p:sp>
+        <p:nvSpPr>
+          <p:cNvPr id="117" name="Rectangle 116">
+            <a:extLst>
+              <a:ext uri="{FF2B5EF4-FFF2-40B4-BE49-F238E27FC236}">
+                <a16:creationId xmlns:a16="http://schemas.microsoft.com/office/drawing/2014/main" id="{98538EF1-BDBE-BB3A-C8D1-582EEB455B35}"/>
+              </a:ext>
+            </a:extLst>
+          </p:cNvPr>
+          <p:cNvSpPr/>
+          <p:nvPr/>
+        </p:nvSpPr>
+        <p:spPr>
+          <a:xfrm>
+            <a:off x="5743034" y="3047704"/>
+            <a:ext cx="702815" cy="762592"/>
+          </a:xfrm>
+          <a:prstGeom prst="rect">
+            <a:avLst/>
+          </a:prstGeom>
+          <a:noFill/>
+          <a:ln>
+            <a:solidFill>
+              <a:srgbClr val="FF0000"/>
+            </a:solidFill>
+          </a:ln>
+        </p:spPr>
+        <p:style>
+          <a:lnRef idx="2">
+            <a:schemeClr val="accent1">
+              <a:shade val="50000"/>
+            </a:schemeClr>
+          </a:lnRef>
+          <a:fillRef idx="1">
+            <a:schemeClr val="accent1"/>
+          </a:fillRef>
+          <a:effectRef idx="0">
+            <a:schemeClr val="accent1"/>
+          </a:effectRef>
+          <a:fontRef idx="minor">
+            <a:schemeClr val="lt1"/>
+          </a:fontRef>
+        </p:style>
+        <p:txBody>
+          <a:bodyPr rtlCol="0" anchor="ctr"/>
+          <a:lstStyle/>
+          <a:p>
+            <a:pPr algn="ctr"/>
+            <a:endParaRPr lang="en-US"/>
+          </a:p>
+        </p:txBody>
+      </p:sp>
+      <p:sp>
+        <p:nvSpPr>
+          <p:cNvPr id="118" name="TextBox 117">
+            <a:extLst>
+              <a:ext uri="{FF2B5EF4-FFF2-40B4-BE49-F238E27FC236}">
+                <a16:creationId xmlns:a16="http://schemas.microsoft.com/office/drawing/2014/main" id="{2F925E0C-763D-6EC3-F5AA-A02F1DA64CA8}"/>
+              </a:ext>
+            </a:extLst>
+          </p:cNvPr>
+          <p:cNvSpPr txBox="1"/>
+          <p:nvPr/>
+        </p:nvSpPr>
+        <p:spPr>
+          <a:xfrm>
+            <a:off x="5807343" y="3213189"/>
+            <a:ext cx="574196" cy="369332"/>
+          </a:xfrm>
+          <a:prstGeom prst="rect">
+            <a:avLst/>
+          </a:prstGeom>
+          <a:noFill/>
+        </p:spPr>
+        <p:txBody>
+          <a:bodyPr wrap="none" rtlCol="0">
+            <a:spAutoFit/>
+          </a:bodyPr>
+          <a:lstStyle/>
+          <a:p>
+            <a:r>
+              <a:rPr lang="en-US" dirty="0"/>
+              <a:t>Disk</a:t>
+            </a:r>
+          </a:p>
+        </p:txBody>
+      </p:sp>
+      <p:sp>
+        <p:nvSpPr>
+          <p:cNvPr id="120" name="Doughnut 119">
+            <a:extLst>
+              <a:ext uri="{FF2B5EF4-FFF2-40B4-BE49-F238E27FC236}">
+                <a16:creationId xmlns:a16="http://schemas.microsoft.com/office/drawing/2014/main" id="{01CF477B-4CAF-0EBB-D574-29E0549FFED1}"/>
+              </a:ext>
+            </a:extLst>
+          </p:cNvPr>
+          <p:cNvSpPr/>
+          <p:nvPr/>
+        </p:nvSpPr>
+        <p:spPr>
+          <a:xfrm>
+            <a:off x="5309338" y="2642151"/>
+            <a:ext cx="1556204" cy="1557789"/>
+          </a:xfrm>
+          <a:prstGeom prst="donut">
+            <a:avLst>
+              <a:gd name="adj" fmla="val 11491"/>
+            </a:avLst>
+          </a:prstGeom>
+        </p:spPr>
+        <p:style>
+          <a:lnRef idx="2">
+            <a:schemeClr val="accent1">
+              <a:shade val="50000"/>
+            </a:schemeClr>
+          </a:lnRef>
+          <a:fillRef idx="1">
+            <a:schemeClr val="accent1"/>
+          </a:fillRef>
+          <a:effectRef idx="0">
+            <a:schemeClr val="accent1"/>
+          </a:effectRef>
+          <a:fontRef idx="minor">
+            <a:schemeClr val="lt1"/>
+          </a:fontRef>
+        </p:style>
+        <p:txBody>
+          <a:bodyPr rtlCol="0" anchor="ctr"/>
+          <a:lstStyle/>
+          <a:p>
+            <a:pPr algn="ctr"/>
+            <a:endParaRPr lang="en-US">
+              <a:solidFill>
+                <a:schemeClr val="tx1"/>
+              </a:solidFill>
+            </a:endParaRPr>
+          </a:p>
+        </p:txBody>
+      </p:sp>
+      <p:sp>
+        <p:nvSpPr>
+          <p:cNvPr id="121" name="TextBox 120">
+            <a:extLst>
+              <a:ext uri="{FF2B5EF4-FFF2-40B4-BE49-F238E27FC236}">
+                <a16:creationId xmlns:a16="http://schemas.microsoft.com/office/drawing/2014/main" id="{B8C9518A-FD23-7495-0DB0-67E39425A2CA}"/>
+              </a:ext>
+            </a:extLst>
+          </p:cNvPr>
+          <p:cNvSpPr txBox="1"/>
+          <p:nvPr/>
+        </p:nvSpPr>
+        <p:spPr>
+          <a:xfrm>
+            <a:off x="5673650" y="2596726"/>
+            <a:ext cx="854914" cy="276999"/>
+          </a:xfrm>
+          <a:prstGeom prst="rect">
+            <a:avLst/>
+          </a:prstGeom>
+          <a:noFill/>
+        </p:spPr>
+        <p:txBody>
+          <a:bodyPr wrap="none" rtlCol="0">
+            <a:spAutoFit/>
+          </a:bodyPr>
+          <a:lstStyle/>
+          <a:p>
+            <a:r>
+              <a:rPr lang="en-US" sz="1200" b="1" dirty="0"/>
+              <a:t>disk driver</a:t>
+            </a:r>
+          </a:p>
+        </p:txBody>
+      </p:sp>
+      <p:sp>
+        <p:nvSpPr>
+          <p:cNvPr id="123" name="Down Arrow 122">
+            <a:extLst>
+              <a:ext uri="{FF2B5EF4-FFF2-40B4-BE49-F238E27FC236}">
+                <a16:creationId xmlns:a16="http://schemas.microsoft.com/office/drawing/2014/main" id="{0DCF8FC6-D835-C167-FA5C-3E20866FD8FD}"/>
+              </a:ext>
+            </a:extLst>
+          </p:cNvPr>
+          <p:cNvSpPr/>
+          <p:nvPr/>
+        </p:nvSpPr>
+        <p:spPr>
+          <a:xfrm rot="12808621">
+            <a:off x="4930563" y="3531118"/>
+            <a:ext cx="166029" cy="1104432"/>
+          </a:xfrm>
+          <a:prstGeom prst="downArrow">
+            <a:avLst/>
+          </a:prstGeom>
+          <a:solidFill>
+            <a:srgbClr val="0070C0"/>
+          </a:solidFill>
+        </p:spPr>
+        <p:style>
+          <a:lnRef idx="2">
+            <a:schemeClr val="accent1">
+              <a:shade val="50000"/>
+            </a:schemeClr>
+          </a:lnRef>
+          <a:fillRef idx="1">
+            <a:schemeClr val="accent1"/>
+          </a:fillRef>
+          <a:effectRef idx="0">
+            <a:schemeClr val="accent1"/>
+          </a:effectRef>
+          <a:fontRef idx="minor">
+            <a:schemeClr val="lt1"/>
+          </a:fontRef>
+        </p:style>
+        <p:txBody>
+          <a:bodyPr rtlCol="0" anchor="ctr"/>
+          <a:lstStyle/>
+          <a:p>
+            <a:pPr algn="ctr"/>
+            <a:endParaRPr lang="en-US"/>
+          </a:p>
+        </p:txBody>
+      </p:sp>
+      <p:sp>
+        <p:nvSpPr>
+          <p:cNvPr id="124" name="TextBox 123">
+            <a:extLst>
+              <a:ext uri="{FF2B5EF4-FFF2-40B4-BE49-F238E27FC236}">
+                <a16:creationId xmlns:a16="http://schemas.microsoft.com/office/drawing/2014/main" id="{4B598800-ACC8-DC2C-441F-609408B4E036}"/>
+              </a:ext>
+            </a:extLst>
+          </p:cNvPr>
+          <p:cNvSpPr txBox="1"/>
+          <p:nvPr/>
+        </p:nvSpPr>
+        <p:spPr>
+          <a:xfrm>
+            <a:off x="4339183" y="3931806"/>
+            <a:ext cx="1366977" cy="307777"/>
+          </a:xfrm>
+          <a:prstGeom prst="rect">
+            <a:avLst/>
+          </a:prstGeom>
+          <a:noFill/>
+        </p:spPr>
+        <p:txBody>
+          <a:bodyPr wrap="none" rtlCol="0">
+            <a:spAutoFit/>
+          </a:bodyPr>
+          <a:lstStyle/>
+          <a:p>
+            <a:r>
+              <a:rPr lang="en-US" sz="1400" i="1" dirty="0"/>
+              <a:t>virtio_disk_rw( )</a:t>
             </a:r>
           </a:p>
         </p:txBody>
@@ -16529,6 +18479,1985 @@
 </file>
 
 <file path=ppt/slides/slide16.xml><?xml version="1.0" encoding="utf-8"?>
+<p:sld xmlns:a="http://schemas.openxmlformats.org/drawingml/2006/main" xmlns:r="http://schemas.openxmlformats.org/officeDocument/2006/relationships" xmlns:p="http://schemas.openxmlformats.org/presentationml/2006/main">
+  <p:cSld>
+    <p:spTree>
+      <p:nvGrpSpPr>
+        <p:cNvPr id="1" name=""/>
+        <p:cNvGrpSpPr/>
+        <p:nvPr/>
+      </p:nvGrpSpPr>
+      <p:grpSpPr>
+        <a:xfrm>
+          <a:off x="0" y="0"/>
+          <a:ext cx="0" cy="0"/>
+          <a:chOff x="0" y="0"/>
+          <a:chExt cx="0" cy="0"/>
+        </a:xfrm>
+      </p:grpSpPr>
+      <p:sp>
+        <p:nvSpPr>
+          <p:cNvPr id="2" name="TextBox 1">
+            <a:extLst>
+              <a:ext uri="{FF2B5EF4-FFF2-40B4-BE49-F238E27FC236}">
+                <a16:creationId xmlns:a16="http://schemas.microsoft.com/office/drawing/2014/main" id="{A99980E2-A3A9-FD4A-9011-9A37E88F5891}"/>
+              </a:ext>
+            </a:extLst>
+          </p:cNvPr>
+          <p:cNvSpPr txBox="1"/>
+          <p:nvPr/>
+        </p:nvSpPr>
+        <p:spPr>
+          <a:xfrm>
+            <a:off x="1872537" y="277843"/>
+            <a:ext cx="8446926" cy="707886"/>
+          </a:xfrm>
+          <a:prstGeom prst="rect">
+            <a:avLst/>
+          </a:prstGeom>
+          <a:noFill/>
+        </p:spPr>
+        <p:txBody>
+          <a:bodyPr wrap="square" rtlCol="0">
+            <a:spAutoFit/>
+          </a:bodyPr>
+          <a:lstStyle/>
+          <a:p>
+            <a:pPr algn="ctr"/>
+            <a:r>
+              <a:rPr lang="en-US" sz="4000" dirty="0">
+                <a:solidFill>
+                  <a:schemeClr val="accent1">
+                    <a:lumMod val="60000"/>
+                    <a:lumOff val="40000"/>
+                  </a:schemeClr>
+                </a:solidFill>
+              </a:rPr>
+              <a:t>Buffer Cache </a:t>
+            </a:r>
+            <a:r>
+              <a:rPr lang="en-US" sz="2400" dirty="0">
+                <a:solidFill>
+                  <a:schemeClr val="accent1">
+                    <a:lumMod val="60000"/>
+                    <a:lumOff val="40000"/>
+                  </a:schemeClr>
+                </a:solidFill>
+              </a:rPr>
+              <a:t>(after </a:t>
+            </a:r>
+            <a:r>
+              <a:rPr lang="en-US" sz="2400" i="1" dirty="0">
+                <a:solidFill>
+                  <a:schemeClr val="accent1">
+                    <a:lumMod val="60000"/>
+                    <a:lumOff val="40000"/>
+                  </a:schemeClr>
+                </a:solidFill>
+              </a:rPr>
+              <a:t>brelse(Block 3)</a:t>
+            </a:r>
+            <a:r>
+              <a:rPr lang="en-US" sz="2400" dirty="0">
+                <a:solidFill>
+                  <a:schemeClr val="accent1">
+                    <a:lumMod val="60000"/>
+                    <a:lumOff val="40000"/>
+                  </a:schemeClr>
+                </a:solidFill>
+              </a:rPr>
+              <a:t>)</a:t>
+            </a:r>
+            <a:endParaRPr lang="en-US" sz="2400" i="1" dirty="0">
+              <a:solidFill>
+                <a:schemeClr val="accent1">
+                  <a:lumMod val="60000"/>
+                  <a:lumOff val="40000"/>
+                </a:schemeClr>
+              </a:solidFill>
+            </a:endParaRPr>
+          </a:p>
+        </p:txBody>
+      </p:sp>
+      <p:sp>
+        <p:nvSpPr>
+          <p:cNvPr id="3" name="Rectangle 2">
+            <a:extLst>
+              <a:ext uri="{FF2B5EF4-FFF2-40B4-BE49-F238E27FC236}">
+                <a16:creationId xmlns:a16="http://schemas.microsoft.com/office/drawing/2014/main" id="{8FCC94B5-34A0-ABC3-9412-813BECF5BB5E}"/>
+              </a:ext>
+            </a:extLst>
+          </p:cNvPr>
+          <p:cNvSpPr/>
+          <p:nvPr/>
+        </p:nvSpPr>
+        <p:spPr>
+          <a:xfrm>
+            <a:off x="5532268" y="5007114"/>
+            <a:ext cx="1127464" cy="707886"/>
+          </a:xfrm>
+          <a:prstGeom prst="rect">
+            <a:avLst/>
+          </a:prstGeom>
+          <a:solidFill>
+            <a:srgbClr val="002060"/>
+          </a:solidFill>
+        </p:spPr>
+        <p:style>
+          <a:lnRef idx="2">
+            <a:schemeClr val="accent1">
+              <a:shade val="50000"/>
+            </a:schemeClr>
+          </a:lnRef>
+          <a:fillRef idx="1">
+            <a:schemeClr val="accent1"/>
+          </a:fillRef>
+          <a:effectRef idx="0">
+            <a:schemeClr val="accent1"/>
+          </a:effectRef>
+          <a:fontRef idx="minor">
+            <a:schemeClr val="lt1"/>
+          </a:fontRef>
+        </p:style>
+        <p:txBody>
+          <a:bodyPr rtlCol="0" anchor="ctr"/>
+          <a:lstStyle/>
+          <a:p>
+            <a:pPr algn="ctr"/>
+            <a:endParaRPr lang="en-US" dirty="0"/>
+          </a:p>
+        </p:txBody>
+      </p:sp>
+      <p:sp>
+        <p:nvSpPr>
+          <p:cNvPr id="4" name="TextBox 3">
+            <a:extLst>
+              <a:ext uri="{FF2B5EF4-FFF2-40B4-BE49-F238E27FC236}">
+                <a16:creationId xmlns:a16="http://schemas.microsoft.com/office/drawing/2014/main" id="{39616A5C-39AF-2FB7-6226-AD3C66552D64}"/>
+              </a:ext>
+            </a:extLst>
+          </p:cNvPr>
+          <p:cNvSpPr txBox="1"/>
+          <p:nvPr/>
+        </p:nvSpPr>
+        <p:spPr>
+          <a:xfrm>
+            <a:off x="5637320" y="5007114"/>
+            <a:ext cx="1228221" cy="276999"/>
+          </a:xfrm>
+          <a:prstGeom prst="rect">
+            <a:avLst/>
+          </a:prstGeom>
+          <a:noFill/>
+        </p:spPr>
+        <p:txBody>
+          <a:bodyPr wrap="square" rtlCol="0">
+            <a:spAutoFit/>
+          </a:bodyPr>
+          <a:lstStyle/>
+          <a:p>
+            <a:r>
+              <a:rPr lang="en-US" sz="1200" b="1" dirty="0"/>
+              <a:t>Head block</a:t>
+            </a:r>
+          </a:p>
+        </p:txBody>
+      </p:sp>
+      <p:sp>
+        <p:nvSpPr>
+          <p:cNvPr id="5" name="Rectangle 4">
+            <a:extLst>
+              <a:ext uri="{FF2B5EF4-FFF2-40B4-BE49-F238E27FC236}">
+                <a16:creationId xmlns:a16="http://schemas.microsoft.com/office/drawing/2014/main" id="{36EE6BC4-D0FA-8908-93AB-AFF4DCB6C7FD}"/>
+              </a:ext>
+            </a:extLst>
+          </p:cNvPr>
+          <p:cNvSpPr/>
+          <p:nvPr/>
+        </p:nvSpPr>
+        <p:spPr>
+          <a:xfrm>
+            <a:off x="5532268" y="6109425"/>
+            <a:ext cx="1127464" cy="335764"/>
+          </a:xfrm>
+          <a:prstGeom prst="rect">
+            <a:avLst/>
+          </a:prstGeom>
+          <a:solidFill>
+            <a:srgbClr val="002060"/>
+          </a:solidFill>
+        </p:spPr>
+        <p:style>
+          <a:lnRef idx="2">
+            <a:schemeClr val="accent1">
+              <a:shade val="50000"/>
+            </a:schemeClr>
+          </a:lnRef>
+          <a:fillRef idx="1">
+            <a:schemeClr val="accent1"/>
+          </a:fillRef>
+          <a:effectRef idx="0">
+            <a:schemeClr val="accent1"/>
+          </a:effectRef>
+          <a:fontRef idx="minor">
+            <a:schemeClr val="lt1"/>
+          </a:fontRef>
+        </p:style>
+        <p:txBody>
+          <a:bodyPr rtlCol="0" anchor="ctr"/>
+          <a:lstStyle/>
+          <a:p>
+            <a:pPr algn="ctr"/>
+            <a:endParaRPr lang="en-US" dirty="0"/>
+          </a:p>
+        </p:txBody>
+      </p:sp>
+      <p:sp>
+        <p:nvSpPr>
+          <p:cNvPr id="6" name="TextBox 5">
+            <a:extLst>
+              <a:ext uri="{FF2B5EF4-FFF2-40B4-BE49-F238E27FC236}">
+                <a16:creationId xmlns:a16="http://schemas.microsoft.com/office/drawing/2014/main" id="{4E21F53A-5A1F-6DCB-8078-F0306BA5E8F0}"/>
+              </a:ext>
+            </a:extLst>
+          </p:cNvPr>
+          <p:cNvSpPr txBox="1"/>
+          <p:nvPr/>
+        </p:nvSpPr>
+        <p:spPr>
+          <a:xfrm>
+            <a:off x="5780843" y="6138807"/>
+            <a:ext cx="1228221" cy="276999"/>
+          </a:xfrm>
+          <a:prstGeom prst="rect">
+            <a:avLst/>
+          </a:prstGeom>
+          <a:noFill/>
+        </p:spPr>
+        <p:txBody>
+          <a:bodyPr wrap="square" rtlCol="0">
+            <a:spAutoFit/>
+          </a:bodyPr>
+          <a:lstStyle/>
+          <a:p>
+            <a:r>
+              <a:rPr lang="en-US" sz="1200" b="1" dirty="0"/>
+              <a:t>bcache</a:t>
+            </a:r>
+          </a:p>
+        </p:txBody>
+      </p:sp>
+      <p:cxnSp>
+        <p:nvCxnSpPr>
+          <p:cNvPr id="8" name="Straight Arrow Connector 7">
+            <a:extLst>
+              <a:ext uri="{FF2B5EF4-FFF2-40B4-BE49-F238E27FC236}">
+                <a16:creationId xmlns:a16="http://schemas.microsoft.com/office/drawing/2014/main" id="{B1908804-2A50-92A8-8B0F-BAA0F9DD2D93}"/>
+              </a:ext>
+            </a:extLst>
+          </p:cNvPr>
+          <p:cNvCxnSpPr>
+            <a:stCxn id="5" idx="0"/>
+            <a:endCxn id="3" idx="2"/>
+          </p:cNvCxnSpPr>
+          <p:nvPr/>
+        </p:nvCxnSpPr>
+        <p:spPr>
+          <a:xfrm flipV="1">
+            <a:off x="6096000" y="5715000"/>
+            <a:ext cx="0" cy="394425"/>
+          </a:xfrm>
+          <a:prstGeom prst="straightConnector1">
+            <a:avLst/>
+          </a:prstGeom>
+          <a:ln>
+            <a:tailEnd type="triangle"/>
+          </a:ln>
+        </p:spPr>
+        <p:style>
+          <a:lnRef idx="3">
+            <a:schemeClr val="accent1"/>
+          </a:lnRef>
+          <a:fillRef idx="0">
+            <a:schemeClr val="accent1"/>
+          </a:fillRef>
+          <a:effectRef idx="2">
+            <a:schemeClr val="accent1"/>
+          </a:effectRef>
+          <a:fontRef idx="minor">
+            <a:schemeClr val="tx1"/>
+          </a:fontRef>
+        </p:style>
+      </p:cxnSp>
+      <p:sp>
+        <p:nvSpPr>
+          <p:cNvPr id="10" name="TextBox 9">
+            <a:extLst>
+              <a:ext uri="{FF2B5EF4-FFF2-40B4-BE49-F238E27FC236}">
+                <a16:creationId xmlns:a16="http://schemas.microsoft.com/office/drawing/2014/main" id="{865D3F47-F326-940F-13D6-96ACE4D7ABB7}"/>
+              </a:ext>
+            </a:extLst>
+          </p:cNvPr>
+          <p:cNvSpPr txBox="1"/>
+          <p:nvPr/>
+        </p:nvSpPr>
+        <p:spPr>
+          <a:xfrm>
+            <a:off x="6045621" y="5777256"/>
+            <a:ext cx="1228221" cy="276999"/>
+          </a:xfrm>
+          <a:prstGeom prst="rect">
+            <a:avLst/>
+          </a:prstGeom>
+          <a:noFill/>
+        </p:spPr>
+        <p:txBody>
+          <a:bodyPr wrap="square" rtlCol="0">
+            <a:spAutoFit/>
+          </a:bodyPr>
+          <a:lstStyle/>
+          <a:p>
+            <a:r>
+              <a:rPr lang="en-US" sz="1200" b="1" dirty="0"/>
+              <a:t>head</a:t>
+            </a:r>
+          </a:p>
+        </p:txBody>
+      </p:sp>
+      <p:sp>
+        <p:nvSpPr>
+          <p:cNvPr id="11" name="Rectangle 10">
+            <a:extLst>
+              <a:ext uri="{FF2B5EF4-FFF2-40B4-BE49-F238E27FC236}">
+                <a16:creationId xmlns:a16="http://schemas.microsoft.com/office/drawing/2014/main" id="{F92866AA-CFE2-CB41-8C98-0434D74938DA}"/>
+              </a:ext>
+            </a:extLst>
+          </p:cNvPr>
+          <p:cNvSpPr/>
+          <p:nvPr/>
+        </p:nvSpPr>
+        <p:spPr>
+          <a:xfrm rot="19904949">
+            <a:off x="7109447" y="4557772"/>
+            <a:ext cx="1127464" cy="707886"/>
+          </a:xfrm>
+          <a:prstGeom prst="rect">
+            <a:avLst/>
+          </a:prstGeom>
+          <a:solidFill>
+            <a:schemeClr val="accent2"/>
+          </a:solidFill>
+        </p:spPr>
+        <p:style>
+          <a:lnRef idx="2">
+            <a:schemeClr val="accent1">
+              <a:shade val="50000"/>
+            </a:schemeClr>
+          </a:lnRef>
+          <a:fillRef idx="1">
+            <a:schemeClr val="accent1"/>
+          </a:fillRef>
+          <a:effectRef idx="0">
+            <a:schemeClr val="accent1"/>
+          </a:effectRef>
+          <a:fontRef idx="minor">
+            <a:schemeClr val="lt1"/>
+          </a:fontRef>
+        </p:style>
+        <p:txBody>
+          <a:bodyPr rtlCol="0" anchor="ctr"/>
+          <a:lstStyle/>
+          <a:p>
+            <a:pPr algn="ctr"/>
+            <a:r>
+              <a:rPr lang="en-US" dirty="0">
+                <a:solidFill>
+                  <a:schemeClr val="bg1"/>
+                </a:solidFill>
+              </a:rPr>
+              <a:t>Block 3</a:t>
+            </a:r>
+          </a:p>
+        </p:txBody>
+      </p:sp>
+      <p:sp>
+        <p:nvSpPr>
+          <p:cNvPr id="12" name="Rectangle 11">
+            <a:extLst>
+              <a:ext uri="{FF2B5EF4-FFF2-40B4-BE49-F238E27FC236}">
+                <a16:creationId xmlns:a16="http://schemas.microsoft.com/office/drawing/2014/main" id="{683636D8-012A-79C9-5546-D22B688A48C6}"/>
+              </a:ext>
+            </a:extLst>
+          </p:cNvPr>
+          <p:cNvSpPr/>
+          <p:nvPr/>
+        </p:nvSpPr>
+        <p:spPr>
+          <a:xfrm rot="1836984">
+            <a:off x="3953801" y="4544684"/>
+            <a:ext cx="1127464" cy="707886"/>
+          </a:xfrm>
+          <a:prstGeom prst="rect">
+            <a:avLst/>
+          </a:prstGeom>
+          <a:solidFill>
+            <a:srgbClr val="FFFF00"/>
+          </a:solidFill>
+        </p:spPr>
+        <p:style>
+          <a:lnRef idx="2">
+            <a:schemeClr val="accent1">
+              <a:shade val="50000"/>
+            </a:schemeClr>
+          </a:lnRef>
+          <a:fillRef idx="1">
+            <a:schemeClr val="accent1"/>
+          </a:fillRef>
+          <a:effectRef idx="0">
+            <a:schemeClr val="accent1"/>
+          </a:effectRef>
+          <a:fontRef idx="minor">
+            <a:schemeClr val="lt1"/>
+          </a:fontRef>
+        </p:style>
+        <p:txBody>
+          <a:bodyPr rtlCol="0" anchor="ctr"/>
+          <a:lstStyle/>
+          <a:p>
+            <a:pPr algn="ctr"/>
+            <a:r>
+              <a:rPr lang="en-US" dirty="0">
+                <a:solidFill>
+                  <a:schemeClr val="bg1"/>
+                </a:solidFill>
+              </a:rPr>
+              <a:t>Block n+2</a:t>
+            </a:r>
+          </a:p>
+        </p:txBody>
+      </p:sp>
+      <p:sp>
+        <p:nvSpPr>
+          <p:cNvPr id="13" name="Rectangle 12">
+            <a:extLst>
+              <a:ext uri="{FF2B5EF4-FFF2-40B4-BE49-F238E27FC236}">
+                <a16:creationId xmlns:a16="http://schemas.microsoft.com/office/drawing/2014/main" id="{9B091E64-9C6F-27A2-405B-EAE6C40D9E83}"/>
+              </a:ext>
+            </a:extLst>
+          </p:cNvPr>
+          <p:cNvSpPr/>
+          <p:nvPr/>
+        </p:nvSpPr>
+        <p:spPr>
+          <a:xfrm rot="3569557">
+            <a:off x="2697059" y="3362971"/>
+            <a:ext cx="1127464" cy="707886"/>
+          </a:xfrm>
+          <a:prstGeom prst="rect">
+            <a:avLst/>
+          </a:prstGeom>
+          <a:solidFill>
+            <a:srgbClr val="00B0F0"/>
+          </a:solidFill>
+        </p:spPr>
+        <p:style>
+          <a:lnRef idx="2">
+            <a:schemeClr val="accent1">
+              <a:shade val="50000"/>
+            </a:schemeClr>
+          </a:lnRef>
+          <a:fillRef idx="1">
+            <a:schemeClr val="accent1"/>
+          </a:fillRef>
+          <a:effectRef idx="0">
+            <a:schemeClr val="accent1"/>
+          </a:effectRef>
+          <a:fontRef idx="minor">
+            <a:schemeClr val="lt1"/>
+          </a:fontRef>
+        </p:style>
+        <p:txBody>
+          <a:bodyPr rtlCol="0" anchor="ctr"/>
+          <a:lstStyle/>
+          <a:p>
+            <a:pPr algn="ctr"/>
+            <a:r>
+              <a:rPr lang="en-US" dirty="0">
+                <a:solidFill>
+                  <a:schemeClr val="bg1"/>
+                </a:solidFill>
+              </a:rPr>
+              <a:t>Block n+1</a:t>
+            </a:r>
+          </a:p>
+        </p:txBody>
+      </p:sp>
+      <p:sp>
+        <p:nvSpPr>
+          <p:cNvPr id="16" name="Rectangle 15">
+            <a:extLst>
+              <a:ext uri="{FF2B5EF4-FFF2-40B4-BE49-F238E27FC236}">
+                <a16:creationId xmlns:a16="http://schemas.microsoft.com/office/drawing/2014/main" id="{3ECA9F1C-6674-59AB-A009-173EEDD7E971}"/>
+              </a:ext>
+            </a:extLst>
+          </p:cNvPr>
+          <p:cNvSpPr/>
+          <p:nvPr/>
+        </p:nvSpPr>
+        <p:spPr>
+          <a:xfrm rot="20036567">
+            <a:off x="3355017" y="1739900"/>
+            <a:ext cx="1127464" cy="707886"/>
+          </a:xfrm>
+          <a:prstGeom prst="rect">
+            <a:avLst/>
+          </a:prstGeom>
+          <a:solidFill>
+            <a:srgbClr val="00B0F0"/>
+          </a:solidFill>
+        </p:spPr>
+        <p:style>
+          <a:lnRef idx="2">
+            <a:schemeClr val="accent1">
+              <a:shade val="50000"/>
+            </a:schemeClr>
+          </a:lnRef>
+          <a:fillRef idx="1">
+            <a:schemeClr val="accent1"/>
+          </a:fillRef>
+          <a:effectRef idx="0">
+            <a:schemeClr val="accent1"/>
+          </a:effectRef>
+          <a:fontRef idx="minor">
+            <a:schemeClr val="lt1"/>
+          </a:fontRef>
+        </p:style>
+        <p:txBody>
+          <a:bodyPr rtlCol="0" anchor="ctr"/>
+          <a:lstStyle/>
+          <a:p>
+            <a:pPr algn="ctr"/>
+            <a:r>
+              <a:rPr lang="en-US" dirty="0">
+                <a:solidFill>
+                  <a:schemeClr val="bg1"/>
+                </a:solidFill>
+              </a:rPr>
+              <a:t>Block n</a:t>
+            </a:r>
+          </a:p>
+        </p:txBody>
+      </p:sp>
+      <p:sp>
+        <p:nvSpPr>
+          <p:cNvPr id="17" name="Rectangle 16">
+            <a:extLst>
+              <a:ext uri="{FF2B5EF4-FFF2-40B4-BE49-F238E27FC236}">
+                <a16:creationId xmlns:a16="http://schemas.microsoft.com/office/drawing/2014/main" id="{A0DE90F0-2D3D-6BA8-A8D1-65FCC58B7867}"/>
+              </a:ext>
+            </a:extLst>
+          </p:cNvPr>
+          <p:cNvSpPr/>
+          <p:nvPr/>
+        </p:nvSpPr>
+        <p:spPr>
+          <a:xfrm rot="18137722">
+            <a:off x="8388786" y="3363821"/>
+            <a:ext cx="1127464" cy="707886"/>
+          </a:xfrm>
+          <a:prstGeom prst="rect">
+            <a:avLst/>
+          </a:prstGeom>
+          <a:solidFill>
+            <a:srgbClr val="00B0F0"/>
+          </a:solidFill>
+        </p:spPr>
+        <p:style>
+          <a:lnRef idx="2">
+            <a:schemeClr val="accent1">
+              <a:shade val="50000"/>
+            </a:schemeClr>
+          </a:lnRef>
+          <a:fillRef idx="1">
+            <a:schemeClr val="accent1"/>
+          </a:fillRef>
+          <a:effectRef idx="0">
+            <a:schemeClr val="accent1"/>
+          </a:effectRef>
+          <a:fontRef idx="minor">
+            <a:schemeClr val="lt1"/>
+          </a:fontRef>
+        </p:style>
+        <p:txBody>
+          <a:bodyPr rtlCol="0" anchor="ctr"/>
+          <a:lstStyle/>
+          <a:p>
+            <a:pPr algn="ctr"/>
+            <a:r>
+              <a:rPr lang="en-US" dirty="0">
+                <a:solidFill>
+                  <a:schemeClr val="bg1"/>
+                </a:solidFill>
+              </a:rPr>
+              <a:t>Block 1</a:t>
+            </a:r>
+          </a:p>
+        </p:txBody>
+      </p:sp>
+      <p:sp>
+        <p:nvSpPr>
+          <p:cNvPr id="18" name="Rectangle 17">
+            <a:extLst>
+              <a:ext uri="{FF2B5EF4-FFF2-40B4-BE49-F238E27FC236}">
+                <a16:creationId xmlns:a16="http://schemas.microsoft.com/office/drawing/2014/main" id="{4FC9E708-996A-BC5E-7987-FA96F5B09363}"/>
+              </a:ext>
+            </a:extLst>
+          </p:cNvPr>
+          <p:cNvSpPr/>
+          <p:nvPr/>
+        </p:nvSpPr>
+        <p:spPr>
+          <a:xfrm rot="1585064">
+            <a:off x="7709412" y="1757068"/>
+            <a:ext cx="1127464" cy="707886"/>
+          </a:xfrm>
+          <a:prstGeom prst="rect">
+            <a:avLst/>
+          </a:prstGeom>
+          <a:solidFill>
+            <a:srgbClr val="00B0F0"/>
+          </a:solidFill>
+        </p:spPr>
+        <p:style>
+          <a:lnRef idx="2">
+            <a:schemeClr val="accent1">
+              <a:shade val="50000"/>
+            </a:schemeClr>
+          </a:lnRef>
+          <a:fillRef idx="1">
+            <a:schemeClr val="accent1"/>
+          </a:fillRef>
+          <a:effectRef idx="0">
+            <a:schemeClr val="accent1"/>
+          </a:effectRef>
+          <a:fontRef idx="minor">
+            <a:schemeClr val="lt1"/>
+          </a:fontRef>
+        </p:style>
+        <p:txBody>
+          <a:bodyPr rtlCol="0" anchor="ctr"/>
+          <a:lstStyle/>
+          <a:p>
+            <a:pPr algn="ctr"/>
+            <a:r>
+              <a:rPr lang="en-US" dirty="0">
+                <a:solidFill>
+                  <a:schemeClr val="bg1"/>
+                </a:solidFill>
+              </a:rPr>
+              <a:t>Block 2</a:t>
+            </a:r>
+          </a:p>
+        </p:txBody>
+      </p:sp>
+      <p:cxnSp>
+        <p:nvCxnSpPr>
+          <p:cNvPr id="27" name="Straight Arrow Connector 26">
+            <a:extLst>
+              <a:ext uri="{FF2B5EF4-FFF2-40B4-BE49-F238E27FC236}">
+                <a16:creationId xmlns:a16="http://schemas.microsoft.com/office/drawing/2014/main" id="{61D5AF6A-D5D3-C7A7-54EF-F4397281B9C4}"/>
+              </a:ext>
+            </a:extLst>
+          </p:cNvPr>
+          <p:cNvCxnSpPr>
+            <a:cxnSpLocks/>
+          </p:cNvCxnSpPr>
+          <p:nvPr/>
+        </p:nvCxnSpPr>
+        <p:spPr>
+          <a:xfrm flipV="1">
+            <a:off x="6657317" y="4997188"/>
+            <a:ext cx="435941" cy="232630"/>
+          </a:xfrm>
+          <a:prstGeom prst="straightConnector1">
+            <a:avLst/>
+          </a:prstGeom>
+          <a:ln>
+            <a:tailEnd type="triangle"/>
+          </a:ln>
+        </p:spPr>
+        <p:style>
+          <a:lnRef idx="3">
+            <a:schemeClr val="accent5"/>
+          </a:lnRef>
+          <a:fillRef idx="0">
+            <a:schemeClr val="accent5"/>
+          </a:fillRef>
+          <a:effectRef idx="2">
+            <a:schemeClr val="accent5"/>
+          </a:effectRef>
+          <a:fontRef idx="minor">
+            <a:schemeClr val="tx1"/>
+          </a:fontRef>
+        </p:style>
+      </p:cxnSp>
+      <p:cxnSp>
+        <p:nvCxnSpPr>
+          <p:cNvPr id="29" name="Straight Arrow Connector 28">
+            <a:extLst>
+              <a:ext uri="{FF2B5EF4-FFF2-40B4-BE49-F238E27FC236}">
+                <a16:creationId xmlns:a16="http://schemas.microsoft.com/office/drawing/2014/main" id="{DF43B010-AC03-2A44-1689-21838BE8C54C}"/>
+              </a:ext>
+            </a:extLst>
+          </p:cNvPr>
+          <p:cNvCxnSpPr>
+            <a:cxnSpLocks/>
+          </p:cNvCxnSpPr>
+          <p:nvPr/>
+        </p:nvCxnSpPr>
+        <p:spPr>
+          <a:xfrm flipH="1">
+            <a:off x="6657317" y="5308152"/>
+            <a:ext cx="616525" cy="312436"/>
+          </a:xfrm>
+          <a:prstGeom prst="straightConnector1">
+            <a:avLst/>
+          </a:prstGeom>
+          <a:ln>
+            <a:tailEnd type="triangle"/>
+          </a:ln>
+        </p:spPr>
+        <p:style>
+          <a:lnRef idx="3">
+            <a:schemeClr val="accent4"/>
+          </a:lnRef>
+          <a:fillRef idx="0">
+            <a:schemeClr val="accent4"/>
+          </a:fillRef>
+          <a:effectRef idx="2">
+            <a:schemeClr val="accent4"/>
+          </a:effectRef>
+          <a:fontRef idx="minor">
+            <a:schemeClr val="tx1"/>
+          </a:fontRef>
+        </p:style>
+      </p:cxnSp>
+      <p:cxnSp>
+        <p:nvCxnSpPr>
+          <p:cNvPr id="30" name="Straight Arrow Connector 29">
+            <a:extLst>
+              <a:ext uri="{FF2B5EF4-FFF2-40B4-BE49-F238E27FC236}">
+                <a16:creationId xmlns:a16="http://schemas.microsoft.com/office/drawing/2014/main" id="{AAB801E8-F700-DBCC-A646-7E734EB177A4}"/>
+              </a:ext>
+            </a:extLst>
+          </p:cNvPr>
+          <p:cNvCxnSpPr>
+            <a:cxnSpLocks/>
+          </p:cNvCxnSpPr>
+          <p:nvPr/>
+        </p:nvCxnSpPr>
+        <p:spPr>
+          <a:xfrm flipH="1" flipV="1">
+            <a:off x="4860381" y="5371759"/>
+            <a:ext cx="671886" cy="265561"/>
+          </a:xfrm>
+          <a:prstGeom prst="straightConnector1">
+            <a:avLst/>
+          </a:prstGeom>
+          <a:ln>
+            <a:tailEnd type="triangle"/>
+          </a:ln>
+        </p:spPr>
+        <p:style>
+          <a:lnRef idx="3">
+            <a:schemeClr val="accent4"/>
+          </a:lnRef>
+          <a:fillRef idx="0">
+            <a:schemeClr val="accent4"/>
+          </a:fillRef>
+          <a:effectRef idx="2">
+            <a:schemeClr val="accent4"/>
+          </a:effectRef>
+          <a:fontRef idx="minor">
+            <a:schemeClr val="tx1"/>
+          </a:fontRef>
+        </p:style>
+      </p:cxnSp>
+      <p:cxnSp>
+        <p:nvCxnSpPr>
+          <p:cNvPr id="32" name="Straight Arrow Connector 31">
+            <a:extLst>
+              <a:ext uri="{FF2B5EF4-FFF2-40B4-BE49-F238E27FC236}">
+                <a16:creationId xmlns:a16="http://schemas.microsoft.com/office/drawing/2014/main" id="{D3D341C7-FBB0-5960-C0A4-363D32DB21C7}"/>
+              </a:ext>
+            </a:extLst>
+          </p:cNvPr>
+          <p:cNvCxnSpPr>
+            <a:cxnSpLocks/>
+          </p:cNvCxnSpPr>
+          <p:nvPr/>
+        </p:nvCxnSpPr>
+        <p:spPr>
+          <a:xfrm>
+            <a:off x="5068848" y="5030756"/>
+            <a:ext cx="462932" cy="194014"/>
+          </a:xfrm>
+          <a:prstGeom prst="straightConnector1">
+            <a:avLst/>
+          </a:prstGeom>
+          <a:ln>
+            <a:tailEnd type="triangle"/>
+          </a:ln>
+        </p:spPr>
+        <p:style>
+          <a:lnRef idx="3">
+            <a:schemeClr val="accent5"/>
+          </a:lnRef>
+          <a:fillRef idx="0">
+            <a:schemeClr val="accent5"/>
+          </a:fillRef>
+          <a:effectRef idx="2">
+            <a:schemeClr val="accent5"/>
+          </a:effectRef>
+          <a:fontRef idx="minor">
+            <a:schemeClr val="tx1"/>
+          </a:fontRef>
+        </p:style>
+      </p:cxnSp>
+      <p:cxnSp>
+        <p:nvCxnSpPr>
+          <p:cNvPr id="34" name="Straight Arrow Connector 33">
+            <a:extLst>
+              <a:ext uri="{FF2B5EF4-FFF2-40B4-BE49-F238E27FC236}">
+                <a16:creationId xmlns:a16="http://schemas.microsoft.com/office/drawing/2014/main" id="{26320E25-2694-1CFF-C0AC-72BCA372C98D}"/>
+              </a:ext>
+            </a:extLst>
+          </p:cNvPr>
+          <p:cNvCxnSpPr>
+            <a:cxnSpLocks/>
+          </p:cNvCxnSpPr>
+          <p:nvPr/>
+        </p:nvCxnSpPr>
+        <p:spPr>
+          <a:xfrm flipV="1">
+            <a:off x="8059395" y="4046174"/>
+            <a:ext cx="421422" cy="463353"/>
+          </a:xfrm>
+          <a:prstGeom prst="straightConnector1">
+            <a:avLst/>
+          </a:prstGeom>
+          <a:ln>
+            <a:tailEnd type="triangle"/>
+          </a:ln>
+        </p:spPr>
+        <p:style>
+          <a:lnRef idx="3">
+            <a:schemeClr val="accent5"/>
+          </a:lnRef>
+          <a:fillRef idx="0">
+            <a:schemeClr val="accent5"/>
+          </a:fillRef>
+          <a:effectRef idx="2">
+            <a:schemeClr val="accent5"/>
+          </a:effectRef>
+          <a:fontRef idx="minor">
+            <a:schemeClr val="tx1"/>
+          </a:fontRef>
+        </p:style>
+      </p:cxnSp>
+      <p:cxnSp>
+        <p:nvCxnSpPr>
+          <p:cNvPr id="41" name="Straight Arrow Connector 40">
+            <a:extLst>
+              <a:ext uri="{FF2B5EF4-FFF2-40B4-BE49-F238E27FC236}">
+                <a16:creationId xmlns:a16="http://schemas.microsoft.com/office/drawing/2014/main" id="{C8E328EC-3E83-B92F-BBBD-293756C991DE}"/>
+              </a:ext>
+            </a:extLst>
+          </p:cNvPr>
+          <p:cNvCxnSpPr>
+            <a:cxnSpLocks/>
+          </p:cNvCxnSpPr>
+          <p:nvPr/>
+        </p:nvCxnSpPr>
+        <p:spPr>
+          <a:xfrm flipH="1">
+            <a:off x="8259333" y="4242431"/>
+            <a:ext cx="499382" cy="566638"/>
+          </a:xfrm>
+          <a:prstGeom prst="straightConnector1">
+            <a:avLst/>
+          </a:prstGeom>
+          <a:ln>
+            <a:tailEnd type="triangle"/>
+          </a:ln>
+        </p:spPr>
+        <p:style>
+          <a:lnRef idx="3">
+            <a:schemeClr val="accent4"/>
+          </a:lnRef>
+          <a:fillRef idx="0">
+            <a:schemeClr val="accent4"/>
+          </a:fillRef>
+          <a:effectRef idx="2">
+            <a:schemeClr val="accent4"/>
+          </a:effectRef>
+          <a:fontRef idx="minor">
+            <a:schemeClr val="tx1"/>
+          </a:fontRef>
+        </p:style>
+      </p:cxnSp>
+      <p:cxnSp>
+        <p:nvCxnSpPr>
+          <p:cNvPr id="57" name="Straight Arrow Connector 56">
+            <a:extLst>
+              <a:ext uri="{FF2B5EF4-FFF2-40B4-BE49-F238E27FC236}">
+                <a16:creationId xmlns:a16="http://schemas.microsoft.com/office/drawing/2014/main" id="{F95AD88F-FBAF-9D69-685A-50ED77FC6090}"/>
+              </a:ext>
+            </a:extLst>
+          </p:cNvPr>
+          <p:cNvCxnSpPr>
+            <a:cxnSpLocks/>
+            <a:endCxn id="18" idx="3"/>
+          </p:cNvCxnSpPr>
+          <p:nvPr/>
+        </p:nvCxnSpPr>
+        <p:spPr>
+          <a:xfrm flipH="1" flipV="1">
+            <a:off x="8778008" y="2361822"/>
+            <a:ext cx="430885" cy="874471"/>
+          </a:xfrm>
+          <a:prstGeom prst="straightConnector1">
+            <a:avLst/>
+          </a:prstGeom>
+          <a:ln>
+            <a:tailEnd type="triangle"/>
+          </a:ln>
+        </p:spPr>
+        <p:style>
+          <a:lnRef idx="3">
+            <a:schemeClr val="accent5"/>
+          </a:lnRef>
+          <a:fillRef idx="0">
+            <a:schemeClr val="accent5"/>
+          </a:fillRef>
+          <a:effectRef idx="2">
+            <a:schemeClr val="accent5"/>
+          </a:effectRef>
+          <a:fontRef idx="minor">
+            <a:schemeClr val="tx1"/>
+          </a:fontRef>
+        </p:style>
+      </p:cxnSp>
+      <p:cxnSp>
+        <p:nvCxnSpPr>
+          <p:cNvPr id="61" name="Straight Arrow Connector 60">
+            <a:extLst>
+              <a:ext uri="{FF2B5EF4-FFF2-40B4-BE49-F238E27FC236}">
+                <a16:creationId xmlns:a16="http://schemas.microsoft.com/office/drawing/2014/main" id="{1492CC71-B5B9-8112-B517-FE09DA5F62E4}"/>
+              </a:ext>
+            </a:extLst>
+          </p:cNvPr>
+          <p:cNvCxnSpPr>
+            <a:cxnSpLocks/>
+          </p:cNvCxnSpPr>
+          <p:nvPr/>
+        </p:nvCxnSpPr>
+        <p:spPr>
+          <a:xfrm>
+            <a:off x="8930995" y="2041452"/>
+            <a:ext cx="636748" cy="1387548"/>
+          </a:xfrm>
+          <a:prstGeom prst="straightConnector1">
+            <a:avLst/>
+          </a:prstGeom>
+          <a:ln>
+            <a:tailEnd type="triangle"/>
+          </a:ln>
+        </p:spPr>
+        <p:style>
+          <a:lnRef idx="3">
+            <a:schemeClr val="accent4"/>
+          </a:lnRef>
+          <a:fillRef idx="0">
+            <a:schemeClr val="accent4"/>
+          </a:fillRef>
+          <a:effectRef idx="2">
+            <a:schemeClr val="accent4"/>
+          </a:effectRef>
+          <a:fontRef idx="minor">
+            <a:schemeClr val="tx1"/>
+          </a:fontRef>
+        </p:style>
+      </p:cxnSp>
+      <p:cxnSp>
+        <p:nvCxnSpPr>
+          <p:cNvPr id="67" name="Straight Arrow Connector 66">
+            <a:extLst>
+              <a:ext uri="{FF2B5EF4-FFF2-40B4-BE49-F238E27FC236}">
+                <a16:creationId xmlns:a16="http://schemas.microsoft.com/office/drawing/2014/main" id="{74DDE0F5-386F-AD64-E872-1AD1B31C1CEE}"/>
+              </a:ext>
+            </a:extLst>
+          </p:cNvPr>
+          <p:cNvCxnSpPr>
+            <a:cxnSpLocks/>
+          </p:cNvCxnSpPr>
+          <p:nvPr/>
+        </p:nvCxnSpPr>
+        <p:spPr>
+          <a:xfrm>
+            <a:off x="3621547" y="4118346"/>
+            <a:ext cx="502648" cy="391181"/>
+          </a:xfrm>
+          <a:prstGeom prst="straightConnector1">
+            <a:avLst/>
+          </a:prstGeom>
+          <a:ln>
+            <a:tailEnd type="triangle"/>
+          </a:ln>
+        </p:spPr>
+        <p:style>
+          <a:lnRef idx="3">
+            <a:schemeClr val="accent5"/>
+          </a:lnRef>
+          <a:fillRef idx="0">
+            <a:schemeClr val="accent5"/>
+          </a:fillRef>
+          <a:effectRef idx="2">
+            <a:schemeClr val="accent5"/>
+          </a:effectRef>
+          <a:fontRef idx="minor">
+            <a:schemeClr val="tx1"/>
+          </a:fontRef>
+        </p:style>
+      </p:cxnSp>
+      <p:cxnSp>
+        <p:nvCxnSpPr>
+          <p:cNvPr id="70" name="Straight Arrow Connector 69">
+            <a:extLst>
+              <a:ext uri="{FF2B5EF4-FFF2-40B4-BE49-F238E27FC236}">
+                <a16:creationId xmlns:a16="http://schemas.microsoft.com/office/drawing/2014/main" id="{C7685426-4DCF-DD48-6687-19516C06FBC1}"/>
+              </a:ext>
+            </a:extLst>
+          </p:cNvPr>
+          <p:cNvCxnSpPr>
+            <a:cxnSpLocks/>
+          </p:cNvCxnSpPr>
+          <p:nvPr/>
+        </p:nvCxnSpPr>
+        <p:spPr>
+          <a:xfrm flipH="1" flipV="1">
+            <a:off x="3325801" y="4298327"/>
+            <a:ext cx="641134" cy="462359"/>
+          </a:xfrm>
+          <a:prstGeom prst="straightConnector1">
+            <a:avLst/>
+          </a:prstGeom>
+          <a:ln>
+            <a:tailEnd type="triangle"/>
+          </a:ln>
+        </p:spPr>
+        <p:style>
+          <a:lnRef idx="3">
+            <a:schemeClr val="accent4"/>
+          </a:lnRef>
+          <a:fillRef idx="0">
+            <a:schemeClr val="accent4"/>
+          </a:fillRef>
+          <a:effectRef idx="2">
+            <a:schemeClr val="accent4"/>
+          </a:effectRef>
+          <a:fontRef idx="minor">
+            <a:schemeClr val="tx1"/>
+          </a:fontRef>
+        </p:style>
+      </p:cxnSp>
+      <p:cxnSp>
+        <p:nvCxnSpPr>
+          <p:cNvPr id="75" name="Straight Arrow Connector 74">
+            <a:extLst>
+              <a:ext uri="{FF2B5EF4-FFF2-40B4-BE49-F238E27FC236}">
+                <a16:creationId xmlns:a16="http://schemas.microsoft.com/office/drawing/2014/main" id="{22C901FC-3A7B-DB34-EE5D-C4BE446899E9}"/>
+              </a:ext>
+            </a:extLst>
+          </p:cNvPr>
+          <p:cNvCxnSpPr>
+            <a:cxnSpLocks/>
+          </p:cNvCxnSpPr>
+          <p:nvPr/>
+        </p:nvCxnSpPr>
+        <p:spPr>
+          <a:xfrm flipH="1">
+            <a:off x="3143916" y="2464763"/>
+            <a:ext cx="336131" cy="649951"/>
+          </a:xfrm>
+          <a:prstGeom prst="straightConnector1">
+            <a:avLst/>
+          </a:prstGeom>
+          <a:ln>
+            <a:tailEnd type="triangle"/>
+          </a:ln>
+        </p:spPr>
+        <p:style>
+          <a:lnRef idx="3">
+            <a:schemeClr val="accent5"/>
+          </a:lnRef>
+          <a:fillRef idx="0">
+            <a:schemeClr val="accent5"/>
+          </a:fillRef>
+          <a:effectRef idx="2">
+            <a:schemeClr val="accent5"/>
+          </a:effectRef>
+          <a:fontRef idx="minor">
+            <a:schemeClr val="tx1"/>
+          </a:fontRef>
+        </p:style>
+      </p:cxnSp>
+      <p:cxnSp>
+        <p:nvCxnSpPr>
+          <p:cNvPr id="78" name="Straight Arrow Connector 77">
+            <a:extLst>
+              <a:ext uri="{FF2B5EF4-FFF2-40B4-BE49-F238E27FC236}">
+                <a16:creationId xmlns:a16="http://schemas.microsoft.com/office/drawing/2014/main" id="{F8884241-719F-4F25-FA4B-C73BF5E22757}"/>
+              </a:ext>
+            </a:extLst>
+          </p:cNvPr>
+          <p:cNvCxnSpPr>
+            <a:cxnSpLocks/>
+          </p:cNvCxnSpPr>
+          <p:nvPr/>
+        </p:nvCxnSpPr>
+        <p:spPr>
+          <a:xfrm flipV="1">
+            <a:off x="2732203" y="2111011"/>
+            <a:ext cx="593598" cy="1258243"/>
+          </a:xfrm>
+          <a:prstGeom prst="straightConnector1">
+            <a:avLst/>
+          </a:prstGeom>
+          <a:ln>
+            <a:tailEnd type="triangle"/>
+          </a:ln>
+        </p:spPr>
+        <p:style>
+          <a:lnRef idx="3">
+            <a:schemeClr val="accent4"/>
+          </a:lnRef>
+          <a:fillRef idx="0">
+            <a:schemeClr val="accent4"/>
+          </a:fillRef>
+          <a:effectRef idx="2">
+            <a:schemeClr val="accent4"/>
+          </a:effectRef>
+          <a:fontRef idx="minor">
+            <a:schemeClr val="tx1"/>
+          </a:fontRef>
+        </p:style>
+      </p:cxnSp>
+      <p:cxnSp>
+        <p:nvCxnSpPr>
+          <p:cNvPr id="84" name="Straight Arrow Connector 83">
+            <a:extLst>
+              <a:ext uri="{FF2B5EF4-FFF2-40B4-BE49-F238E27FC236}">
+                <a16:creationId xmlns:a16="http://schemas.microsoft.com/office/drawing/2014/main" id="{961E6B09-A124-D530-84A9-797C2E00B407}"/>
+              </a:ext>
+            </a:extLst>
+          </p:cNvPr>
+          <p:cNvCxnSpPr>
+            <a:cxnSpLocks/>
+          </p:cNvCxnSpPr>
+          <p:nvPr/>
+        </p:nvCxnSpPr>
+        <p:spPr>
+          <a:xfrm>
+            <a:off x="4860381" y="1722268"/>
+            <a:ext cx="2481452" cy="0"/>
+          </a:xfrm>
+          <a:prstGeom prst="straightConnector1">
+            <a:avLst/>
+          </a:prstGeom>
+          <a:ln w="38100" cap="flat" cmpd="sng" algn="ctr">
+            <a:solidFill>
+              <a:schemeClr val="accent4"/>
+            </a:solidFill>
+            <a:prstDash val="sysDot"/>
+            <a:round/>
+            <a:headEnd type="none" w="lg" len="med"/>
+            <a:tailEnd type="triangle" w="lg" len="med"/>
+          </a:ln>
+        </p:spPr>
+        <p:style>
+          <a:lnRef idx="0">
+            <a:scrgbClr r="0" g="0" b="0"/>
+          </a:lnRef>
+          <a:fillRef idx="0">
+            <a:scrgbClr r="0" g="0" b="0"/>
+          </a:fillRef>
+          <a:effectRef idx="0">
+            <a:scrgbClr r="0" g="0" b="0"/>
+          </a:effectRef>
+          <a:fontRef idx="minor">
+            <a:schemeClr val="tx1"/>
+          </a:fontRef>
+        </p:style>
+      </p:cxnSp>
+      <p:cxnSp>
+        <p:nvCxnSpPr>
+          <p:cNvPr id="87" name="Straight Arrow Connector 86">
+            <a:extLst>
+              <a:ext uri="{FF2B5EF4-FFF2-40B4-BE49-F238E27FC236}">
+                <a16:creationId xmlns:a16="http://schemas.microsoft.com/office/drawing/2014/main" id="{3EB2159D-A0D9-8B5E-FD41-9AC6F0F28096}"/>
+              </a:ext>
+            </a:extLst>
+          </p:cNvPr>
+          <p:cNvCxnSpPr>
+            <a:cxnSpLocks/>
+          </p:cNvCxnSpPr>
+          <p:nvPr/>
+        </p:nvCxnSpPr>
+        <p:spPr>
+          <a:xfrm>
+            <a:off x="4860381" y="2019587"/>
+            <a:ext cx="2481452" cy="0"/>
+          </a:xfrm>
+          <a:prstGeom prst="straightConnector1">
+            <a:avLst/>
+          </a:prstGeom>
+          <a:ln w="31750" cap="flat" cmpd="sng" algn="ctr">
+            <a:solidFill>
+              <a:schemeClr val="accent5"/>
+            </a:solidFill>
+            <a:prstDash val="sysDot"/>
+            <a:round/>
+            <a:headEnd type="triangle" w="lg" len="med"/>
+            <a:tailEnd type="none" w="lg" len="med"/>
+          </a:ln>
+        </p:spPr>
+        <p:style>
+          <a:lnRef idx="0">
+            <a:scrgbClr r="0" g="0" b="0"/>
+          </a:lnRef>
+          <a:fillRef idx="0">
+            <a:scrgbClr r="0" g="0" b="0"/>
+          </a:fillRef>
+          <a:effectRef idx="0">
+            <a:scrgbClr r="0" g="0" b="0"/>
+          </a:effectRef>
+          <a:fontRef idx="minor">
+            <a:schemeClr val="tx1"/>
+          </a:fontRef>
+        </p:style>
+      </p:cxnSp>
+      <p:sp>
+        <p:nvSpPr>
+          <p:cNvPr id="88" name="TextBox 87">
+            <a:extLst>
+              <a:ext uri="{FF2B5EF4-FFF2-40B4-BE49-F238E27FC236}">
+                <a16:creationId xmlns:a16="http://schemas.microsoft.com/office/drawing/2014/main" id="{39F201ED-35EE-593F-4A49-E171C62E8A38}"/>
+              </a:ext>
+            </a:extLst>
+          </p:cNvPr>
+          <p:cNvSpPr txBox="1"/>
+          <p:nvPr/>
+        </p:nvSpPr>
+        <p:spPr>
+          <a:xfrm>
+            <a:off x="5816115" y="1297766"/>
+            <a:ext cx="574196" cy="369332"/>
+          </a:xfrm>
+          <a:prstGeom prst="rect">
+            <a:avLst/>
+          </a:prstGeom>
+          <a:noFill/>
+        </p:spPr>
+        <p:txBody>
+          <a:bodyPr wrap="none" rtlCol="0">
+            <a:spAutoFit/>
+          </a:bodyPr>
+          <a:lstStyle/>
+          <a:p>
+            <a:r>
+              <a:rPr lang="en-US" dirty="0"/>
+              <a:t>...….</a:t>
+            </a:r>
+          </a:p>
+        </p:txBody>
+      </p:sp>
+      <p:cxnSp>
+        <p:nvCxnSpPr>
+          <p:cNvPr id="89" name="Straight Arrow Connector 88">
+            <a:extLst>
+              <a:ext uri="{FF2B5EF4-FFF2-40B4-BE49-F238E27FC236}">
+                <a16:creationId xmlns:a16="http://schemas.microsoft.com/office/drawing/2014/main" id="{BE2050EE-CAC1-BD60-0F73-CE50D5D337C6}"/>
+              </a:ext>
+            </a:extLst>
+          </p:cNvPr>
+          <p:cNvCxnSpPr>
+            <a:cxnSpLocks/>
+          </p:cNvCxnSpPr>
+          <p:nvPr/>
+        </p:nvCxnSpPr>
+        <p:spPr>
+          <a:xfrm>
+            <a:off x="10110876" y="5777256"/>
+            <a:ext cx="568413" cy="0"/>
+          </a:xfrm>
+          <a:prstGeom prst="straightConnector1">
+            <a:avLst/>
+          </a:prstGeom>
+          <a:ln>
+            <a:tailEnd type="triangle"/>
+          </a:ln>
+        </p:spPr>
+        <p:style>
+          <a:lnRef idx="3">
+            <a:schemeClr val="accent5"/>
+          </a:lnRef>
+          <a:fillRef idx="0">
+            <a:schemeClr val="accent5"/>
+          </a:fillRef>
+          <a:effectRef idx="2">
+            <a:schemeClr val="accent5"/>
+          </a:effectRef>
+          <a:fontRef idx="minor">
+            <a:schemeClr val="tx1"/>
+          </a:fontRef>
+        </p:style>
+      </p:cxnSp>
+      <p:sp>
+        <p:nvSpPr>
+          <p:cNvPr id="92" name="TextBox 91">
+            <a:extLst>
+              <a:ext uri="{FF2B5EF4-FFF2-40B4-BE49-F238E27FC236}">
+                <a16:creationId xmlns:a16="http://schemas.microsoft.com/office/drawing/2014/main" id="{E10DC723-BE5E-08D1-5FB4-459539ADD43F}"/>
+              </a:ext>
+            </a:extLst>
+          </p:cNvPr>
+          <p:cNvSpPr txBox="1"/>
+          <p:nvPr/>
+        </p:nvSpPr>
+        <p:spPr>
+          <a:xfrm>
+            <a:off x="10577690" y="5620588"/>
+            <a:ext cx="601831" cy="307777"/>
+          </a:xfrm>
+          <a:prstGeom prst="rect">
+            <a:avLst/>
+          </a:prstGeom>
+          <a:noFill/>
+        </p:spPr>
+        <p:txBody>
+          <a:bodyPr wrap="none" rtlCol="0">
+            <a:spAutoFit/>
+          </a:bodyPr>
+          <a:lstStyle/>
+          <a:p>
+            <a:r>
+              <a:rPr lang="en-US" sz="1400" b="1" dirty="0"/>
+              <a:t>: next</a:t>
+            </a:r>
+          </a:p>
+        </p:txBody>
+      </p:sp>
+      <p:sp>
+        <p:nvSpPr>
+          <p:cNvPr id="94" name="TextBox 93">
+            <a:extLst>
+              <a:ext uri="{FF2B5EF4-FFF2-40B4-BE49-F238E27FC236}">
+                <a16:creationId xmlns:a16="http://schemas.microsoft.com/office/drawing/2014/main" id="{343F72A5-B258-5B16-2F85-AA6FD4080A23}"/>
+              </a:ext>
+            </a:extLst>
+          </p:cNvPr>
+          <p:cNvSpPr txBox="1"/>
+          <p:nvPr/>
+        </p:nvSpPr>
+        <p:spPr>
+          <a:xfrm>
+            <a:off x="10577690" y="5984918"/>
+            <a:ext cx="606576" cy="307777"/>
+          </a:xfrm>
+          <a:prstGeom prst="rect">
+            <a:avLst/>
+          </a:prstGeom>
+          <a:noFill/>
+        </p:spPr>
+        <p:txBody>
+          <a:bodyPr wrap="none" rtlCol="0">
+            <a:spAutoFit/>
+          </a:bodyPr>
+          <a:lstStyle/>
+          <a:p>
+            <a:r>
+              <a:rPr lang="en-US" sz="1400" b="1" dirty="0"/>
+              <a:t>: prev</a:t>
+            </a:r>
+          </a:p>
+        </p:txBody>
+      </p:sp>
+      <p:cxnSp>
+        <p:nvCxnSpPr>
+          <p:cNvPr id="95" name="Straight Arrow Connector 94">
+            <a:extLst>
+              <a:ext uri="{FF2B5EF4-FFF2-40B4-BE49-F238E27FC236}">
+                <a16:creationId xmlns:a16="http://schemas.microsoft.com/office/drawing/2014/main" id="{36754004-D822-9605-077E-2C3DC848367D}"/>
+              </a:ext>
+            </a:extLst>
+          </p:cNvPr>
+          <p:cNvCxnSpPr>
+            <a:cxnSpLocks/>
+          </p:cNvCxnSpPr>
+          <p:nvPr/>
+        </p:nvCxnSpPr>
+        <p:spPr>
+          <a:xfrm flipH="1">
+            <a:off x="10110876" y="6140857"/>
+            <a:ext cx="568413" cy="0"/>
+          </a:xfrm>
+          <a:prstGeom prst="straightConnector1">
+            <a:avLst/>
+          </a:prstGeom>
+          <a:ln>
+            <a:tailEnd type="triangle"/>
+          </a:ln>
+        </p:spPr>
+        <p:style>
+          <a:lnRef idx="3">
+            <a:schemeClr val="accent4"/>
+          </a:lnRef>
+          <a:fillRef idx="0">
+            <a:schemeClr val="accent4"/>
+          </a:fillRef>
+          <a:effectRef idx="2">
+            <a:schemeClr val="accent4"/>
+          </a:effectRef>
+          <a:fontRef idx="minor">
+            <a:schemeClr val="tx1"/>
+          </a:fontRef>
+        </p:style>
+      </p:cxnSp>
+      <p:sp>
+        <p:nvSpPr>
+          <p:cNvPr id="97" name="Down Arrow 96">
+            <a:extLst>
+              <a:ext uri="{FF2B5EF4-FFF2-40B4-BE49-F238E27FC236}">
+                <a16:creationId xmlns:a16="http://schemas.microsoft.com/office/drawing/2014/main" id="{6F880298-DC35-5EFF-0B42-2879BA6A2465}"/>
+              </a:ext>
+            </a:extLst>
+          </p:cNvPr>
+          <p:cNvSpPr/>
+          <p:nvPr/>
+        </p:nvSpPr>
+        <p:spPr>
+          <a:xfrm>
+            <a:off x="6756989" y="4509527"/>
+            <a:ext cx="172806" cy="576503"/>
+          </a:xfrm>
+          <a:prstGeom prst="downArrow">
+            <a:avLst/>
+          </a:prstGeom>
+          <a:solidFill>
+            <a:srgbClr val="0070C0"/>
+          </a:solidFill>
+        </p:spPr>
+        <p:style>
+          <a:lnRef idx="2">
+            <a:schemeClr val="accent1">
+              <a:shade val="50000"/>
+            </a:schemeClr>
+          </a:lnRef>
+          <a:fillRef idx="1">
+            <a:schemeClr val="accent1"/>
+          </a:fillRef>
+          <a:effectRef idx="0">
+            <a:schemeClr val="accent1"/>
+          </a:effectRef>
+          <a:fontRef idx="minor">
+            <a:schemeClr val="lt1"/>
+          </a:fontRef>
+        </p:style>
+        <p:txBody>
+          <a:bodyPr rtlCol="0" anchor="ctr"/>
+          <a:lstStyle/>
+          <a:p>
+            <a:pPr algn="ctr"/>
+            <a:endParaRPr lang="en-US"/>
+          </a:p>
+        </p:txBody>
+      </p:sp>
+      <p:sp>
+        <p:nvSpPr>
+          <p:cNvPr id="98" name="TextBox 97">
+            <a:extLst>
+              <a:ext uri="{FF2B5EF4-FFF2-40B4-BE49-F238E27FC236}">
+                <a16:creationId xmlns:a16="http://schemas.microsoft.com/office/drawing/2014/main" id="{C6ED59B8-9D6D-63B5-8509-3690DBB90DAD}"/>
+              </a:ext>
+            </a:extLst>
+          </p:cNvPr>
+          <p:cNvSpPr txBox="1"/>
+          <p:nvPr/>
+        </p:nvSpPr>
+        <p:spPr>
+          <a:xfrm>
+            <a:off x="6475434" y="4198865"/>
+            <a:ext cx="780214" cy="307777"/>
+          </a:xfrm>
+          <a:prstGeom prst="rect">
+            <a:avLst/>
+          </a:prstGeom>
+          <a:noFill/>
+        </p:spPr>
+        <p:txBody>
+          <a:bodyPr wrap="none" rtlCol="0">
+            <a:spAutoFit/>
+          </a:bodyPr>
+          <a:lstStyle/>
+          <a:p>
+            <a:r>
+              <a:rPr lang="en-US" sz="1400" i="1" dirty="0"/>
+              <a:t>brelse( )</a:t>
+            </a:r>
+          </a:p>
+        </p:txBody>
+      </p:sp>
+      <p:sp>
+        <p:nvSpPr>
+          <p:cNvPr id="112" name="Left Arrow 111">
+            <a:extLst>
+              <a:ext uri="{FF2B5EF4-FFF2-40B4-BE49-F238E27FC236}">
+                <a16:creationId xmlns:a16="http://schemas.microsoft.com/office/drawing/2014/main" id="{8A98ED8C-6B09-F206-4EB6-D056D4D026B5}"/>
+              </a:ext>
+            </a:extLst>
+          </p:cNvPr>
+          <p:cNvSpPr/>
+          <p:nvPr/>
+        </p:nvSpPr>
+        <p:spPr>
+          <a:xfrm rot="1719417">
+            <a:off x="3426330" y="5327650"/>
+            <a:ext cx="1309482" cy="342552"/>
+          </a:xfrm>
+          <a:prstGeom prst="leftArrow">
+            <a:avLst/>
+          </a:prstGeom>
+          <a:solidFill>
+            <a:srgbClr val="FFFF00"/>
+          </a:solidFill>
+        </p:spPr>
+        <p:style>
+          <a:lnRef idx="2">
+            <a:schemeClr val="accent1">
+              <a:shade val="50000"/>
+            </a:schemeClr>
+          </a:lnRef>
+          <a:fillRef idx="1">
+            <a:schemeClr val="accent1"/>
+          </a:fillRef>
+          <a:effectRef idx="0">
+            <a:schemeClr val="accent1"/>
+          </a:effectRef>
+          <a:fontRef idx="minor">
+            <a:schemeClr val="lt1"/>
+          </a:fontRef>
+        </p:style>
+        <p:txBody>
+          <a:bodyPr rtlCol="0" anchor="ctr"/>
+          <a:lstStyle/>
+          <a:p>
+            <a:pPr algn="ctr"/>
+            <a:endParaRPr lang="en-US"/>
+          </a:p>
+        </p:txBody>
+      </p:sp>
+      <p:sp>
+        <p:nvSpPr>
+          <p:cNvPr id="113" name="TextBox 112">
+            <a:extLst>
+              <a:ext uri="{FF2B5EF4-FFF2-40B4-BE49-F238E27FC236}">
+                <a16:creationId xmlns:a16="http://schemas.microsoft.com/office/drawing/2014/main" id="{AD9F0FC0-A4B1-D630-44DF-77E689415323}"/>
+              </a:ext>
+            </a:extLst>
+          </p:cNvPr>
+          <p:cNvSpPr txBox="1"/>
+          <p:nvPr/>
+        </p:nvSpPr>
+        <p:spPr>
+          <a:xfrm rot="1819363">
+            <a:off x="2879489" y="5623877"/>
+            <a:ext cx="1986762" cy="369332"/>
+          </a:xfrm>
+          <a:prstGeom prst="rect">
+            <a:avLst/>
+          </a:prstGeom>
+          <a:noFill/>
+        </p:spPr>
+        <p:txBody>
+          <a:bodyPr wrap="none" rtlCol="0">
+            <a:spAutoFit/>
+          </a:bodyPr>
+          <a:lstStyle/>
+          <a:p>
+            <a:r>
+              <a:rPr lang="en-US" dirty="0"/>
+              <a:t>Least recently used</a:t>
+            </a:r>
+          </a:p>
+        </p:txBody>
+      </p:sp>
+      <p:sp>
+        <p:nvSpPr>
+          <p:cNvPr id="115" name="Left Arrow 114">
+            <a:extLst>
+              <a:ext uri="{FF2B5EF4-FFF2-40B4-BE49-F238E27FC236}">
+                <a16:creationId xmlns:a16="http://schemas.microsoft.com/office/drawing/2014/main" id="{9E4FDA34-AA5C-6D22-4A5A-A5D560789FB5}"/>
+              </a:ext>
+            </a:extLst>
+          </p:cNvPr>
+          <p:cNvSpPr/>
+          <p:nvPr/>
+        </p:nvSpPr>
+        <p:spPr>
+          <a:xfrm rot="8955625">
+            <a:off x="7452689" y="5319054"/>
+            <a:ext cx="1309482" cy="342552"/>
+          </a:xfrm>
+          <a:prstGeom prst="leftArrow">
+            <a:avLst/>
+          </a:prstGeom>
+          <a:solidFill>
+            <a:schemeClr val="accent2"/>
+          </a:solidFill>
+        </p:spPr>
+        <p:style>
+          <a:lnRef idx="2">
+            <a:schemeClr val="accent1">
+              <a:shade val="50000"/>
+            </a:schemeClr>
+          </a:lnRef>
+          <a:fillRef idx="1">
+            <a:schemeClr val="accent1"/>
+          </a:fillRef>
+          <a:effectRef idx="0">
+            <a:schemeClr val="accent1"/>
+          </a:effectRef>
+          <a:fontRef idx="minor">
+            <a:schemeClr val="lt1"/>
+          </a:fontRef>
+        </p:style>
+        <p:txBody>
+          <a:bodyPr rtlCol="0" anchor="ctr"/>
+          <a:lstStyle/>
+          <a:p>
+            <a:pPr algn="ctr"/>
+            <a:endParaRPr lang="en-US"/>
+          </a:p>
+        </p:txBody>
+      </p:sp>
+      <p:sp>
+        <p:nvSpPr>
+          <p:cNvPr id="116" name="TextBox 115">
+            <a:extLst>
+              <a:ext uri="{FF2B5EF4-FFF2-40B4-BE49-F238E27FC236}">
+                <a16:creationId xmlns:a16="http://schemas.microsoft.com/office/drawing/2014/main" id="{28A3C6F5-C50A-B3E1-290D-C386E1E22B57}"/>
+              </a:ext>
+            </a:extLst>
+          </p:cNvPr>
+          <p:cNvSpPr txBox="1"/>
+          <p:nvPr/>
+        </p:nvSpPr>
+        <p:spPr>
+          <a:xfrm rot="19636333">
+            <a:off x="7335587" y="5574469"/>
+            <a:ext cx="1981953" cy="369332"/>
+          </a:xfrm>
+          <a:prstGeom prst="rect">
+            <a:avLst/>
+          </a:prstGeom>
+          <a:noFill/>
+        </p:spPr>
+        <p:txBody>
+          <a:bodyPr wrap="none" rtlCol="0">
+            <a:spAutoFit/>
+          </a:bodyPr>
+          <a:lstStyle/>
+          <a:p>
+            <a:r>
+              <a:rPr lang="en-US" dirty="0"/>
+              <a:t>Most recently used</a:t>
+            </a:r>
+          </a:p>
+        </p:txBody>
+      </p:sp>
+      <p:sp>
+        <p:nvSpPr>
+          <p:cNvPr id="117" name="Rectangle 116">
+            <a:extLst>
+              <a:ext uri="{FF2B5EF4-FFF2-40B4-BE49-F238E27FC236}">
+                <a16:creationId xmlns:a16="http://schemas.microsoft.com/office/drawing/2014/main" id="{98538EF1-BDBE-BB3A-C8D1-582EEB455B35}"/>
+              </a:ext>
+            </a:extLst>
+          </p:cNvPr>
+          <p:cNvSpPr/>
+          <p:nvPr/>
+        </p:nvSpPr>
+        <p:spPr>
+          <a:xfrm>
+            <a:off x="5743034" y="3047704"/>
+            <a:ext cx="702815" cy="762592"/>
+          </a:xfrm>
+          <a:prstGeom prst="rect">
+            <a:avLst/>
+          </a:prstGeom>
+          <a:noFill/>
+          <a:ln>
+            <a:solidFill>
+              <a:srgbClr val="FF0000"/>
+            </a:solidFill>
+          </a:ln>
+        </p:spPr>
+        <p:style>
+          <a:lnRef idx="2">
+            <a:schemeClr val="accent1">
+              <a:shade val="50000"/>
+            </a:schemeClr>
+          </a:lnRef>
+          <a:fillRef idx="1">
+            <a:schemeClr val="accent1"/>
+          </a:fillRef>
+          <a:effectRef idx="0">
+            <a:schemeClr val="accent1"/>
+          </a:effectRef>
+          <a:fontRef idx="minor">
+            <a:schemeClr val="lt1"/>
+          </a:fontRef>
+        </p:style>
+        <p:txBody>
+          <a:bodyPr rtlCol="0" anchor="ctr"/>
+          <a:lstStyle/>
+          <a:p>
+            <a:pPr algn="ctr"/>
+            <a:endParaRPr lang="en-US"/>
+          </a:p>
+        </p:txBody>
+      </p:sp>
+      <p:sp>
+        <p:nvSpPr>
+          <p:cNvPr id="118" name="TextBox 117">
+            <a:extLst>
+              <a:ext uri="{FF2B5EF4-FFF2-40B4-BE49-F238E27FC236}">
+                <a16:creationId xmlns:a16="http://schemas.microsoft.com/office/drawing/2014/main" id="{2F925E0C-763D-6EC3-F5AA-A02F1DA64CA8}"/>
+              </a:ext>
+            </a:extLst>
+          </p:cNvPr>
+          <p:cNvSpPr txBox="1"/>
+          <p:nvPr/>
+        </p:nvSpPr>
+        <p:spPr>
+          <a:xfrm>
+            <a:off x="5807343" y="3213189"/>
+            <a:ext cx="574196" cy="369332"/>
+          </a:xfrm>
+          <a:prstGeom prst="rect">
+            <a:avLst/>
+          </a:prstGeom>
+          <a:noFill/>
+        </p:spPr>
+        <p:txBody>
+          <a:bodyPr wrap="none" rtlCol="0">
+            <a:spAutoFit/>
+          </a:bodyPr>
+          <a:lstStyle/>
+          <a:p>
+            <a:r>
+              <a:rPr lang="en-US" dirty="0"/>
+              <a:t>Disk</a:t>
+            </a:r>
+          </a:p>
+        </p:txBody>
+      </p:sp>
+      <p:sp>
+        <p:nvSpPr>
+          <p:cNvPr id="120" name="Doughnut 119">
+            <a:extLst>
+              <a:ext uri="{FF2B5EF4-FFF2-40B4-BE49-F238E27FC236}">
+                <a16:creationId xmlns:a16="http://schemas.microsoft.com/office/drawing/2014/main" id="{01CF477B-4CAF-0EBB-D574-29E0549FFED1}"/>
+              </a:ext>
+            </a:extLst>
+          </p:cNvPr>
+          <p:cNvSpPr/>
+          <p:nvPr/>
+        </p:nvSpPr>
+        <p:spPr>
+          <a:xfrm>
+            <a:off x="5309338" y="2642151"/>
+            <a:ext cx="1556204" cy="1557789"/>
+          </a:xfrm>
+          <a:prstGeom prst="donut">
+            <a:avLst>
+              <a:gd name="adj" fmla="val 11491"/>
+            </a:avLst>
+          </a:prstGeom>
+        </p:spPr>
+        <p:style>
+          <a:lnRef idx="2">
+            <a:schemeClr val="accent1">
+              <a:shade val="50000"/>
+            </a:schemeClr>
+          </a:lnRef>
+          <a:fillRef idx="1">
+            <a:schemeClr val="accent1"/>
+          </a:fillRef>
+          <a:effectRef idx="0">
+            <a:schemeClr val="accent1"/>
+          </a:effectRef>
+          <a:fontRef idx="minor">
+            <a:schemeClr val="lt1"/>
+          </a:fontRef>
+        </p:style>
+        <p:txBody>
+          <a:bodyPr rtlCol="0" anchor="ctr"/>
+          <a:lstStyle/>
+          <a:p>
+            <a:pPr algn="ctr"/>
+            <a:endParaRPr lang="en-US">
+              <a:solidFill>
+                <a:schemeClr val="tx1"/>
+              </a:solidFill>
+            </a:endParaRPr>
+          </a:p>
+        </p:txBody>
+      </p:sp>
+      <p:sp>
+        <p:nvSpPr>
+          <p:cNvPr id="121" name="TextBox 120">
+            <a:extLst>
+              <a:ext uri="{FF2B5EF4-FFF2-40B4-BE49-F238E27FC236}">
+                <a16:creationId xmlns:a16="http://schemas.microsoft.com/office/drawing/2014/main" id="{B8C9518A-FD23-7495-0DB0-67E39425A2CA}"/>
+              </a:ext>
+            </a:extLst>
+          </p:cNvPr>
+          <p:cNvSpPr txBox="1"/>
+          <p:nvPr/>
+        </p:nvSpPr>
+        <p:spPr>
+          <a:xfrm>
+            <a:off x="5673650" y="2596726"/>
+            <a:ext cx="854914" cy="276999"/>
+          </a:xfrm>
+          <a:prstGeom prst="rect">
+            <a:avLst/>
+          </a:prstGeom>
+          <a:noFill/>
+        </p:spPr>
+        <p:txBody>
+          <a:bodyPr wrap="none" rtlCol="0">
+            <a:spAutoFit/>
+          </a:bodyPr>
+          <a:lstStyle/>
+          <a:p>
+            <a:r>
+              <a:rPr lang="en-US" sz="1200" b="1" dirty="0"/>
+              <a:t>disk driver</a:t>
+            </a:r>
+          </a:p>
+        </p:txBody>
+      </p:sp>
+      <p:sp>
+        <p:nvSpPr>
+          <p:cNvPr id="123" name="Down Arrow 122">
+            <a:extLst>
+              <a:ext uri="{FF2B5EF4-FFF2-40B4-BE49-F238E27FC236}">
+                <a16:creationId xmlns:a16="http://schemas.microsoft.com/office/drawing/2014/main" id="{0DCF8FC6-D835-C167-FA5C-3E20866FD8FD}"/>
+              </a:ext>
+            </a:extLst>
+          </p:cNvPr>
+          <p:cNvSpPr/>
+          <p:nvPr/>
+        </p:nvSpPr>
+        <p:spPr>
+          <a:xfrm rot="12808621">
+            <a:off x="4930563" y="3531118"/>
+            <a:ext cx="166029" cy="1104432"/>
+          </a:xfrm>
+          <a:prstGeom prst="downArrow">
+            <a:avLst/>
+          </a:prstGeom>
+          <a:solidFill>
+            <a:srgbClr val="0070C0"/>
+          </a:solidFill>
+        </p:spPr>
+        <p:style>
+          <a:lnRef idx="2">
+            <a:schemeClr val="accent1">
+              <a:shade val="50000"/>
+            </a:schemeClr>
+          </a:lnRef>
+          <a:fillRef idx="1">
+            <a:schemeClr val="accent1"/>
+          </a:fillRef>
+          <a:effectRef idx="0">
+            <a:schemeClr val="accent1"/>
+          </a:effectRef>
+          <a:fontRef idx="minor">
+            <a:schemeClr val="lt1"/>
+          </a:fontRef>
+        </p:style>
+        <p:txBody>
+          <a:bodyPr rtlCol="0" anchor="ctr"/>
+          <a:lstStyle/>
+          <a:p>
+            <a:pPr algn="ctr"/>
+            <a:endParaRPr lang="en-US"/>
+          </a:p>
+        </p:txBody>
+      </p:sp>
+      <p:sp>
+        <p:nvSpPr>
+          <p:cNvPr id="124" name="TextBox 123">
+            <a:extLst>
+              <a:ext uri="{FF2B5EF4-FFF2-40B4-BE49-F238E27FC236}">
+                <a16:creationId xmlns:a16="http://schemas.microsoft.com/office/drawing/2014/main" id="{4B598800-ACC8-DC2C-441F-609408B4E036}"/>
+              </a:ext>
+            </a:extLst>
+          </p:cNvPr>
+          <p:cNvSpPr txBox="1"/>
+          <p:nvPr/>
+        </p:nvSpPr>
+        <p:spPr>
+          <a:xfrm>
+            <a:off x="4339183" y="3931806"/>
+            <a:ext cx="1366977" cy="307777"/>
+          </a:xfrm>
+          <a:prstGeom prst="rect">
+            <a:avLst/>
+          </a:prstGeom>
+          <a:noFill/>
+        </p:spPr>
+        <p:txBody>
+          <a:bodyPr wrap="none" rtlCol="0">
+            <a:spAutoFit/>
+          </a:bodyPr>
+          <a:lstStyle/>
+          <a:p>
+            <a:r>
+              <a:rPr lang="en-US" sz="1400" i="1" dirty="0"/>
+              <a:t>virtio_disk_rw( )</a:t>
+            </a:r>
+          </a:p>
+        </p:txBody>
+      </p:sp>
+    </p:spTree>
+    <p:extLst>
+      <p:ext uri="{BB962C8B-B14F-4D97-AF65-F5344CB8AC3E}">
+        <p14:creationId xmlns:p14="http://schemas.microsoft.com/office/powerpoint/2010/main" val="1153895007"/>
+      </p:ext>
+    </p:extLst>
+  </p:cSld>
+  <p:clrMapOvr>
+    <a:masterClrMapping/>
+  </p:clrMapOvr>
+</p:sld>
+</file>
+
+<file path=ppt/slides/slide17.xml><?xml version="1.0" encoding="utf-8"?>
 <p:sld xmlns:a="http://schemas.openxmlformats.org/drawingml/2006/main" xmlns:r="http://schemas.openxmlformats.org/officeDocument/2006/relationships" xmlns:p="http://schemas.openxmlformats.org/presentationml/2006/main">
   <p:cSld>
     <p:spTree>

</xml_diff>

<commit_message>
split file systems into two articles, finish the first one
</commit_message>
<xml_diff>
--- a/docs/figures/os1.pptx
+++ b/docs/figures/os1.pptx
@@ -5,7 +5,7 @@
     <p:sldMasterId id="2147483648" r:id="rId1"/>
   </p:sldMasterIdLst>
   <p:notesMasterIdLst>
-    <p:notesMasterId r:id="rId22"/>
+    <p:notesMasterId r:id="rId24"/>
   </p:notesMasterIdLst>
   <p:sldIdLst>
     <p:sldId id="331" r:id="rId2"/>
@@ -27,7 +27,9 @@
     <p:sldId id="350" r:id="rId18"/>
     <p:sldId id="354" r:id="rId19"/>
     <p:sldId id="352" r:id="rId20"/>
-    <p:sldId id="353" r:id="rId21"/>
+    <p:sldId id="355" r:id="rId21"/>
+    <p:sldId id="356" r:id="rId22"/>
+    <p:sldId id="353" r:id="rId23"/>
   </p:sldIdLst>
   <p:sldSz cx="12192000" cy="6858000"/>
   <p:notesSz cx="6858000" cy="9144000"/>
@@ -1558,6 +1560,174 @@
             <a:fld id="{997274CE-51E2-314F-8544-5E91EE33A09F}" type="slidenum">
               <a:rPr lang="en-US" smtClean="0"/>
               <a:t>20</a:t>
+            </a:fld>
+            <a:endParaRPr lang="en-US"/>
+          </a:p>
+        </p:txBody>
+      </p:sp>
+    </p:spTree>
+    <p:extLst>
+      <p:ext uri="{BB962C8B-B14F-4D97-AF65-F5344CB8AC3E}">
+        <p14:creationId xmlns:p14="http://schemas.microsoft.com/office/powerpoint/2010/main" val="41041808"/>
+      </p:ext>
+    </p:extLst>
+  </p:cSld>
+  <p:clrMapOvr>
+    <a:masterClrMapping/>
+  </p:clrMapOvr>
+</p:notes>
+</file>
+
+<file path=ppt/notesSlides/notesSlide21.xml><?xml version="1.0" encoding="utf-8"?>
+<p:notes xmlns:a="http://schemas.openxmlformats.org/drawingml/2006/main" xmlns:r="http://schemas.openxmlformats.org/officeDocument/2006/relationships" xmlns:p="http://schemas.openxmlformats.org/presentationml/2006/main">
+  <p:cSld>
+    <p:spTree>
+      <p:nvGrpSpPr>
+        <p:cNvPr id="1" name=""/>
+        <p:cNvGrpSpPr/>
+        <p:nvPr/>
+      </p:nvGrpSpPr>
+      <p:grpSpPr>
+        <a:xfrm>
+          <a:off x="0" y="0"/>
+          <a:ext cx="0" cy="0"/>
+          <a:chOff x="0" y="0"/>
+          <a:chExt cx="0" cy="0"/>
+        </a:xfrm>
+      </p:grpSpPr>
+      <p:sp>
+        <p:nvSpPr>
+          <p:cNvPr id="2" name="Slide Image Placeholder 1"/>
+          <p:cNvSpPr>
+            <a:spLocks noGrp="1" noRot="1" noChangeAspect="1"/>
+          </p:cNvSpPr>
+          <p:nvPr>
+            <p:ph type="sldImg"/>
+          </p:nvPr>
+        </p:nvSpPr>
+        <p:spPr/>
+      </p:sp>
+      <p:sp>
+        <p:nvSpPr>
+          <p:cNvPr id="3" name="Notes Placeholder 2"/>
+          <p:cNvSpPr>
+            <a:spLocks noGrp="1"/>
+          </p:cNvSpPr>
+          <p:nvPr>
+            <p:ph type="body" idx="1"/>
+          </p:nvPr>
+        </p:nvSpPr>
+        <p:spPr/>
+        <p:txBody>
+          <a:bodyPr/>
+          <a:lstStyle/>
+          <a:p>
+            <a:endParaRPr lang="en-US" dirty="0"/>
+          </a:p>
+        </p:txBody>
+      </p:sp>
+      <p:sp>
+        <p:nvSpPr>
+          <p:cNvPr id="4" name="Slide Number Placeholder 3"/>
+          <p:cNvSpPr>
+            <a:spLocks noGrp="1"/>
+          </p:cNvSpPr>
+          <p:nvPr>
+            <p:ph type="sldNum" sz="quarter" idx="5"/>
+          </p:nvPr>
+        </p:nvSpPr>
+        <p:spPr/>
+        <p:txBody>
+          <a:bodyPr/>
+          <a:lstStyle/>
+          <a:p>
+            <a:fld id="{997274CE-51E2-314F-8544-5E91EE33A09F}" type="slidenum">
+              <a:rPr lang="en-US" smtClean="0"/>
+              <a:t>21</a:t>
+            </a:fld>
+            <a:endParaRPr lang="en-US"/>
+          </a:p>
+        </p:txBody>
+      </p:sp>
+    </p:spTree>
+    <p:extLst>
+      <p:ext uri="{BB962C8B-B14F-4D97-AF65-F5344CB8AC3E}">
+        <p14:creationId xmlns:p14="http://schemas.microsoft.com/office/powerpoint/2010/main" val="4058224969"/>
+      </p:ext>
+    </p:extLst>
+  </p:cSld>
+  <p:clrMapOvr>
+    <a:masterClrMapping/>
+  </p:clrMapOvr>
+</p:notes>
+</file>
+
+<file path=ppt/notesSlides/notesSlide22.xml><?xml version="1.0" encoding="utf-8"?>
+<p:notes xmlns:a="http://schemas.openxmlformats.org/drawingml/2006/main" xmlns:r="http://schemas.openxmlformats.org/officeDocument/2006/relationships" xmlns:p="http://schemas.openxmlformats.org/presentationml/2006/main">
+  <p:cSld>
+    <p:spTree>
+      <p:nvGrpSpPr>
+        <p:cNvPr id="1" name=""/>
+        <p:cNvGrpSpPr/>
+        <p:nvPr/>
+      </p:nvGrpSpPr>
+      <p:grpSpPr>
+        <a:xfrm>
+          <a:off x="0" y="0"/>
+          <a:ext cx="0" cy="0"/>
+          <a:chOff x="0" y="0"/>
+          <a:chExt cx="0" cy="0"/>
+        </a:xfrm>
+      </p:grpSpPr>
+      <p:sp>
+        <p:nvSpPr>
+          <p:cNvPr id="2" name="Slide Image Placeholder 1"/>
+          <p:cNvSpPr>
+            <a:spLocks noGrp="1" noRot="1" noChangeAspect="1"/>
+          </p:cNvSpPr>
+          <p:nvPr>
+            <p:ph type="sldImg"/>
+          </p:nvPr>
+        </p:nvSpPr>
+        <p:spPr/>
+      </p:sp>
+      <p:sp>
+        <p:nvSpPr>
+          <p:cNvPr id="3" name="Notes Placeholder 2"/>
+          <p:cNvSpPr>
+            <a:spLocks noGrp="1"/>
+          </p:cNvSpPr>
+          <p:nvPr>
+            <p:ph type="body" idx="1"/>
+          </p:nvPr>
+        </p:nvSpPr>
+        <p:spPr/>
+        <p:txBody>
+          <a:bodyPr/>
+          <a:lstStyle/>
+          <a:p>
+            <a:endParaRPr lang="en-US" dirty="0"/>
+          </a:p>
+        </p:txBody>
+      </p:sp>
+      <p:sp>
+        <p:nvSpPr>
+          <p:cNvPr id="4" name="Slide Number Placeholder 3"/>
+          <p:cNvSpPr>
+            <a:spLocks noGrp="1"/>
+          </p:cNvSpPr>
+          <p:nvPr>
+            <p:ph type="sldNum" sz="quarter" idx="5"/>
+          </p:nvPr>
+        </p:nvSpPr>
+        <p:spPr/>
+        <p:txBody>
+          <a:bodyPr/>
+          <a:lstStyle/>
+          <a:p>
+            <a:fld id="{997274CE-51E2-314F-8544-5E91EE33A09F}" type="slidenum">
+              <a:rPr lang="en-US" smtClean="0"/>
+              <a:t>22</a:t>
             </a:fld>
             <a:endParaRPr lang="en-US"/>
           </a:p>
@@ -26653,7 +26823,7 @@
                   </a:schemeClr>
                 </a:solidFill>
               </a:rPr>
-              <a:t>RISC-V Trap Machinery</a:t>
+              <a:t>Inode and Path</a:t>
             </a:r>
           </a:p>
         </p:txBody>
@@ -27949,6 +28119,152 @@
 </file>
 
 <file path=ppt/slides/slide20.xml><?xml version="1.0" encoding="utf-8"?>
+<p:sld xmlns:a="http://schemas.openxmlformats.org/drawingml/2006/main" xmlns:r="http://schemas.openxmlformats.org/officeDocument/2006/relationships" xmlns:p="http://schemas.openxmlformats.org/presentationml/2006/main">
+  <p:cSld>
+    <p:spTree>
+      <p:nvGrpSpPr>
+        <p:cNvPr id="1" name=""/>
+        <p:cNvGrpSpPr/>
+        <p:nvPr/>
+      </p:nvGrpSpPr>
+      <p:grpSpPr>
+        <a:xfrm>
+          <a:off x="0" y="0"/>
+          <a:ext cx="0" cy="0"/>
+          <a:chOff x="0" y="0"/>
+          <a:chExt cx="0" cy="0"/>
+        </a:xfrm>
+      </p:grpSpPr>
+      <p:sp>
+        <p:nvSpPr>
+          <p:cNvPr id="2" name="TextBox 1">
+            <a:extLst>
+              <a:ext uri="{FF2B5EF4-FFF2-40B4-BE49-F238E27FC236}">
+                <a16:creationId xmlns:a16="http://schemas.microsoft.com/office/drawing/2014/main" id="{A99980E2-A3A9-FD4A-9011-9A37E88F5891}"/>
+              </a:ext>
+            </a:extLst>
+          </p:cNvPr>
+          <p:cNvSpPr txBox="1"/>
+          <p:nvPr/>
+        </p:nvSpPr>
+        <p:spPr>
+          <a:xfrm>
+            <a:off x="1872537" y="277843"/>
+            <a:ext cx="8446926" cy="707886"/>
+          </a:xfrm>
+          <a:prstGeom prst="rect">
+            <a:avLst/>
+          </a:prstGeom>
+          <a:noFill/>
+        </p:spPr>
+        <p:txBody>
+          <a:bodyPr wrap="square" rtlCol="0">
+            <a:spAutoFit/>
+          </a:bodyPr>
+          <a:lstStyle/>
+          <a:p>
+            <a:pPr algn="ctr"/>
+            <a:r>
+              <a:rPr lang="en-US" sz="4000" dirty="0">
+                <a:solidFill>
+                  <a:schemeClr val="accent1">
+                    <a:lumMod val="60000"/>
+                    <a:lumOff val="40000"/>
+                  </a:schemeClr>
+                </a:solidFill>
+              </a:rPr>
+              <a:t>RISC-V Trap Machinery</a:t>
+            </a:r>
+          </a:p>
+        </p:txBody>
+      </p:sp>
+    </p:spTree>
+    <p:extLst>
+      <p:ext uri="{BB962C8B-B14F-4D97-AF65-F5344CB8AC3E}">
+        <p14:creationId xmlns:p14="http://schemas.microsoft.com/office/powerpoint/2010/main" val="1434187167"/>
+      </p:ext>
+    </p:extLst>
+  </p:cSld>
+  <p:clrMapOvr>
+    <a:masterClrMapping/>
+  </p:clrMapOvr>
+</p:sld>
+</file>
+
+<file path=ppt/slides/slide21.xml><?xml version="1.0" encoding="utf-8"?>
+<p:sld xmlns:a="http://schemas.openxmlformats.org/drawingml/2006/main" xmlns:r="http://schemas.openxmlformats.org/officeDocument/2006/relationships" xmlns:p="http://schemas.openxmlformats.org/presentationml/2006/main">
+  <p:cSld>
+    <p:spTree>
+      <p:nvGrpSpPr>
+        <p:cNvPr id="1" name=""/>
+        <p:cNvGrpSpPr/>
+        <p:nvPr/>
+      </p:nvGrpSpPr>
+      <p:grpSpPr>
+        <a:xfrm>
+          <a:off x="0" y="0"/>
+          <a:ext cx="0" cy="0"/>
+          <a:chOff x="0" y="0"/>
+          <a:chExt cx="0" cy="0"/>
+        </a:xfrm>
+      </p:grpSpPr>
+      <p:sp>
+        <p:nvSpPr>
+          <p:cNvPr id="2" name="TextBox 1">
+            <a:extLst>
+              <a:ext uri="{FF2B5EF4-FFF2-40B4-BE49-F238E27FC236}">
+                <a16:creationId xmlns:a16="http://schemas.microsoft.com/office/drawing/2014/main" id="{A99980E2-A3A9-FD4A-9011-9A37E88F5891}"/>
+              </a:ext>
+            </a:extLst>
+          </p:cNvPr>
+          <p:cNvSpPr txBox="1"/>
+          <p:nvPr/>
+        </p:nvSpPr>
+        <p:spPr>
+          <a:xfrm>
+            <a:off x="1872537" y="277843"/>
+            <a:ext cx="8446926" cy="707886"/>
+          </a:xfrm>
+          <a:prstGeom prst="rect">
+            <a:avLst/>
+          </a:prstGeom>
+          <a:noFill/>
+        </p:spPr>
+        <p:txBody>
+          <a:bodyPr wrap="square" rtlCol="0">
+            <a:spAutoFit/>
+          </a:bodyPr>
+          <a:lstStyle/>
+          <a:p>
+            <a:pPr algn="ctr"/>
+            <a:r>
+              <a:rPr lang="en-US" sz="4000" dirty="0">
+                <a:solidFill>
+                  <a:schemeClr val="accent1">
+                    <a:lumMod val="60000"/>
+                    <a:lumOff val="40000"/>
+                  </a:schemeClr>
+                </a:solidFill>
+              </a:rPr>
+              <a:t>RISC-V Trap Machinery</a:t>
+            </a:r>
+          </a:p>
+        </p:txBody>
+      </p:sp>
+    </p:spTree>
+    <p:extLst>
+      <p:ext uri="{BB962C8B-B14F-4D97-AF65-F5344CB8AC3E}">
+        <p14:creationId xmlns:p14="http://schemas.microsoft.com/office/powerpoint/2010/main" val="1129755728"/>
+      </p:ext>
+    </p:extLst>
+  </p:cSld>
+  <p:clrMapOvr>
+    <a:masterClrMapping/>
+  </p:clrMapOvr>
+</p:sld>
+</file>
+
+<file path=ppt/slides/slide22.xml><?xml version="1.0" encoding="utf-8"?>
 <p:sld xmlns:a="http://schemas.openxmlformats.org/drawingml/2006/main" xmlns:r="http://schemas.openxmlformats.org/officeDocument/2006/relationships" xmlns:p="http://schemas.openxmlformats.org/presentationml/2006/main">
   <p:cSld>
     <p:spTree>

</xml_diff>